<commit_message>
update for Admin flow and wireframe
</commit_message>
<xml_diff>
--- a/Admin tool flow.pptx
+++ b/Admin tool flow.pptx
@@ -9,8 +9,8 @@
     <p:sldId id="258" r:id="rId3"/>
     <p:sldId id="259" r:id="rId4"/>
     <p:sldId id="261" r:id="rId5"/>
-    <p:sldId id="262" r:id="rId6"/>
-    <p:sldId id="263" r:id="rId7"/>
+    <p:sldId id="263" r:id="rId6"/>
+    <p:sldId id="264" r:id="rId7"/>
   </p:sldIdLst>
   <p:sldSz cx="12192000" cy="6858000"/>
   <p:notesSz cx="6858000" cy="9144000"/>
@@ -248,7 +248,7 @@
           <a:p>
             <a:fld id="{244407FF-88D8-4799-B8FC-E0203F3B8DD7}" type="datetimeFigureOut">
               <a:rPr lang="fr-FR" smtClean="0"/>
-              <a:t>24/09/2014</a:t>
+              <a:t>25/09/2014</a:t>
             </a:fld>
             <a:endParaRPr lang="fr-FR"/>
           </a:p>
@@ -418,7 +418,7 @@
           <a:p>
             <a:fld id="{244407FF-88D8-4799-B8FC-E0203F3B8DD7}" type="datetimeFigureOut">
               <a:rPr lang="fr-FR" smtClean="0"/>
-              <a:t>24/09/2014</a:t>
+              <a:t>25/09/2014</a:t>
             </a:fld>
             <a:endParaRPr lang="fr-FR"/>
           </a:p>
@@ -598,7 +598,7 @@
           <a:p>
             <a:fld id="{244407FF-88D8-4799-B8FC-E0203F3B8DD7}" type="datetimeFigureOut">
               <a:rPr lang="fr-FR" smtClean="0"/>
-              <a:t>24/09/2014</a:t>
+              <a:t>25/09/2014</a:t>
             </a:fld>
             <a:endParaRPr lang="fr-FR"/>
           </a:p>
@@ -768,7 +768,7 @@
           <a:p>
             <a:fld id="{244407FF-88D8-4799-B8FC-E0203F3B8DD7}" type="datetimeFigureOut">
               <a:rPr lang="fr-FR" smtClean="0"/>
-              <a:t>24/09/2014</a:t>
+              <a:t>25/09/2014</a:t>
             </a:fld>
             <a:endParaRPr lang="fr-FR"/>
           </a:p>
@@ -1014,7 +1014,7 @@
           <a:p>
             <a:fld id="{244407FF-88D8-4799-B8FC-E0203F3B8DD7}" type="datetimeFigureOut">
               <a:rPr lang="fr-FR" smtClean="0"/>
-              <a:t>24/09/2014</a:t>
+              <a:t>25/09/2014</a:t>
             </a:fld>
             <a:endParaRPr lang="fr-FR"/>
           </a:p>
@@ -1246,7 +1246,7 @@
           <a:p>
             <a:fld id="{244407FF-88D8-4799-B8FC-E0203F3B8DD7}" type="datetimeFigureOut">
               <a:rPr lang="fr-FR" smtClean="0"/>
-              <a:t>24/09/2014</a:t>
+              <a:t>25/09/2014</a:t>
             </a:fld>
             <a:endParaRPr lang="fr-FR"/>
           </a:p>
@@ -1613,7 +1613,7 @@
           <a:p>
             <a:fld id="{244407FF-88D8-4799-B8FC-E0203F3B8DD7}" type="datetimeFigureOut">
               <a:rPr lang="fr-FR" smtClean="0"/>
-              <a:t>24/09/2014</a:t>
+              <a:t>25/09/2014</a:t>
             </a:fld>
             <a:endParaRPr lang="fr-FR"/>
           </a:p>
@@ -1731,7 +1731,7 @@
           <a:p>
             <a:fld id="{244407FF-88D8-4799-B8FC-E0203F3B8DD7}" type="datetimeFigureOut">
               <a:rPr lang="fr-FR" smtClean="0"/>
-              <a:t>24/09/2014</a:t>
+              <a:t>25/09/2014</a:t>
             </a:fld>
             <a:endParaRPr lang="fr-FR"/>
           </a:p>
@@ -1826,7 +1826,7 @@
           <a:p>
             <a:fld id="{244407FF-88D8-4799-B8FC-E0203F3B8DD7}" type="datetimeFigureOut">
               <a:rPr lang="fr-FR" smtClean="0"/>
-              <a:t>24/09/2014</a:t>
+              <a:t>25/09/2014</a:t>
             </a:fld>
             <a:endParaRPr lang="fr-FR"/>
           </a:p>
@@ -2103,7 +2103,7 @@
           <a:p>
             <a:fld id="{244407FF-88D8-4799-B8FC-E0203F3B8DD7}" type="datetimeFigureOut">
               <a:rPr lang="fr-FR" smtClean="0"/>
-              <a:t>24/09/2014</a:t>
+              <a:t>25/09/2014</a:t>
             </a:fld>
             <a:endParaRPr lang="fr-FR"/>
           </a:p>
@@ -2356,7 +2356,7 @@
           <a:p>
             <a:fld id="{244407FF-88D8-4799-B8FC-E0203F3B8DD7}" type="datetimeFigureOut">
               <a:rPr lang="fr-FR" smtClean="0"/>
-              <a:t>24/09/2014</a:t>
+              <a:t>25/09/2014</a:t>
             </a:fld>
             <a:endParaRPr lang="fr-FR"/>
           </a:p>
@@ -2569,7 +2569,7 @@
           <a:p>
             <a:fld id="{244407FF-88D8-4799-B8FC-E0203F3B8DD7}" type="datetimeFigureOut">
               <a:rPr lang="fr-FR" smtClean="0"/>
-              <a:t>24/09/2014</a:t>
+              <a:t>25/09/2014</a:t>
             </a:fld>
             <a:endParaRPr lang="fr-FR"/>
           </a:p>
@@ -3022,7 +3022,20 @@
           <a:p>
             <a:r>
               <a:rPr lang="fr-FR" dirty="0" smtClean="0"/>
-              <a:t>PC version</a:t>
+              <a:t>PC </a:t>
+            </a:r>
+            <a:r>
+              <a:rPr lang="fr-FR" dirty="0" smtClean="0"/>
+              <a:t>version</a:t>
+            </a:r>
+          </a:p>
+          <a:p>
+            <a:endParaRPr lang="fr-FR" dirty="0"/>
+          </a:p>
+          <a:p>
+            <a:r>
+              <a:rPr lang="fr-FR" dirty="0" smtClean="0"/>
+              <a:t>726804</a:t>
             </a:r>
             <a:endParaRPr lang="fr-FR" dirty="0"/>
           </a:p>
@@ -3102,20 +3115,8 @@
           <a:p>
             <a:pPr algn="ctr"/>
             <a:r>
-              <a:rPr lang="fr-FR" dirty="0" smtClean="0"/>
-              <a:t>Install and </a:t>
-            </a:r>
-            <a:r>
-              <a:rPr lang="fr-FR" dirty="0" err="1" smtClean="0"/>
-              <a:t>Launch</a:t>
-            </a:r>
-            <a:r>
-              <a:rPr lang="fr-FR" dirty="0" smtClean="0"/>
-              <a:t> the </a:t>
-            </a:r>
-            <a:r>
-              <a:rPr lang="fr-FR" dirty="0" err="1" smtClean="0"/>
-              <a:t>tool</a:t>
+              <a:rPr lang="fr-FR" altLang="zh-CN" dirty="0" smtClean="0"/>
+              <a:t>Go to web site</a:t>
             </a:r>
             <a:endParaRPr lang="fr-FR" dirty="0"/>
           </a:p>
@@ -3331,11 +3332,7 @@
             </a:r>
             <a:r>
               <a:rPr lang="fr-FR" dirty="0" smtClean="0"/>
-              <a:t> </a:t>
-            </a:r>
-            <a:r>
-              <a:rPr lang="fr-FR" dirty="0" smtClean="0"/>
-              <a:t>flow</a:t>
+              <a:t> flow</a:t>
             </a:r>
             <a:endParaRPr lang="fr-FR" dirty="0"/>
           </a:p>
@@ -3859,7 +3856,7 @@
           <a:p>
             <a:r>
               <a:rPr lang="fr-FR" dirty="0" smtClean="0"/>
-              <a:t>Courses management flow</a:t>
+              <a:t>Class management flow</a:t>
             </a:r>
             <a:endParaRPr lang="fr-FR" dirty="0"/>
           </a:p>
@@ -3873,7 +3870,7 @@
         </p:nvSpPr>
         <p:spPr>
           <a:xfrm>
-            <a:off x="838200" y="2407603"/>
+            <a:off x="869120" y="1791428"/>
             <a:ext cx="1597152" cy="755904"/>
           </a:xfrm>
           <a:prstGeom prst="rect">
@@ -3907,7 +3904,7 @@
             </a:r>
             <a:r>
               <a:rPr lang="fr-FR" dirty="0" smtClean="0"/>
-              <a:t>Course tab</a:t>
+              <a:t>Class tab</a:t>
             </a:r>
             <a:endParaRPr lang="fr-FR" dirty="0"/>
           </a:p>
@@ -3921,7 +3918,7 @@
         </p:nvSpPr>
         <p:spPr>
           <a:xfrm>
-            <a:off x="3041870" y="2413954"/>
+            <a:off x="3072790" y="1797779"/>
             <a:ext cx="1597152" cy="755904"/>
           </a:xfrm>
           <a:prstGeom prst="rect">
@@ -3950,12 +3947,16 @@
           <a:p>
             <a:pPr algn="ctr"/>
             <a:r>
+              <a:rPr lang="fr-FR" dirty="0" smtClean="0"/>
+              <a:t>Select to </a:t>
+            </a:r>
+            <a:r>
               <a:rPr lang="fr-FR" dirty="0" err="1" smtClean="0"/>
-              <a:t>Pick</a:t>
-            </a:r>
-            <a:r>
-              <a:rPr lang="fr-FR" dirty="0" smtClean="0"/>
-              <a:t> a group</a:t>
+              <a:t>creat</a:t>
+            </a:r>
+            <a:r>
+              <a:rPr lang="fr-FR" dirty="0" smtClean="0"/>
+              <a:t> a new class</a:t>
             </a:r>
             <a:endParaRPr lang="fr-FR" dirty="0"/>
           </a:p>
@@ -3969,7 +3970,7 @@
         </p:nvSpPr>
         <p:spPr>
           <a:xfrm>
-            <a:off x="5274530" y="2413954"/>
+            <a:off x="5305450" y="1797779"/>
             <a:ext cx="1597152" cy="755904"/>
           </a:xfrm>
           <a:prstGeom prst="rect">
@@ -3999,11 +4000,23 @@
             <a:pPr algn="ctr"/>
             <a:r>
               <a:rPr lang="fr-FR" dirty="0" smtClean="0"/>
-              <a:t>Start/Restart </a:t>
+              <a:t>Set class </a:t>
             </a:r>
             <a:r>
               <a:rPr lang="fr-FR" dirty="0" err="1" smtClean="0"/>
-              <a:t>exercises</a:t>
+              <a:t>name</a:t>
+            </a:r>
+            <a:r>
+              <a:rPr lang="fr-FR" dirty="0" smtClean="0"/>
+              <a:t> </a:t>
+            </a:r>
+            <a:r>
+              <a:rPr lang="fr-FR" dirty="0" err="1" smtClean="0"/>
+              <a:t>e.g</a:t>
+            </a:r>
+            <a:r>
+              <a:rPr lang="fr-FR" dirty="0" smtClean="0"/>
+              <a:t>. A1.1</a:t>
             </a:r>
             <a:endParaRPr lang="fr-FR" dirty="0"/>
           </a:p>
@@ -4011,13 +4024,13 @@
       </p:sp>
       <p:sp>
         <p:nvSpPr>
-          <p:cNvPr id="6" name="Rectangle 5"/>
+          <p:cNvPr id="8" name="Rectangle 7"/>
           <p:cNvSpPr/>
           <p:nvPr/>
         </p:nvSpPr>
         <p:spPr>
           <a:xfrm>
-            <a:off x="5274530" y="4518854"/>
+            <a:off x="7888562" y="1810033"/>
             <a:ext cx="1597152" cy="755904"/>
           </a:xfrm>
           <a:prstGeom prst="rect">
@@ -4047,7 +4060,27 @@
             <a:pPr algn="ctr"/>
             <a:r>
               <a:rPr lang="fr-FR" dirty="0" smtClean="0"/>
-              <a:t>Pause or Exit</a:t>
+              <a:t>Select </a:t>
+            </a:r>
+            <a:r>
+              <a:rPr lang="fr-FR" dirty="0" err="1" smtClean="0"/>
+              <a:t>teachers</a:t>
+            </a:r>
+            <a:r>
+              <a:rPr lang="fr-FR" dirty="0" smtClean="0"/>
+              <a:t> </a:t>
+            </a:r>
+            <a:r>
+              <a:rPr lang="fr-FR" dirty="0" err="1" smtClean="0"/>
+              <a:t>from</a:t>
+            </a:r>
+            <a:r>
+              <a:rPr lang="fr-FR" dirty="0" smtClean="0"/>
+              <a:t> the </a:t>
+            </a:r>
+            <a:r>
+              <a:rPr lang="fr-FR" dirty="0" err="1" smtClean="0"/>
+              <a:t>list</a:t>
             </a:r>
             <a:endParaRPr lang="fr-FR" dirty="0"/>
           </a:p>
@@ -4055,13 +4088,13 @@
       </p:sp>
       <p:sp>
         <p:nvSpPr>
-          <p:cNvPr id="7" name="Rectangle 6"/>
+          <p:cNvPr id="9" name="Rectangle 8"/>
           <p:cNvSpPr/>
           <p:nvPr/>
         </p:nvSpPr>
         <p:spPr>
           <a:xfrm>
-            <a:off x="7857642" y="4518854"/>
+            <a:off x="10305694" y="1797779"/>
             <a:ext cx="1597152" cy="755904"/>
           </a:xfrm>
           <a:prstGeom prst="rect">
@@ -4090,104 +4123,28 @@
           <a:p>
             <a:pPr algn="ctr"/>
             <a:r>
+              <a:rPr lang="fr-FR" dirty="0" smtClean="0"/>
+              <a:t>Select </a:t>
+            </a:r>
+            <a:r>
               <a:rPr lang="fr-FR" dirty="0" err="1" smtClean="0"/>
-              <a:t>Resume</a:t>
-            </a:r>
-            <a:endParaRPr lang="fr-FR" dirty="0"/>
-          </a:p>
-        </p:txBody>
-      </p:sp>
-      <p:sp>
-        <p:nvSpPr>
-          <p:cNvPr id="8" name="Rectangle 7"/>
-          <p:cNvSpPr/>
-          <p:nvPr/>
-        </p:nvSpPr>
-        <p:spPr>
-          <a:xfrm>
-            <a:off x="7857642" y="2426208"/>
-            <a:ext cx="1597152" cy="755904"/>
-          </a:xfrm>
-          <a:prstGeom prst="rect">
-            <a:avLst/>
-          </a:prstGeom>
-        </p:spPr>
-        <p:style>
-          <a:lnRef idx="2">
-            <a:schemeClr val="accent1">
-              <a:shade val="50000"/>
-            </a:schemeClr>
-          </a:lnRef>
-          <a:fillRef idx="1">
-            <a:schemeClr val="accent1"/>
-          </a:fillRef>
-          <a:effectRef idx="0">
-            <a:schemeClr val="accent1"/>
-          </a:effectRef>
-          <a:fontRef idx="minor">
-            <a:schemeClr val="lt1"/>
-          </a:fontRef>
-        </p:style>
-        <p:txBody>
-          <a:bodyPr rtlCol="0" anchor="ctr"/>
-          <a:lstStyle/>
-          <a:p>
-            <a:pPr algn="ctr"/>
-            <a:r>
-              <a:rPr lang="fr-FR" dirty="0" smtClean="0"/>
-              <a:t>Complete all and </a:t>
+              <a:t>students</a:t>
+            </a:r>
+            <a:r>
+              <a:rPr lang="fr-FR" dirty="0" smtClean="0"/>
+              <a:t> </a:t>
             </a:r>
             <a:r>
               <a:rPr lang="fr-FR" dirty="0" err="1" smtClean="0"/>
-              <a:t>submit</a:t>
-            </a:r>
-            <a:endParaRPr lang="fr-FR" dirty="0"/>
-          </a:p>
-        </p:txBody>
-      </p:sp>
-      <p:sp>
-        <p:nvSpPr>
-          <p:cNvPr id="9" name="Rectangle 8"/>
-          <p:cNvSpPr/>
-          <p:nvPr/>
-        </p:nvSpPr>
-        <p:spPr>
-          <a:xfrm>
-            <a:off x="10274774" y="2413954"/>
-            <a:ext cx="1597152" cy="755904"/>
-          </a:xfrm>
-          <a:prstGeom prst="rect">
-            <a:avLst/>
-          </a:prstGeom>
-        </p:spPr>
-        <p:style>
-          <a:lnRef idx="2">
-            <a:schemeClr val="accent1">
-              <a:shade val="50000"/>
-            </a:schemeClr>
-          </a:lnRef>
-          <a:fillRef idx="1">
-            <a:schemeClr val="accent1"/>
-          </a:fillRef>
-          <a:effectRef idx="0">
-            <a:schemeClr val="accent1"/>
-          </a:effectRef>
-          <a:fontRef idx="minor">
-            <a:schemeClr val="lt1"/>
-          </a:fontRef>
-        </p:style>
-        <p:txBody>
-          <a:bodyPr rtlCol="0" anchor="ctr"/>
-          <a:lstStyle/>
-          <a:p>
-            <a:pPr algn="ctr"/>
-            <a:r>
-              <a:rPr lang="fr-FR" dirty="0" smtClean="0"/>
-              <a:t>Check score and </a:t>
+              <a:t>from</a:t>
+            </a:r>
+            <a:r>
+              <a:rPr lang="fr-FR" dirty="0" smtClean="0"/>
+              <a:t> the </a:t>
             </a:r>
             <a:r>
               <a:rPr lang="fr-FR" dirty="0" err="1" smtClean="0"/>
-              <a:t>answers</a:t>
+              <a:t>list</a:t>
             </a:r>
             <a:endParaRPr lang="fr-FR" dirty="0"/>
           </a:p>
@@ -4204,7 +4161,7 @@
         </p:nvCxnSpPr>
         <p:spPr>
           <a:xfrm>
-            <a:off x="2435352" y="2785555"/>
+            <a:off x="2466272" y="2169380"/>
             <a:ext cx="606518" cy="6351"/>
           </a:xfrm>
           <a:prstGeom prst="straightConnector1">
@@ -4240,80 +4197,8 @@
         </p:nvCxnSpPr>
         <p:spPr>
           <a:xfrm>
-            <a:off x="4639022" y="2791906"/>
+            <a:off x="4669942" y="2175731"/>
             <a:ext cx="635508" cy="0"/>
-          </a:xfrm>
-          <a:prstGeom prst="straightConnector1">
-            <a:avLst/>
-          </a:prstGeom>
-          <a:ln>
-            <a:tailEnd type="triangle"/>
-          </a:ln>
-        </p:spPr>
-        <p:style>
-          <a:lnRef idx="1">
-            <a:schemeClr val="accent1"/>
-          </a:lnRef>
-          <a:fillRef idx="0">
-            <a:schemeClr val="accent1"/>
-          </a:fillRef>
-          <a:effectRef idx="0">
-            <a:schemeClr val="accent1"/>
-          </a:effectRef>
-          <a:fontRef idx="minor">
-            <a:schemeClr val="tx1"/>
-          </a:fontRef>
-        </p:style>
-      </p:cxnSp>
-      <p:cxnSp>
-        <p:nvCxnSpPr>
-          <p:cNvPr id="15" name="Straight Arrow Connector 14"/>
-          <p:cNvCxnSpPr>
-            <a:stCxn id="5" idx="2"/>
-            <a:endCxn id="6" idx="0"/>
-          </p:cNvCxnSpPr>
-          <p:nvPr/>
-        </p:nvCxnSpPr>
-        <p:spPr>
-          <a:xfrm>
-            <a:off x="6073106" y="3169858"/>
-            <a:ext cx="0" cy="1348996"/>
-          </a:xfrm>
-          <a:prstGeom prst="straightConnector1">
-            <a:avLst/>
-          </a:prstGeom>
-          <a:ln>
-            <a:tailEnd type="triangle"/>
-          </a:ln>
-        </p:spPr>
-        <p:style>
-          <a:lnRef idx="1">
-            <a:schemeClr val="accent1"/>
-          </a:lnRef>
-          <a:fillRef idx="0">
-            <a:schemeClr val="accent1"/>
-          </a:fillRef>
-          <a:effectRef idx="0">
-            <a:schemeClr val="accent1"/>
-          </a:effectRef>
-          <a:fontRef idx="minor">
-            <a:schemeClr val="tx1"/>
-          </a:fontRef>
-        </p:style>
-      </p:cxnSp>
-      <p:cxnSp>
-        <p:nvCxnSpPr>
-          <p:cNvPr id="17" name="Straight Arrow Connector 16"/>
-          <p:cNvCxnSpPr>
-            <a:stCxn id="6" idx="3"/>
-            <a:endCxn id="7" idx="1"/>
-          </p:cNvCxnSpPr>
-          <p:nvPr/>
-        </p:nvCxnSpPr>
-        <p:spPr>
-          <a:xfrm>
-            <a:off x="6871682" y="4896806"/>
-            <a:ext cx="985960" cy="0"/>
           </a:xfrm>
           <a:prstGeom prst="straightConnector1">
             <a:avLst/>
@@ -4348,7 +4233,7 @@
         </p:nvCxnSpPr>
         <p:spPr>
           <a:xfrm>
-            <a:off x="6871682" y="2791906"/>
+            <a:off x="6902602" y="2175731"/>
             <a:ext cx="985960" cy="12254"/>
           </a:xfrm>
           <a:prstGeom prst="straightConnector1">
@@ -4384,7 +4269,7 @@
         </p:nvCxnSpPr>
         <p:spPr>
           <a:xfrm flipV="1">
-            <a:off x="9454794" y="2791906"/>
+            <a:off x="9485714" y="2175731"/>
             <a:ext cx="819980" cy="12254"/>
           </a:xfrm>
           <a:prstGeom prst="straightConnector1">
@@ -4409,19 +4294,511 @@
           </a:fontRef>
         </p:style>
       </p:cxnSp>
+      <p:sp>
+        <p:nvSpPr>
+          <p:cNvPr id="16" name="TextBox 15"/>
+          <p:cNvSpPr txBox="1"/>
+          <p:nvPr/>
+        </p:nvSpPr>
+        <p:spPr>
+          <a:xfrm>
+            <a:off x="807280" y="5742432"/>
+            <a:ext cx="11504944" cy="646331"/>
+          </a:xfrm>
+          <a:prstGeom prst="rect">
+            <a:avLst/>
+          </a:prstGeom>
+          <a:noFill/>
+        </p:spPr>
+        <p:txBody>
+          <a:bodyPr wrap="none" rtlCol="0">
+            <a:spAutoFit/>
+          </a:bodyPr>
+          <a:lstStyle/>
+          <a:p>
+            <a:pPr marL="285750" indent="-285750">
+              <a:buFont typeface="Arial" panose="020B0604020202020204" pitchFamily="34" charset="0"/>
+              <a:buChar char="•"/>
+            </a:pPr>
+            <a:r>
+              <a:rPr lang="fr-FR" dirty="0" smtClean="0"/>
+              <a:t>Class </a:t>
+            </a:r>
+            <a:r>
+              <a:rPr lang="fr-FR" dirty="0" err="1" smtClean="0"/>
+              <a:t>does</a:t>
+            </a:r>
+            <a:r>
+              <a:rPr lang="fr-FR" dirty="0" smtClean="0"/>
+              <a:t> not have expiration date, admin </a:t>
+            </a:r>
+            <a:r>
+              <a:rPr lang="fr-FR" dirty="0" err="1" smtClean="0"/>
+              <a:t>can</a:t>
+            </a:r>
+            <a:r>
+              <a:rPr lang="fr-FR" dirty="0" smtClean="0"/>
+              <a:t> </a:t>
+            </a:r>
+            <a:r>
+              <a:rPr lang="fr-FR" dirty="0" err="1" smtClean="0"/>
+              <a:t>either</a:t>
+            </a:r>
+            <a:r>
+              <a:rPr lang="fr-FR" dirty="0" smtClean="0"/>
+              <a:t> </a:t>
+            </a:r>
+            <a:r>
+              <a:rPr lang="fr-FR" dirty="0" err="1" smtClean="0"/>
+              <a:t>delete</a:t>
+            </a:r>
+            <a:r>
+              <a:rPr lang="fr-FR" dirty="0" smtClean="0"/>
+              <a:t> a class or change </a:t>
+            </a:r>
+            <a:r>
+              <a:rPr lang="fr-FR" dirty="0" err="1" smtClean="0"/>
+              <a:t>teachers</a:t>
+            </a:r>
+            <a:r>
+              <a:rPr lang="fr-FR" dirty="0" smtClean="0"/>
+              <a:t>/</a:t>
+            </a:r>
+            <a:r>
+              <a:rPr lang="fr-FR" dirty="0" err="1" smtClean="0"/>
+              <a:t>students</a:t>
+            </a:r>
+            <a:r>
+              <a:rPr lang="fr-FR" dirty="0" smtClean="0"/>
+              <a:t> </a:t>
+            </a:r>
+            <a:r>
+              <a:rPr lang="fr-FR" dirty="0" err="1" smtClean="0"/>
+              <a:t>attached</a:t>
+            </a:r>
+            <a:r>
+              <a:rPr lang="fr-FR" dirty="0" smtClean="0"/>
+              <a:t> to the class</a:t>
+            </a:r>
+          </a:p>
+          <a:p>
+            <a:pPr marL="285750" indent="-285750">
+              <a:buFont typeface="Arial" panose="020B0604020202020204" pitchFamily="34" charset="0"/>
+              <a:buChar char="•"/>
+            </a:pPr>
+            <a:r>
+              <a:rPr lang="fr-FR" dirty="0" smtClean="0">
+                <a:solidFill>
+                  <a:srgbClr val="FF0000"/>
+                </a:solidFill>
+              </a:rPr>
+              <a:t>Do </a:t>
+            </a:r>
+            <a:r>
+              <a:rPr lang="fr-FR" dirty="0" err="1" smtClean="0">
+                <a:solidFill>
+                  <a:srgbClr val="FF0000"/>
+                </a:solidFill>
+              </a:rPr>
+              <a:t>we</a:t>
+            </a:r>
+            <a:r>
+              <a:rPr lang="fr-FR" dirty="0" smtClean="0">
+                <a:solidFill>
+                  <a:srgbClr val="FF0000"/>
+                </a:solidFill>
+              </a:rPr>
+              <a:t> </a:t>
+            </a:r>
+            <a:r>
+              <a:rPr lang="fr-FR" dirty="0" err="1" smtClean="0">
+                <a:solidFill>
+                  <a:srgbClr val="FF0000"/>
+                </a:solidFill>
+              </a:rPr>
+              <a:t>allow</a:t>
+            </a:r>
+            <a:r>
+              <a:rPr lang="fr-FR" dirty="0" smtClean="0">
+                <a:solidFill>
+                  <a:srgbClr val="FF0000"/>
+                </a:solidFill>
+              </a:rPr>
+              <a:t> to </a:t>
+            </a:r>
+            <a:r>
+              <a:rPr lang="fr-FR" dirty="0" err="1" smtClean="0">
+                <a:solidFill>
+                  <a:srgbClr val="FF0000"/>
+                </a:solidFill>
+              </a:rPr>
+              <a:t>add</a:t>
+            </a:r>
+            <a:r>
+              <a:rPr lang="fr-FR" dirty="0" smtClean="0">
+                <a:solidFill>
+                  <a:srgbClr val="FF0000"/>
+                </a:solidFill>
+              </a:rPr>
+              <a:t> a new </a:t>
+            </a:r>
+            <a:r>
+              <a:rPr lang="fr-FR" dirty="0" err="1" smtClean="0">
+                <a:solidFill>
+                  <a:srgbClr val="FF0000"/>
+                </a:solidFill>
+              </a:rPr>
+              <a:t>teacher</a:t>
+            </a:r>
+            <a:r>
+              <a:rPr lang="fr-FR" dirty="0" smtClean="0">
+                <a:solidFill>
+                  <a:srgbClr val="FF0000"/>
+                </a:solidFill>
+              </a:rPr>
+              <a:t> </a:t>
+            </a:r>
+            <a:r>
+              <a:rPr lang="fr-FR" dirty="0" err="1" smtClean="0">
+                <a:solidFill>
+                  <a:srgbClr val="FF0000"/>
+                </a:solidFill>
+              </a:rPr>
+              <a:t>here</a:t>
+            </a:r>
+            <a:r>
+              <a:rPr lang="fr-FR" dirty="0" smtClean="0">
+                <a:solidFill>
+                  <a:srgbClr val="FF0000"/>
+                </a:solidFill>
+              </a:rPr>
+              <a:t>?</a:t>
+            </a:r>
+            <a:endParaRPr lang="fr-FR" dirty="0">
+              <a:solidFill>
+                <a:srgbClr val="FF0000"/>
+              </a:solidFill>
+            </a:endParaRPr>
+          </a:p>
+        </p:txBody>
+      </p:sp>
+      <p:sp>
+        <p:nvSpPr>
+          <p:cNvPr id="22" name="Rectangle 21"/>
+          <p:cNvSpPr/>
+          <p:nvPr/>
+        </p:nvSpPr>
+        <p:spPr>
+          <a:xfrm>
+            <a:off x="838200" y="2982878"/>
+            <a:ext cx="1597152" cy="755904"/>
+          </a:xfrm>
+          <a:prstGeom prst="rect">
+            <a:avLst/>
+          </a:prstGeom>
+        </p:spPr>
+        <p:style>
+          <a:lnRef idx="2">
+            <a:schemeClr val="accent1">
+              <a:shade val="50000"/>
+            </a:schemeClr>
+          </a:lnRef>
+          <a:fillRef idx="1">
+            <a:schemeClr val="accent1"/>
+          </a:fillRef>
+          <a:effectRef idx="0">
+            <a:schemeClr val="accent1"/>
+          </a:effectRef>
+          <a:fontRef idx="minor">
+            <a:schemeClr val="lt1"/>
+          </a:fontRef>
+        </p:style>
+        <p:txBody>
+          <a:bodyPr rtlCol="0" anchor="ctr"/>
+          <a:lstStyle/>
+          <a:p>
+            <a:pPr algn="ctr"/>
+            <a:r>
+              <a:rPr lang="fr-FR" dirty="0" smtClean="0"/>
+              <a:t>Select </a:t>
+            </a:r>
+            <a:r>
+              <a:rPr lang="fr-FR" dirty="0" smtClean="0"/>
+              <a:t>Class tab</a:t>
+            </a:r>
+            <a:endParaRPr lang="fr-FR" dirty="0"/>
+          </a:p>
+        </p:txBody>
+      </p:sp>
+      <p:sp>
+        <p:nvSpPr>
+          <p:cNvPr id="24" name="Rectangle 23"/>
+          <p:cNvSpPr/>
+          <p:nvPr/>
+        </p:nvSpPr>
+        <p:spPr>
+          <a:xfrm>
+            <a:off x="3041870" y="2989229"/>
+            <a:ext cx="1597152" cy="755904"/>
+          </a:xfrm>
+          <a:prstGeom prst="rect">
+            <a:avLst/>
+          </a:prstGeom>
+        </p:spPr>
+        <p:style>
+          <a:lnRef idx="2">
+            <a:schemeClr val="accent1">
+              <a:shade val="50000"/>
+            </a:schemeClr>
+          </a:lnRef>
+          <a:fillRef idx="1">
+            <a:schemeClr val="accent1"/>
+          </a:fillRef>
+          <a:effectRef idx="0">
+            <a:schemeClr val="accent1"/>
+          </a:effectRef>
+          <a:fontRef idx="minor">
+            <a:schemeClr val="lt1"/>
+          </a:fontRef>
+        </p:style>
+        <p:txBody>
+          <a:bodyPr rtlCol="0" anchor="ctr"/>
+          <a:lstStyle/>
+          <a:p>
+            <a:pPr algn="ctr"/>
+            <a:r>
+              <a:rPr lang="fr-FR" dirty="0" err="1" smtClean="0"/>
+              <a:t>Pick</a:t>
+            </a:r>
+            <a:r>
+              <a:rPr lang="fr-FR" dirty="0" smtClean="0"/>
+              <a:t> a class and select « </a:t>
+            </a:r>
+            <a:r>
+              <a:rPr lang="fr-FR" dirty="0" err="1" smtClean="0"/>
+              <a:t>edit</a:t>
+            </a:r>
+            <a:r>
+              <a:rPr lang="fr-FR" dirty="0" smtClean="0"/>
+              <a:t> »</a:t>
+            </a:r>
+            <a:endParaRPr lang="fr-FR" dirty="0"/>
+          </a:p>
+        </p:txBody>
+      </p:sp>
+      <p:sp>
+        <p:nvSpPr>
+          <p:cNvPr id="25" name="Rectangle 24"/>
+          <p:cNvSpPr/>
+          <p:nvPr/>
+        </p:nvSpPr>
+        <p:spPr>
+          <a:xfrm>
+            <a:off x="5274530" y="2989229"/>
+            <a:ext cx="1597152" cy="755904"/>
+          </a:xfrm>
+          <a:prstGeom prst="rect">
+            <a:avLst/>
+          </a:prstGeom>
+        </p:spPr>
+        <p:style>
+          <a:lnRef idx="2">
+            <a:schemeClr val="accent1">
+              <a:shade val="50000"/>
+            </a:schemeClr>
+          </a:lnRef>
+          <a:fillRef idx="1">
+            <a:schemeClr val="accent1"/>
+          </a:fillRef>
+          <a:effectRef idx="0">
+            <a:schemeClr val="accent1"/>
+          </a:effectRef>
+          <a:fontRef idx="minor">
+            <a:schemeClr val="lt1"/>
+          </a:fontRef>
+        </p:style>
+        <p:txBody>
+          <a:bodyPr rtlCol="0" anchor="ctr"/>
+          <a:lstStyle/>
+          <a:p>
+            <a:pPr algn="ctr"/>
+            <a:r>
+              <a:rPr lang="fr-FR" dirty="0" smtClean="0"/>
+              <a:t>Edit class </a:t>
+            </a:r>
+            <a:r>
+              <a:rPr lang="fr-FR" dirty="0" err="1" smtClean="0"/>
+              <a:t>name</a:t>
+            </a:r>
+            <a:endParaRPr lang="fr-FR" dirty="0"/>
+          </a:p>
+        </p:txBody>
+      </p:sp>
+      <p:sp>
+        <p:nvSpPr>
+          <p:cNvPr id="26" name="Rectangle 25"/>
+          <p:cNvSpPr/>
+          <p:nvPr/>
+        </p:nvSpPr>
+        <p:spPr>
+          <a:xfrm>
+            <a:off x="7857642" y="3001483"/>
+            <a:ext cx="1597152" cy="755904"/>
+          </a:xfrm>
+          <a:prstGeom prst="rect">
+            <a:avLst/>
+          </a:prstGeom>
+        </p:spPr>
+        <p:style>
+          <a:lnRef idx="2">
+            <a:schemeClr val="accent1">
+              <a:shade val="50000"/>
+            </a:schemeClr>
+          </a:lnRef>
+          <a:fillRef idx="1">
+            <a:schemeClr val="accent1"/>
+          </a:fillRef>
+          <a:effectRef idx="0">
+            <a:schemeClr val="accent1"/>
+          </a:effectRef>
+          <a:fontRef idx="minor">
+            <a:schemeClr val="lt1"/>
+          </a:fontRef>
+        </p:style>
+        <p:txBody>
+          <a:bodyPr rtlCol="0" anchor="ctr"/>
+          <a:lstStyle/>
+          <a:p>
+            <a:pPr algn="ctr"/>
+            <a:r>
+              <a:rPr lang="fr-FR" dirty="0" err="1" smtClean="0"/>
+              <a:t>Add</a:t>
+            </a:r>
+            <a:r>
+              <a:rPr lang="fr-FR" dirty="0" smtClean="0"/>
+              <a:t> or </a:t>
+            </a:r>
+            <a:r>
+              <a:rPr lang="fr-FR" dirty="0" err="1" smtClean="0"/>
+              <a:t>remove</a:t>
+            </a:r>
+            <a:r>
+              <a:rPr lang="fr-FR" dirty="0" smtClean="0"/>
+              <a:t> </a:t>
+            </a:r>
+            <a:r>
+              <a:rPr lang="fr-FR" dirty="0" err="1" smtClean="0"/>
+              <a:t>teachers</a:t>
+            </a:r>
+            <a:r>
+              <a:rPr lang="fr-FR" dirty="0" smtClean="0"/>
+              <a:t> </a:t>
+            </a:r>
+            <a:r>
+              <a:rPr lang="fr-FR" dirty="0" err="1" smtClean="0"/>
+              <a:t>from</a:t>
+            </a:r>
+            <a:r>
+              <a:rPr lang="fr-FR" dirty="0" smtClean="0"/>
+              <a:t> the </a:t>
+            </a:r>
+            <a:r>
+              <a:rPr lang="fr-FR" dirty="0" err="1" smtClean="0"/>
+              <a:t>list</a:t>
+            </a:r>
+            <a:endParaRPr lang="fr-FR" dirty="0"/>
+          </a:p>
+        </p:txBody>
+      </p:sp>
+      <p:sp>
+        <p:nvSpPr>
+          <p:cNvPr id="27" name="Rectangle 26"/>
+          <p:cNvSpPr/>
+          <p:nvPr/>
+        </p:nvSpPr>
+        <p:spPr>
+          <a:xfrm>
+            <a:off x="10274774" y="2989229"/>
+            <a:ext cx="1597152" cy="755904"/>
+          </a:xfrm>
+          <a:prstGeom prst="rect">
+            <a:avLst/>
+          </a:prstGeom>
+        </p:spPr>
+        <p:style>
+          <a:lnRef idx="2">
+            <a:schemeClr val="accent1">
+              <a:shade val="50000"/>
+            </a:schemeClr>
+          </a:lnRef>
+          <a:fillRef idx="1">
+            <a:schemeClr val="accent1"/>
+          </a:fillRef>
+          <a:effectRef idx="0">
+            <a:schemeClr val="accent1"/>
+          </a:effectRef>
+          <a:fontRef idx="minor">
+            <a:schemeClr val="lt1"/>
+          </a:fontRef>
+        </p:style>
+        <p:txBody>
+          <a:bodyPr rtlCol="0" anchor="ctr"/>
+          <a:lstStyle/>
+          <a:p>
+            <a:pPr algn="ctr"/>
+            <a:r>
+              <a:rPr lang="fr-FR" dirty="0" err="1" smtClean="0"/>
+              <a:t>Add</a:t>
+            </a:r>
+            <a:r>
+              <a:rPr lang="fr-FR" dirty="0" smtClean="0"/>
+              <a:t> or </a:t>
+            </a:r>
+            <a:r>
+              <a:rPr lang="fr-FR" dirty="0" err="1" smtClean="0"/>
+              <a:t>remove</a:t>
+            </a:r>
+            <a:r>
+              <a:rPr lang="fr-FR" dirty="0" smtClean="0"/>
+              <a:t> </a:t>
+            </a:r>
+            <a:r>
+              <a:rPr lang="fr-FR" dirty="0" err="1" smtClean="0"/>
+              <a:t>students</a:t>
+            </a:r>
+            <a:r>
+              <a:rPr lang="fr-FR" dirty="0" smtClean="0"/>
+              <a:t> </a:t>
+            </a:r>
+            <a:r>
+              <a:rPr lang="fr-FR" dirty="0" err="1" smtClean="0"/>
+              <a:t>from</a:t>
+            </a:r>
+            <a:r>
+              <a:rPr lang="fr-FR" dirty="0" smtClean="0"/>
+              <a:t> the </a:t>
+            </a:r>
+            <a:r>
+              <a:rPr lang="fr-FR" dirty="0" err="1" smtClean="0"/>
+              <a:t>list</a:t>
+            </a:r>
+            <a:endParaRPr lang="fr-FR" dirty="0"/>
+          </a:p>
+        </p:txBody>
+      </p:sp>
       <p:cxnSp>
         <p:nvCxnSpPr>
-          <p:cNvPr id="23" name="Straight Arrow Connector 22"/>
+          <p:cNvPr id="28" name="Straight Arrow Connector 27"/>
           <p:cNvCxnSpPr>
-            <a:stCxn id="7" idx="0"/>
-            <a:endCxn id="8" idx="2"/>
+            <a:stCxn id="22" idx="3"/>
+            <a:endCxn id="24" idx="1"/>
           </p:cNvCxnSpPr>
           <p:nvPr/>
         </p:nvCxnSpPr>
         <p:spPr>
-          <a:xfrm flipV="1">
-            <a:off x="8656218" y="3182112"/>
-            <a:ext cx="0" cy="1336742"/>
+          <a:xfrm>
+            <a:off x="2435352" y="3360830"/>
+            <a:ext cx="606518" cy="6351"/>
           </a:xfrm>
           <a:prstGeom prst="straightConnector1">
             <a:avLst/>
@@ -4447,22 +4824,320 @@
       </p:cxnSp>
       <p:cxnSp>
         <p:nvCxnSpPr>
-          <p:cNvPr id="68" name="Elbow Connector 67"/>
+          <p:cNvPr id="29" name="Straight Arrow Connector 28"/>
           <p:cNvCxnSpPr>
-            <a:stCxn id="9" idx="0"/>
-            <a:endCxn id="5" idx="0"/>
+            <a:stCxn id="24" idx="3"/>
+            <a:endCxn id="25" idx="1"/>
           </p:cNvCxnSpPr>
           <p:nvPr/>
         </p:nvCxnSpPr>
         <p:spPr>
-          <a:xfrm rot="16200000" flipV="1">
-            <a:off x="8573228" y="-86168"/>
-            <a:ext cx="12700" cy="5000244"/>
-          </a:xfrm>
-          <a:prstGeom prst="bentConnector3">
-            <a:avLst>
-              <a:gd name="adj1" fmla="val 4872000"/>
-            </a:avLst>
+          <a:xfrm>
+            <a:off x="4639022" y="3367181"/>
+            <a:ext cx="635508" cy="0"/>
+          </a:xfrm>
+          <a:prstGeom prst="straightConnector1">
+            <a:avLst/>
+          </a:prstGeom>
+          <a:ln>
+            <a:tailEnd type="triangle"/>
+          </a:ln>
+        </p:spPr>
+        <p:style>
+          <a:lnRef idx="1">
+            <a:schemeClr val="accent1"/>
+          </a:lnRef>
+          <a:fillRef idx="0">
+            <a:schemeClr val="accent1"/>
+          </a:fillRef>
+          <a:effectRef idx="0">
+            <a:schemeClr val="accent1"/>
+          </a:effectRef>
+          <a:fontRef idx="minor">
+            <a:schemeClr val="tx1"/>
+          </a:fontRef>
+        </p:style>
+      </p:cxnSp>
+      <p:cxnSp>
+        <p:nvCxnSpPr>
+          <p:cNvPr id="30" name="Straight Arrow Connector 29"/>
+          <p:cNvCxnSpPr>
+            <a:stCxn id="25" idx="3"/>
+            <a:endCxn id="26" idx="1"/>
+          </p:cNvCxnSpPr>
+          <p:nvPr/>
+        </p:nvCxnSpPr>
+        <p:spPr>
+          <a:xfrm>
+            <a:off x="6871682" y="3367181"/>
+            <a:ext cx="985960" cy="12254"/>
+          </a:xfrm>
+          <a:prstGeom prst="straightConnector1">
+            <a:avLst/>
+          </a:prstGeom>
+          <a:ln>
+            <a:tailEnd type="triangle"/>
+          </a:ln>
+        </p:spPr>
+        <p:style>
+          <a:lnRef idx="1">
+            <a:schemeClr val="accent1"/>
+          </a:lnRef>
+          <a:fillRef idx="0">
+            <a:schemeClr val="accent1"/>
+          </a:fillRef>
+          <a:effectRef idx="0">
+            <a:schemeClr val="accent1"/>
+          </a:effectRef>
+          <a:fontRef idx="minor">
+            <a:schemeClr val="tx1"/>
+          </a:fontRef>
+        </p:style>
+      </p:cxnSp>
+      <p:cxnSp>
+        <p:nvCxnSpPr>
+          <p:cNvPr id="31" name="Straight Arrow Connector 30"/>
+          <p:cNvCxnSpPr>
+            <a:stCxn id="26" idx="3"/>
+            <a:endCxn id="27" idx="1"/>
+          </p:cNvCxnSpPr>
+          <p:nvPr/>
+        </p:nvCxnSpPr>
+        <p:spPr>
+          <a:xfrm flipV="1">
+            <a:off x="9454794" y="3367181"/>
+            <a:ext cx="819980" cy="12254"/>
+          </a:xfrm>
+          <a:prstGeom prst="straightConnector1">
+            <a:avLst/>
+          </a:prstGeom>
+          <a:ln>
+            <a:tailEnd type="triangle"/>
+          </a:ln>
+        </p:spPr>
+        <p:style>
+          <a:lnRef idx="1">
+            <a:schemeClr val="accent1"/>
+          </a:lnRef>
+          <a:fillRef idx="0">
+            <a:schemeClr val="accent1"/>
+          </a:fillRef>
+          <a:effectRef idx="0">
+            <a:schemeClr val="accent1"/>
+          </a:effectRef>
+          <a:fontRef idx="minor">
+            <a:schemeClr val="tx1"/>
+          </a:fontRef>
+        </p:style>
+      </p:cxnSp>
+      <p:sp>
+        <p:nvSpPr>
+          <p:cNvPr id="32" name="Rectangle 31"/>
+          <p:cNvSpPr/>
+          <p:nvPr/>
+        </p:nvSpPr>
+        <p:spPr>
+          <a:xfrm>
+            <a:off x="838200" y="4110831"/>
+            <a:ext cx="1597152" cy="755904"/>
+          </a:xfrm>
+          <a:prstGeom prst="rect">
+            <a:avLst/>
+          </a:prstGeom>
+        </p:spPr>
+        <p:style>
+          <a:lnRef idx="2">
+            <a:schemeClr val="accent1">
+              <a:shade val="50000"/>
+            </a:schemeClr>
+          </a:lnRef>
+          <a:fillRef idx="1">
+            <a:schemeClr val="accent1"/>
+          </a:fillRef>
+          <a:effectRef idx="0">
+            <a:schemeClr val="accent1"/>
+          </a:effectRef>
+          <a:fontRef idx="minor">
+            <a:schemeClr val="lt1"/>
+          </a:fontRef>
+        </p:style>
+        <p:txBody>
+          <a:bodyPr rtlCol="0" anchor="ctr"/>
+          <a:lstStyle/>
+          <a:p>
+            <a:pPr algn="ctr"/>
+            <a:r>
+              <a:rPr lang="fr-FR" dirty="0" smtClean="0"/>
+              <a:t>Select </a:t>
+            </a:r>
+            <a:r>
+              <a:rPr lang="fr-FR" dirty="0" smtClean="0"/>
+              <a:t>Class tab</a:t>
+            </a:r>
+            <a:endParaRPr lang="fr-FR" dirty="0"/>
+          </a:p>
+        </p:txBody>
+      </p:sp>
+      <p:sp>
+        <p:nvSpPr>
+          <p:cNvPr id="33" name="Rectangle 32"/>
+          <p:cNvSpPr/>
+          <p:nvPr/>
+        </p:nvSpPr>
+        <p:spPr>
+          <a:xfrm>
+            <a:off x="3041870" y="4117182"/>
+            <a:ext cx="1597152" cy="755904"/>
+          </a:xfrm>
+          <a:prstGeom prst="rect">
+            <a:avLst/>
+          </a:prstGeom>
+        </p:spPr>
+        <p:style>
+          <a:lnRef idx="2">
+            <a:schemeClr val="accent1">
+              <a:shade val="50000"/>
+            </a:schemeClr>
+          </a:lnRef>
+          <a:fillRef idx="1">
+            <a:schemeClr val="accent1"/>
+          </a:fillRef>
+          <a:effectRef idx="0">
+            <a:schemeClr val="accent1"/>
+          </a:effectRef>
+          <a:fontRef idx="minor">
+            <a:schemeClr val="lt1"/>
+          </a:fontRef>
+        </p:style>
+        <p:txBody>
+          <a:bodyPr rtlCol="0" anchor="ctr"/>
+          <a:lstStyle/>
+          <a:p>
+            <a:pPr algn="ctr"/>
+            <a:r>
+              <a:rPr lang="fr-FR" dirty="0" err="1" smtClean="0"/>
+              <a:t>Pick</a:t>
+            </a:r>
+            <a:r>
+              <a:rPr lang="fr-FR" dirty="0" smtClean="0"/>
+              <a:t> a class and select « </a:t>
+            </a:r>
+            <a:r>
+              <a:rPr lang="fr-FR" dirty="0" err="1" smtClean="0"/>
+              <a:t>delete</a:t>
+            </a:r>
+            <a:r>
+              <a:rPr lang="fr-FR" dirty="0" smtClean="0"/>
+              <a:t> »</a:t>
+            </a:r>
+            <a:endParaRPr lang="fr-FR" dirty="0"/>
+          </a:p>
+        </p:txBody>
+      </p:sp>
+      <p:sp>
+        <p:nvSpPr>
+          <p:cNvPr id="34" name="Rectangle 33"/>
+          <p:cNvSpPr/>
+          <p:nvPr/>
+        </p:nvSpPr>
+        <p:spPr>
+          <a:xfrm>
+            <a:off x="5274530" y="4117182"/>
+            <a:ext cx="1597152" cy="755904"/>
+          </a:xfrm>
+          <a:prstGeom prst="rect">
+            <a:avLst/>
+          </a:prstGeom>
+        </p:spPr>
+        <p:style>
+          <a:lnRef idx="2">
+            <a:schemeClr val="accent1">
+              <a:shade val="50000"/>
+            </a:schemeClr>
+          </a:lnRef>
+          <a:fillRef idx="1">
+            <a:schemeClr val="accent1"/>
+          </a:fillRef>
+          <a:effectRef idx="0">
+            <a:schemeClr val="accent1"/>
+          </a:effectRef>
+          <a:fontRef idx="minor">
+            <a:schemeClr val="lt1"/>
+          </a:fontRef>
+        </p:style>
+        <p:txBody>
+          <a:bodyPr rtlCol="0" anchor="ctr"/>
+          <a:lstStyle/>
+          <a:p>
+            <a:pPr algn="ctr"/>
+            <a:r>
+              <a:rPr lang="fr-FR" dirty="0" err="1" smtClean="0"/>
+              <a:t>Confirm</a:t>
+            </a:r>
+            <a:r>
+              <a:rPr lang="fr-FR" dirty="0" smtClean="0"/>
+              <a:t> the </a:t>
+            </a:r>
+            <a:r>
+              <a:rPr lang="fr-FR" dirty="0" err="1" smtClean="0"/>
+              <a:t>deletion</a:t>
+            </a:r>
+            <a:endParaRPr lang="fr-FR" dirty="0"/>
+          </a:p>
+        </p:txBody>
+      </p:sp>
+      <p:cxnSp>
+        <p:nvCxnSpPr>
+          <p:cNvPr id="37" name="Straight Arrow Connector 36"/>
+          <p:cNvCxnSpPr>
+            <a:stCxn id="32" idx="3"/>
+            <a:endCxn id="33" idx="1"/>
+          </p:cNvCxnSpPr>
+          <p:nvPr/>
+        </p:nvCxnSpPr>
+        <p:spPr>
+          <a:xfrm>
+            <a:off x="2435352" y="4488783"/>
+            <a:ext cx="606518" cy="6351"/>
+          </a:xfrm>
+          <a:prstGeom prst="straightConnector1">
+            <a:avLst/>
+          </a:prstGeom>
+          <a:ln>
+            <a:tailEnd type="triangle"/>
+          </a:ln>
+        </p:spPr>
+        <p:style>
+          <a:lnRef idx="1">
+            <a:schemeClr val="accent1"/>
+          </a:lnRef>
+          <a:fillRef idx="0">
+            <a:schemeClr val="accent1"/>
+          </a:fillRef>
+          <a:effectRef idx="0">
+            <a:schemeClr val="accent1"/>
+          </a:effectRef>
+          <a:fontRef idx="minor">
+            <a:schemeClr val="tx1"/>
+          </a:fontRef>
+        </p:style>
+      </p:cxnSp>
+      <p:cxnSp>
+        <p:nvCxnSpPr>
+          <p:cNvPr id="38" name="Straight Arrow Connector 37"/>
+          <p:cNvCxnSpPr>
+            <a:stCxn id="33" idx="3"/>
+            <a:endCxn id="34" idx="1"/>
+          </p:cNvCxnSpPr>
+          <p:nvPr/>
+        </p:nvCxnSpPr>
+        <p:spPr>
+          <a:xfrm>
+            <a:off x="4639022" y="4495134"/>
+            <a:ext cx="635508" cy="0"/>
+          </a:xfrm>
+          <a:prstGeom prst="straightConnector1">
+            <a:avLst/>
           </a:prstGeom>
           <a:ln>
             <a:tailEnd type="triangle"/>
@@ -4530,7 +5205,12 @@
             <p:ph type="title"/>
           </p:nvPr>
         </p:nvSpPr>
-        <p:spPr/>
+        <p:spPr>
+          <a:xfrm>
+            <a:off x="838200" y="365125"/>
+            <a:ext cx="10515600" cy="768731"/>
+          </a:xfrm>
+        </p:spPr>
         <p:txBody>
           <a:bodyPr>
             <a:normAutofit/>
@@ -4539,34 +5219,15 @@
           <a:p>
             <a:r>
               <a:rPr lang="fr-FR" dirty="0" err="1" smtClean="0"/>
-              <a:t>Inbox</a:t>
-            </a:r>
-            <a:r>
-              <a:rPr lang="fr-FR" dirty="0" smtClean="0"/>
-              <a:t> flow </a:t>
-            </a:r>
-            <a:br>
-              <a:rPr lang="fr-FR" dirty="0" smtClean="0"/>
-            </a:br>
-            <a:r>
-              <a:rPr lang="fr-FR" altLang="zh-CN" dirty="0" smtClean="0"/>
-              <a:t>- No </a:t>
-            </a:r>
-            <a:r>
-              <a:rPr lang="fr-FR" altLang="zh-CN" dirty="0" err="1" smtClean="0"/>
-              <a:t>reply</a:t>
-            </a:r>
-            <a:r>
-              <a:rPr lang="fr-FR" altLang="zh-CN" dirty="0" smtClean="0"/>
-              <a:t> back </a:t>
-            </a:r>
-            <a:r>
-              <a:rPr lang="fr-FR" altLang="zh-CN" dirty="0" err="1" smtClean="0"/>
-              <a:t>feature</a:t>
-            </a:r>
-            <a:r>
-              <a:rPr lang="fr-FR" altLang="zh-CN" dirty="0" smtClean="0"/>
-              <a:t> in M1</a:t>
+              <a:t>Mail</a:t>
+            </a:r>
+            <a:r>
+              <a:rPr lang="fr-FR" dirty="0" err="1" smtClean="0"/>
+              <a:t>box</a:t>
+            </a:r>
+            <a:r>
+              <a:rPr lang="fr-FR" dirty="0" smtClean="0"/>
+              <a:t> flow</a:t>
             </a:r>
             <a:endParaRPr lang="fr-FR" sz="3600" dirty="0"/>
           </a:p>
@@ -4580,8 +5241,8 @@
         </p:nvSpPr>
         <p:spPr>
           <a:xfrm>
-            <a:off x="1070038" y="2834640"/>
-            <a:ext cx="1826895" cy="1194816"/>
+            <a:off x="1067753" y="1746504"/>
+            <a:ext cx="1477518" cy="960120"/>
           </a:xfrm>
           <a:prstGeom prst="rect">
             <a:avLst/>
@@ -4614,11 +5275,19 @@
             </a:r>
             <a:r>
               <a:rPr lang="fr-FR" dirty="0" err="1" smtClean="0"/>
-              <a:t>Inbox</a:t>
-            </a:r>
-            <a:r>
-              <a:rPr lang="fr-FR" dirty="0" smtClean="0"/>
-              <a:t> tab</a:t>
+              <a:t>Mail</a:t>
+            </a:r>
+            <a:r>
+              <a:rPr lang="fr-FR" dirty="0" err="1" smtClean="0"/>
+              <a:t>box</a:t>
+            </a:r>
+            <a:r>
+              <a:rPr lang="fr-FR" dirty="0" smtClean="0"/>
+              <a:t> </a:t>
+            </a:r>
+            <a:r>
+              <a:rPr lang="fr-FR" dirty="0" smtClean="0"/>
+              <a:t>tab</a:t>
             </a:r>
             <a:endParaRPr lang="fr-FR" dirty="0"/>
           </a:p>
@@ -4632,8 +5301,8 @@
         </p:nvSpPr>
         <p:spPr>
           <a:xfrm>
-            <a:off x="4260342" y="2834640"/>
-            <a:ext cx="2458593" cy="1194816"/>
+            <a:off x="3247073" y="1603248"/>
+            <a:ext cx="1580769" cy="1194816"/>
           </a:xfrm>
           <a:prstGeom prst="rect">
             <a:avLst/>
@@ -4661,44 +5330,12 @@
           <a:p>
             <a:pPr algn="ctr"/>
             <a:r>
+              <a:rPr lang="fr-FR" dirty="0" smtClean="0"/>
+              <a:t>Display List of messages </a:t>
+            </a:r>
+            <a:r>
               <a:rPr lang="fr-FR" dirty="0" err="1" smtClean="0"/>
-              <a:t>View</a:t>
-            </a:r>
-            <a:r>
-              <a:rPr lang="fr-FR" dirty="0" smtClean="0"/>
-              <a:t> </a:t>
-            </a:r>
-            <a:r>
-              <a:rPr lang="fr-FR" dirty="0" err="1" smtClean="0"/>
-              <a:t>announcement</a:t>
-            </a:r>
-            <a:r>
-              <a:rPr lang="fr-FR" dirty="0" smtClean="0"/>
-              <a:t> (sent to class) or </a:t>
-            </a:r>
-            <a:r>
-              <a:rPr lang="fr-FR" dirty="0" err="1" smtClean="0"/>
-              <a:t>private</a:t>
-            </a:r>
-            <a:r>
-              <a:rPr lang="fr-FR" dirty="0" smtClean="0"/>
-              <a:t> (</a:t>
-            </a:r>
-            <a:r>
-              <a:rPr lang="fr-FR" dirty="0" err="1" smtClean="0"/>
-              <a:t>his</a:t>
-            </a:r>
-            <a:r>
-              <a:rPr lang="fr-FR" dirty="0" smtClean="0"/>
-              <a:t> </a:t>
-            </a:r>
-            <a:r>
-              <a:rPr lang="fr-FR" dirty="0" err="1" smtClean="0"/>
-              <a:t>account</a:t>
-            </a:r>
-            <a:r>
-              <a:rPr lang="fr-FR" dirty="0" smtClean="0"/>
-              <a:t>)</a:t>
+              <a:t>received</a:t>
             </a:r>
             <a:endParaRPr lang="fr-FR" dirty="0"/>
           </a:p>
@@ -4714,9 +5351,9 @@
           <p:nvPr/>
         </p:nvCxnSpPr>
         <p:spPr>
-          <a:xfrm>
-            <a:off x="2896933" y="3432048"/>
-            <a:ext cx="1363409" cy="0"/>
+          <a:xfrm flipV="1">
+            <a:off x="2545271" y="2200656"/>
+            <a:ext cx="701802" cy="25908"/>
           </a:xfrm>
           <a:prstGeom prst="straightConnector1">
             <a:avLst/>
@@ -4748,7 +5385,7 @@
         </p:nvSpPr>
         <p:spPr>
           <a:xfrm>
-            <a:off x="8995791" y="2523744"/>
+            <a:off x="5241418" y="1746504"/>
             <a:ext cx="1645920" cy="908304"/>
           </a:xfrm>
           <a:prstGeom prst="rect">
@@ -4778,67 +5415,15 @@
             <a:pPr algn="ctr"/>
             <a:r>
               <a:rPr lang="fr-FR" dirty="0" smtClean="0"/>
-              <a:t>Save messages as </a:t>
-            </a:r>
-            <a:r>
-              <a:rPr lang="zh-CN" altLang="fr-FR" dirty="0" smtClean="0"/>
-              <a:t>收藏</a:t>
-            </a:r>
-            <a:r>
-              <a:rPr lang="fr-FR" dirty="0" smtClean="0"/>
-              <a:t>???</a:t>
-            </a:r>
-            <a:endParaRPr lang="fr-FR" dirty="0"/>
-          </a:p>
-        </p:txBody>
-      </p:sp>
-      <p:sp>
-        <p:nvSpPr>
-          <p:cNvPr id="9" name="Rectangle 8"/>
-          <p:cNvSpPr/>
-          <p:nvPr/>
-        </p:nvSpPr>
-        <p:spPr>
-          <a:xfrm>
-            <a:off x="8995791" y="3785616"/>
-            <a:ext cx="1645920" cy="908304"/>
-          </a:xfrm>
-          <a:prstGeom prst="rect">
-            <a:avLst/>
-          </a:prstGeom>
-        </p:spPr>
-        <p:style>
-          <a:lnRef idx="2">
-            <a:schemeClr val="accent1">
-              <a:shade val="50000"/>
-            </a:schemeClr>
-          </a:lnRef>
-          <a:fillRef idx="1">
-            <a:schemeClr val="accent1"/>
-          </a:fillRef>
-          <a:effectRef idx="0">
-            <a:schemeClr val="accent1"/>
-          </a:effectRef>
-          <a:fontRef idx="minor">
-            <a:schemeClr val="lt1"/>
-          </a:fontRef>
-        </p:style>
-        <p:txBody>
-          <a:bodyPr rtlCol="0" anchor="ctr"/>
-          <a:lstStyle/>
-          <a:p>
-            <a:pPr algn="ctr"/>
-            <a:r>
-              <a:rPr lang="fr-FR" altLang="zh-CN" dirty="0" err="1" smtClean="0"/>
-              <a:t>Delete</a:t>
-            </a:r>
-            <a:r>
-              <a:rPr lang="fr-FR" altLang="zh-CN" dirty="0" smtClean="0"/>
-              <a:t> </a:t>
-            </a:r>
-            <a:r>
-              <a:rPr lang="fr-FR" dirty="0" smtClean="0"/>
-              <a:t>messages???</a:t>
+              <a:t>Select compose to </a:t>
+            </a:r>
+            <a:r>
+              <a:rPr lang="fr-FR" dirty="0" err="1" smtClean="0"/>
+              <a:t>create</a:t>
+            </a:r>
+            <a:r>
+              <a:rPr lang="fr-FR" dirty="0" smtClean="0"/>
+              <a:t> a new message</a:t>
             </a:r>
             <a:endParaRPr lang="fr-FR" dirty="0"/>
           </a:p>
@@ -4854,9 +5439,9 @@
           <p:nvPr/>
         </p:nvCxnSpPr>
         <p:spPr>
-          <a:xfrm flipV="1">
-            <a:off x="6718935" y="2977896"/>
-            <a:ext cx="2276856" cy="454152"/>
+          <a:xfrm>
+            <a:off x="4827842" y="2200656"/>
+            <a:ext cx="413576" cy="0"/>
           </a:xfrm>
           <a:prstGeom prst="straightConnector1">
             <a:avLst/>
@@ -4880,19 +5465,981 @@
           </a:fontRef>
         </p:style>
       </p:cxnSp>
+      <p:sp>
+        <p:nvSpPr>
+          <p:cNvPr id="15" name="Rectangle 14"/>
+          <p:cNvSpPr/>
+          <p:nvPr/>
+        </p:nvSpPr>
+        <p:spPr>
+          <a:xfrm>
+            <a:off x="7300914" y="1749552"/>
+            <a:ext cx="1645920" cy="908304"/>
+          </a:xfrm>
+          <a:prstGeom prst="rect">
+            <a:avLst/>
+          </a:prstGeom>
+        </p:spPr>
+        <p:style>
+          <a:lnRef idx="2">
+            <a:schemeClr val="accent1">
+              <a:shade val="50000"/>
+            </a:schemeClr>
+          </a:lnRef>
+          <a:fillRef idx="1">
+            <a:schemeClr val="accent1"/>
+          </a:fillRef>
+          <a:effectRef idx="0">
+            <a:schemeClr val="accent1"/>
+          </a:effectRef>
+          <a:fontRef idx="minor">
+            <a:schemeClr val="lt1"/>
+          </a:fontRef>
+        </p:style>
+        <p:txBody>
+          <a:bodyPr rtlCol="0" anchor="ctr"/>
+          <a:lstStyle/>
+          <a:p>
+            <a:pPr algn="ctr"/>
+            <a:r>
+              <a:rPr lang="fr-FR" dirty="0" smtClean="0"/>
+              <a:t>S</a:t>
+            </a:r>
+            <a:r>
+              <a:rPr lang="fr-FR" altLang="zh-CN" dirty="0" smtClean="0"/>
+              <a:t>elect </a:t>
+            </a:r>
+            <a:r>
+              <a:rPr lang="fr-FR" altLang="zh-CN" dirty="0" err="1" smtClean="0"/>
+              <a:t>receiver</a:t>
+            </a:r>
+            <a:r>
+              <a:rPr lang="fr-FR" altLang="zh-CN" dirty="0" smtClean="0"/>
+              <a:t>: class or a </a:t>
+            </a:r>
+            <a:r>
+              <a:rPr lang="fr-FR" altLang="zh-CN" dirty="0" err="1" smtClean="0"/>
+              <a:t>student</a:t>
+            </a:r>
+            <a:endParaRPr lang="fr-FR" dirty="0"/>
+          </a:p>
+        </p:txBody>
+      </p:sp>
       <p:cxnSp>
         <p:nvCxnSpPr>
-          <p:cNvPr id="13" name="Straight Arrow Connector 12"/>
+          <p:cNvPr id="17" name="Straight Arrow Connector 16"/>
           <p:cNvCxnSpPr>
-            <a:stCxn id="5" idx="3"/>
-            <a:endCxn id="9" idx="1"/>
+            <a:stCxn id="8" idx="3"/>
+            <a:endCxn id="15" idx="1"/>
           </p:cNvCxnSpPr>
           <p:nvPr/>
         </p:nvCxnSpPr>
         <p:spPr>
           <a:xfrm>
-            <a:off x="6718935" y="3432048"/>
-            <a:ext cx="2276856" cy="807720"/>
+            <a:off x="6887338" y="2200656"/>
+            <a:ext cx="413576" cy="3048"/>
+          </a:xfrm>
+          <a:prstGeom prst="straightConnector1">
+            <a:avLst/>
+          </a:prstGeom>
+          <a:ln>
+            <a:tailEnd type="triangle"/>
+          </a:ln>
+        </p:spPr>
+        <p:style>
+          <a:lnRef idx="1">
+            <a:schemeClr val="accent1"/>
+          </a:lnRef>
+          <a:fillRef idx="0">
+            <a:schemeClr val="accent1"/>
+          </a:fillRef>
+          <a:effectRef idx="0">
+            <a:schemeClr val="accent1"/>
+          </a:effectRef>
+          <a:fontRef idx="minor">
+            <a:schemeClr val="tx1"/>
+          </a:fontRef>
+        </p:style>
+      </p:cxnSp>
+      <p:sp>
+        <p:nvSpPr>
+          <p:cNvPr id="27" name="Rectangle 26"/>
+          <p:cNvSpPr/>
+          <p:nvPr/>
+        </p:nvSpPr>
+        <p:spPr>
+          <a:xfrm>
+            <a:off x="9616061" y="2654808"/>
+            <a:ext cx="1645920" cy="908304"/>
+          </a:xfrm>
+          <a:prstGeom prst="rect">
+            <a:avLst/>
+          </a:prstGeom>
+        </p:spPr>
+        <p:style>
+          <a:lnRef idx="2">
+            <a:schemeClr val="accent1">
+              <a:shade val="50000"/>
+            </a:schemeClr>
+          </a:lnRef>
+          <a:fillRef idx="1">
+            <a:schemeClr val="accent1"/>
+          </a:fillRef>
+          <a:effectRef idx="0">
+            <a:schemeClr val="accent1"/>
+          </a:effectRef>
+          <a:fontRef idx="minor">
+            <a:schemeClr val="lt1"/>
+          </a:fontRef>
+        </p:style>
+        <p:txBody>
+          <a:bodyPr rtlCol="0" anchor="ctr"/>
+          <a:lstStyle/>
+          <a:p>
+            <a:pPr algn="ctr"/>
+            <a:r>
+              <a:rPr lang="fr-FR" dirty="0" err="1" smtClean="0"/>
+              <a:t>Send</a:t>
+            </a:r>
+            <a:endParaRPr lang="fr-FR" dirty="0"/>
+          </a:p>
+        </p:txBody>
+      </p:sp>
+      <p:sp>
+        <p:nvSpPr>
+          <p:cNvPr id="28" name="Rectangle 27"/>
+          <p:cNvSpPr/>
+          <p:nvPr/>
+        </p:nvSpPr>
+        <p:spPr>
+          <a:xfrm>
+            <a:off x="9616061" y="1261872"/>
+            <a:ext cx="1645920" cy="908304"/>
+          </a:xfrm>
+          <a:prstGeom prst="rect">
+            <a:avLst/>
+          </a:prstGeom>
+        </p:spPr>
+        <p:style>
+          <a:lnRef idx="2">
+            <a:schemeClr val="accent1">
+              <a:shade val="50000"/>
+            </a:schemeClr>
+          </a:lnRef>
+          <a:fillRef idx="1">
+            <a:schemeClr val="accent1"/>
+          </a:fillRef>
+          <a:effectRef idx="0">
+            <a:schemeClr val="accent1"/>
+          </a:effectRef>
+          <a:fontRef idx="minor">
+            <a:schemeClr val="lt1"/>
+          </a:fontRef>
+        </p:style>
+        <p:txBody>
+          <a:bodyPr rtlCol="0" anchor="ctr"/>
+          <a:lstStyle/>
+          <a:p>
+            <a:pPr algn="ctr"/>
+            <a:r>
+              <a:rPr lang="fr-FR" dirty="0" smtClean="0"/>
+              <a:t>Save </a:t>
+            </a:r>
+            <a:r>
+              <a:rPr lang="fr-FR" dirty="0" err="1" smtClean="0"/>
+              <a:t>draft</a:t>
+            </a:r>
+            <a:endParaRPr lang="fr-FR" dirty="0"/>
+          </a:p>
+        </p:txBody>
+      </p:sp>
+      <p:cxnSp>
+        <p:nvCxnSpPr>
+          <p:cNvPr id="30" name="Straight Arrow Connector 29"/>
+          <p:cNvCxnSpPr>
+            <a:stCxn id="15" idx="3"/>
+            <a:endCxn id="28" idx="1"/>
+          </p:cNvCxnSpPr>
+          <p:nvPr/>
+        </p:nvCxnSpPr>
+        <p:spPr>
+          <a:xfrm flipV="1">
+            <a:off x="8946834" y="1716024"/>
+            <a:ext cx="669227" cy="487680"/>
+          </a:xfrm>
+          <a:prstGeom prst="straightConnector1">
+            <a:avLst/>
+          </a:prstGeom>
+          <a:ln>
+            <a:tailEnd type="triangle"/>
+          </a:ln>
+        </p:spPr>
+        <p:style>
+          <a:lnRef idx="1">
+            <a:schemeClr val="accent1"/>
+          </a:lnRef>
+          <a:fillRef idx="0">
+            <a:schemeClr val="accent1"/>
+          </a:fillRef>
+          <a:effectRef idx="0">
+            <a:schemeClr val="accent1"/>
+          </a:effectRef>
+          <a:fontRef idx="minor">
+            <a:schemeClr val="tx1"/>
+          </a:fontRef>
+        </p:style>
+      </p:cxnSp>
+      <p:cxnSp>
+        <p:nvCxnSpPr>
+          <p:cNvPr id="32" name="Straight Arrow Connector 31"/>
+          <p:cNvCxnSpPr>
+            <a:stCxn id="15" idx="3"/>
+            <a:endCxn id="27" idx="1"/>
+          </p:cNvCxnSpPr>
+          <p:nvPr/>
+        </p:nvCxnSpPr>
+        <p:spPr>
+          <a:xfrm>
+            <a:off x="8946834" y="2203704"/>
+            <a:ext cx="669227" cy="905256"/>
+          </a:xfrm>
+          <a:prstGeom prst="straightConnector1">
+            <a:avLst/>
+          </a:prstGeom>
+          <a:ln>
+            <a:tailEnd type="triangle"/>
+          </a:ln>
+        </p:spPr>
+        <p:style>
+          <a:lnRef idx="1">
+            <a:schemeClr val="accent1"/>
+          </a:lnRef>
+          <a:fillRef idx="0">
+            <a:schemeClr val="accent1"/>
+          </a:fillRef>
+          <a:effectRef idx="0">
+            <a:schemeClr val="accent1"/>
+          </a:effectRef>
+          <a:fontRef idx="minor">
+            <a:schemeClr val="tx1"/>
+          </a:fontRef>
+        </p:style>
+      </p:cxnSp>
+      <p:sp>
+        <p:nvSpPr>
+          <p:cNvPr id="33" name="Rectangle 32"/>
+          <p:cNvSpPr/>
+          <p:nvPr/>
+        </p:nvSpPr>
+        <p:spPr>
+          <a:xfrm>
+            <a:off x="590836" y="4596384"/>
+            <a:ext cx="1311306" cy="908304"/>
+          </a:xfrm>
+          <a:prstGeom prst="rect">
+            <a:avLst/>
+          </a:prstGeom>
+        </p:spPr>
+        <p:style>
+          <a:lnRef idx="2">
+            <a:schemeClr val="accent1">
+              <a:shade val="50000"/>
+            </a:schemeClr>
+          </a:lnRef>
+          <a:fillRef idx="1">
+            <a:schemeClr val="accent1"/>
+          </a:fillRef>
+          <a:effectRef idx="0">
+            <a:schemeClr val="accent1"/>
+          </a:effectRef>
+          <a:fontRef idx="minor">
+            <a:schemeClr val="lt1"/>
+          </a:fontRef>
+        </p:style>
+        <p:txBody>
+          <a:bodyPr rtlCol="0" anchor="ctr"/>
+          <a:lstStyle/>
+          <a:p>
+            <a:pPr algn="ctr"/>
+            <a:r>
+              <a:rPr lang="fr-FR" dirty="0" smtClean="0"/>
+              <a:t>Select </a:t>
+            </a:r>
+            <a:r>
+              <a:rPr lang="fr-FR" dirty="0" err="1" smtClean="0"/>
+              <a:t>Mail</a:t>
+            </a:r>
+            <a:r>
+              <a:rPr lang="fr-FR" dirty="0" err="1" smtClean="0"/>
+              <a:t>box</a:t>
+            </a:r>
+            <a:r>
+              <a:rPr lang="fr-FR" dirty="0" smtClean="0"/>
+              <a:t> </a:t>
+            </a:r>
+            <a:r>
+              <a:rPr lang="fr-FR" dirty="0" smtClean="0"/>
+              <a:t>tab</a:t>
+            </a:r>
+            <a:endParaRPr lang="fr-FR" dirty="0"/>
+          </a:p>
+        </p:txBody>
+      </p:sp>
+      <p:sp>
+        <p:nvSpPr>
+          <p:cNvPr id="34" name="Rectangle 33"/>
+          <p:cNvSpPr/>
+          <p:nvPr/>
+        </p:nvSpPr>
+        <p:spPr>
+          <a:xfrm>
+            <a:off x="2236756" y="4453128"/>
+            <a:ext cx="1580769" cy="1194816"/>
+          </a:xfrm>
+          <a:prstGeom prst="rect">
+            <a:avLst/>
+          </a:prstGeom>
+        </p:spPr>
+        <p:style>
+          <a:lnRef idx="2">
+            <a:schemeClr val="accent1">
+              <a:shade val="50000"/>
+            </a:schemeClr>
+          </a:lnRef>
+          <a:fillRef idx="1">
+            <a:schemeClr val="accent1"/>
+          </a:fillRef>
+          <a:effectRef idx="0">
+            <a:schemeClr val="accent1"/>
+          </a:effectRef>
+          <a:fontRef idx="minor">
+            <a:schemeClr val="lt1"/>
+          </a:fontRef>
+        </p:style>
+        <p:txBody>
+          <a:bodyPr rtlCol="0" anchor="ctr"/>
+          <a:lstStyle/>
+          <a:p>
+            <a:pPr algn="ctr"/>
+            <a:r>
+              <a:rPr lang="fr-FR" dirty="0" smtClean="0"/>
+              <a:t>Display </a:t>
+            </a:r>
+            <a:r>
+              <a:rPr lang="fr-FR" dirty="0" err="1" smtClean="0"/>
+              <a:t>list</a:t>
+            </a:r>
+            <a:r>
+              <a:rPr lang="fr-FR" dirty="0" smtClean="0"/>
+              <a:t> of messages </a:t>
+            </a:r>
+            <a:r>
+              <a:rPr lang="fr-FR" dirty="0" err="1" smtClean="0"/>
+              <a:t>received</a:t>
+            </a:r>
+            <a:endParaRPr lang="fr-FR" dirty="0"/>
+          </a:p>
+        </p:txBody>
+      </p:sp>
+      <p:cxnSp>
+        <p:nvCxnSpPr>
+          <p:cNvPr id="35" name="Straight Arrow Connector 34"/>
+          <p:cNvCxnSpPr>
+            <a:stCxn id="33" idx="3"/>
+            <a:endCxn id="34" idx="1"/>
+          </p:cNvCxnSpPr>
+          <p:nvPr/>
+        </p:nvCxnSpPr>
+        <p:spPr>
+          <a:xfrm>
+            <a:off x="1902142" y="5050536"/>
+            <a:ext cx="334614" cy="0"/>
+          </a:xfrm>
+          <a:prstGeom prst="straightConnector1">
+            <a:avLst/>
+          </a:prstGeom>
+          <a:ln>
+            <a:tailEnd type="triangle"/>
+          </a:ln>
+        </p:spPr>
+        <p:style>
+          <a:lnRef idx="1">
+            <a:schemeClr val="accent1"/>
+          </a:lnRef>
+          <a:fillRef idx="0">
+            <a:schemeClr val="accent1"/>
+          </a:fillRef>
+          <a:effectRef idx="0">
+            <a:schemeClr val="accent1"/>
+          </a:effectRef>
+          <a:fontRef idx="minor">
+            <a:schemeClr val="tx1"/>
+          </a:fontRef>
+        </p:style>
+      </p:cxnSp>
+      <p:sp>
+        <p:nvSpPr>
+          <p:cNvPr id="36" name="Rectangle 35"/>
+          <p:cNvSpPr/>
+          <p:nvPr/>
+        </p:nvSpPr>
+        <p:spPr>
+          <a:xfrm>
+            <a:off x="4269533" y="4596384"/>
+            <a:ext cx="1645920" cy="908304"/>
+          </a:xfrm>
+          <a:prstGeom prst="rect">
+            <a:avLst/>
+          </a:prstGeom>
+        </p:spPr>
+        <p:style>
+          <a:lnRef idx="2">
+            <a:schemeClr val="accent1">
+              <a:shade val="50000"/>
+            </a:schemeClr>
+          </a:lnRef>
+          <a:fillRef idx="1">
+            <a:schemeClr val="accent1"/>
+          </a:fillRef>
+          <a:effectRef idx="0">
+            <a:schemeClr val="accent1"/>
+          </a:effectRef>
+          <a:fontRef idx="minor">
+            <a:schemeClr val="lt1"/>
+          </a:fontRef>
+        </p:style>
+        <p:txBody>
+          <a:bodyPr rtlCol="0" anchor="ctr"/>
+          <a:lstStyle/>
+          <a:p>
+            <a:pPr algn="ctr"/>
+            <a:r>
+              <a:rPr lang="fr-FR" dirty="0" smtClean="0">
+                <a:solidFill>
+                  <a:schemeClr val="bg1"/>
+                </a:solidFill>
+              </a:rPr>
+              <a:t>Select a message sent </a:t>
+            </a:r>
+            <a:r>
+              <a:rPr lang="fr-FR" dirty="0" err="1" smtClean="0">
+                <a:solidFill>
+                  <a:schemeClr val="bg1"/>
+                </a:solidFill>
+              </a:rPr>
+              <a:t>from</a:t>
+            </a:r>
+            <a:r>
+              <a:rPr lang="fr-FR" dirty="0" smtClean="0">
+                <a:solidFill>
+                  <a:schemeClr val="bg1"/>
+                </a:solidFill>
+              </a:rPr>
+              <a:t> </a:t>
+            </a:r>
+            <a:r>
+              <a:rPr lang="fr-FR" dirty="0" err="1" smtClean="0">
+                <a:solidFill>
+                  <a:schemeClr val="bg1"/>
+                </a:solidFill>
+              </a:rPr>
+              <a:t>students</a:t>
+            </a:r>
+            <a:endParaRPr lang="fr-FR" dirty="0">
+              <a:solidFill>
+                <a:schemeClr val="bg1"/>
+              </a:solidFill>
+            </a:endParaRPr>
+          </a:p>
+        </p:txBody>
+      </p:sp>
+      <p:cxnSp>
+        <p:nvCxnSpPr>
+          <p:cNvPr id="37" name="Straight Arrow Connector 36"/>
+          <p:cNvCxnSpPr>
+            <a:stCxn id="34" idx="3"/>
+            <a:endCxn id="36" idx="1"/>
+          </p:cNvCxnSpPr>
+          <p:nvPr/>
+        </p:nvCxnSpPr>
+        <p:spPr>
+          <a:xfrm>
+            <a:off x="3817525" y="5050536"/>
+            <a:ext cx="452008" cy="0"/>
+          </a:xfrm>
+          <a:prstGeom prst="straightConnector1">
+            <a:avLst/>
+          </a:prstGeom>
+          <a:ln>
+            <a:tailEnd type="triangle"/>
+          </a:ln>
+        </p:spPr>
+        <p:style>
+          <a:lnRef idx="1">
+            <a:schemeClr val="accent1"/>
+          </a:lnRef>
+          <a:fillRef idx="0">
+            <a:schemeClr val="accent1"/>
+          </a:fillRef>
+          <a:effectRef idx="0">
+            <a:schemeClr val="accent1"/>
+          </a:effectRef>
+          <a:fontRef idx="minor">
+            <a:schemeClr val="tx1"/>
+          </a:fontRef>
+        </p:style>
+      </p:cxnSp>
+      <p:sp>
+        <p:nvSpPr>
+          <p:cNvPr id="38" name="Rectangle 37"/>
+          <p:cNvSpPr/>
+          <p:nvPr/>
+        </p:nvSpPr>
+        <p:spPr>
+          <a:xfrm>
+            <a:off x="6366126" y="4608576"/>
+            <a:ext cx="1413226" cy="896112"/>
+          </a:xfrm>
+          <a:prstGeom prst="rect">
+            <a:avLst/>
+          </a:prstGeom>
+        </p:spPr>
+        <p:style>
+          <a:lnRef idx="2">
+            <a:schemeClr val="accent1">
+              <a:shade val="50000"/>
+            </a:schemeClr>
+          </a:lnRef>
+          <a:fillRef idx="1">
+            <a:schemeClr val="accent1"/>
+          </a:fillRef>
+          <a:effectRef idx="0">
+            <a:schemeClr val="accent1"/>
+          </a:effectRef>
+          <a:fontRef idx="minor">
+            <a:schemeClr val="lt1"/>
+          </a:fontRef>
+        </p:style>
+        <p:txBody>
+          <a:bodyPr rtlCol="0" anchor="ctr"/>
+          <a:lstStyle/>
+          <a:p>
+            <a:pPr algn="ctr"/>
+            <a:r>
+              <a:rPr lang="fr-FR" dirty="0" smtClean="0">
+                <a:solidFill>
+                  <a:srgbClr val="FF0000"/>
+                </a:solidFill>
+              </a:rPr>
+              <a:t>Select </a:t>
+            </a:r>
+            <a:r>
+              <a:rPr lang="fr-FR" dirty="0" err="1" smtClean="0">
+                <a:solidFill>
+                  <a:srgbClr val="FF0000"/>
+                </a:solidFill>
+              </a:rPr>
+              <a:t>reply</a:t>
+            </a:r>
+            <a:r>
+              <a:rPr lang="fr-FR" dirty="0" smtClean="0">
+                <a:solidFill>
+                  <a:srgbClr val="FF0000"/>
+                </a:solidFill>
+              </a:rPr>
+              <a:t> back</a:t>
+            </a:r>
+            <a:endParaRPr lang="fr-FR" dirty="0">
+              <a:solidFill>
+                <a:srgbClr val="FF0000"/>
+              </a:solidFill>
+            </a:endParaRPr>
+          </a:p>
+        </p:txBody>
+      </p:sp>
+      <p:cxnSp>
+        <p:nvCxnSpPr>
+          <p:cNvPr id="39" name="Straight Arrow Connector 38"/>
+          <p:cNvCxnSpPr>
+            <a:stCxn id="36" idx="3"/>
+            <a:endCxn id="38" idx="1"/>
+          </p:cNvCxnSpPr>
+          <p:nvPr/>
+        </p:nvCxnSpPr>
+        <p:spPr>
+          <a:xfrm>
+            <a:off x="5915453" y="5050536"/>
+            <a:ext cx="450673" cy="6096"/>
+          </a:xfrm>
+          <a:prstGeom prst="straightConnector1">
+            <a:avLst/>
+          </a:prstGeom>
+          <a:ln>
+            <a:tailEnd type="triangle"/>
+          </a:ln>
+        </p:spPr>
+        <p:style>
+          <a:lnRef idx="1">
+            <a:schemeClr val="accent1"/>
+          </a:lnRef>
+          <a:fillRef idx="0">
+            <a:schemeClr val="accent1"/>
+          </a:fillRef>
+          <a:effectRef idx="0">
+            <a:schemeClr val="accent1"/>
+          </a:effectRef>
+          <a:fontRef idx="minor">
+            <a:schemeClr val="tx1"/>
+          </a:fontRef>
+        </p:style>
+      </p:cxnSp>
+      <p:sp>
+        <p:nvSpPr>
+          <p:cNvPr id="40" name="Rectangle 39"/>
+          <p:cNvSpPr/>
+          <p:nvPr/>
+        </p:nvSpPr>
+        <p:spPr>
+          <a:xfrm>
+            <a:off x="10439021" y="5398008"/>
+            <a:ext cx="1069469" cy="810768"/>
+          </a:xfrm>
+          <a:prstGeom prst="rect">
+            <a:avLst/>
+          </a:prstGeom>
+        </p:spPr>
+        <p:style>
+          <a:lnRef idx="2">
+            <a:schemeClr val="accent1">
+              <a:shade val="50000"/>
+            </a:schemeClr>
+          </a:lnRef>
+          <a:fillRef idx="1">
+            <a:schemeClr val="accent1"/>
+          </a:fillRef>
+          <a:effectRef idx="0">
+            <a:schemeClr val="accent1"/>
+          </a:effectRef>
+          <a:fontRef idx="minor">
+            <a:schemeClr val="lt1"/>
+          </a:fontRef>
+        </p:style>
+        <p:txBody>
+          <a:bodyPr rtlCol="0" anchor="ctr"/>
+          <a:lstStyle/>
+          <a:p>
+            <a:pPr algn="ctr"/>
+            <a:r>
+              <a:rPr lang="fr-FR" dirty="0" err="1" smtClean="0"/>
+              <a:t>Send</a:t>
+            </a:r>
+            <a:endParaRPr lang="fr-FR" dirty="0"/>
+          </a:p>
+        </p:txBody>
+      </p:sp>
+      <p:sp>
+        <p:nvSpPr>
+          <p:cNvPr id="41" name="Rectangle 40"/>
+          <p:cNvSpPr/>
+          <p:nvPr/>
+        </p:nvSpPr>
+        <p:spPr>
+          <a:xfrm>
+            <a:off x="10439021" y="4187952"/>
+            <a:ext cx="1334738" cy="762000"/>
+          </a:xfrm>
+          <a:prstGeom prst="rect">
+            <a:avLst/>
+          </a:prstGeom>
+        </p:spPr>
+        <p:style>
+          <a:lnRef idx="2">
+            <a:schemeClr val="accent1">
+              <a:shade val="50000"/>
+            </a:schemeClr>
+          </a:lnRef>
+          <a:fillRef idx="1">
+            <a:schemeClr val="accent1"/>
+          </a:fillRef>
+          <a:effectRef idx="0">
+            <a:schemeClr val="accent1"/>
+          </a:effectRef>
+          <a:fontRef idx="minor">
+            <a:schemeClr val="lt1"/>
+          </a:fontRef>
+        </p:style>
+        <p:txBody>
+          <a:bodyPr rtlCol="0" anchor="ctr"/>
+          <a:lstStyle/>
+          <a:p>
+            <a:pPr algn="ctr"/>
+            <a:r>
+              <a:rPr lang="fr-FR" dirty="0" smtClean="0"/>
+              <a:t>Save </a:t>
+            </a:r>
+            <a:r>
+              <a:rPr lang="fr-FR" dirty="0" err="1" smtClean="0"/>
+              <a:t>draft</a:t>
+            </a:r>
+            <a:endParaRPr lang="fr-FR" dirty="0"/>
+          </a:p>
+        </p:txBody>
+      </p:sp>
+      <p:cxnSp>
+        <p:nvCxnSpPr>
+          <p:cNvPr id="42" name="Straight Arrow Connector 41"/>
+          <p:cNvCxnSpPr>
+            <a:stCxn id="65" idx="3"/>
+            <a:endCxn id="41" idx="1"/>
+          </p:cNvCxnSpPr>
+          <p:nvPr/>
+        </p:nvCxnSpPr>
+        <p:spPr>
+          <a:xfrm flipV="1">
+            <a:off x="9732408" y="4568952"/>
+            <a:ext cx="706613" cy="487680"/>
+          </a:xfrm>
+          <a:prstGeom prst="straightConnector1">
+            <a:avLst/>
+          </a:prstGeom>
+          <a:ln>
+            <a:tailEnd type="triangle"/>
+          </a:ln>
+        </p:spPr>
+        <p:style>
+          <a:lnRef idx="1">
+            <a:schemeClr val="accent1"/>
+          </a:lnRef>
+          <a:fillRef idx="0">
+            <a:schemeClr val="accent1"/>
+          </a:fillRef>
+          <a:effectRef idx="0">
+            <a:schemeClr val="accent1"/>
+          </a:effectRef>
+          <a:fontRef idx="minor">
+            <a:schemeClr val="tx1"/>
+          </a:fontRef>
+        </p:style>
+      </p:cxnSp>
+      <p:cxnSp>
+        <p:nvCxnSpPr>
+          <p:cNvPr id="43" name="Straight Arrow Connector 42"/>
+          <p:cNvCxnSpPr>
+            <a:stCxn id="65" idx="3"/>
+            <a:endCxn id="40" idx="1"/>
+          </p:cNvCxnSpPr>
+          <p:nvPr/>
+        </p:nvCxnSpPr>
+        <p:spPr>
+          <a:xfrm>
+            <a:off x="9732408" y="5056632"/>
+            <a:ext cx="706613" cy="746760"/>
+          </a:xfrm>
+          <a:prstGeom prst="straightConnector1">
+            <a:avLst/>
+          </a:prstGeom>
+          <a:ln>
+            <a:tailEnd type="triangle"/>
+          </a:ln>
+        </p:spPr>
+        <p:style>
+          <a:lnRef idx="1">
+            <a:schemeClr val="accent1"/>
+          </a:lnRef>
+          <a:fillRef idx="0">
+            <a:schemeClr val="accent1"/>
+          </a:fillRef>
+          <a:effectRef idx="0">
+            <a:schemeClr val="accent1"/>
+          </a:effectRef>
+          <a:fontRef idx="minor">
+            <a:schemeClr val="tx1"/>
+          </a:fontRef>
+        </p:style>
+      </p:cxnSp>
+      <p:sp>
+        <p:nvSpPr>
+          <p:cNvPr id="45" name="TextBox 44"/>
+          <p:cNvSpPr txBox="1"/>
+          <p:nvPr/>
+        </p:nvSpPr>
+        <p:spPr>
+          <a:xfrm>
+            <a:off x="2182368" y="6352032"/>
+            <a:ext cx="5049011" cy="369332"/>
+          </a:xfrm>
+          <a:prstGeom prst="rect">
+            <a:avLst/>
+          </a:prstGeom>
+          <a:noFill/>
+        </p:spPr>
+        <p:txBody>
+          <a:bodyPr wrap="none" rtlCol="0">
+            <a:spAutoFit/>
+          </a:bodyPr>
+          <a:lstStyle/>
+          <a:p>
+            <a:r>
+              <a:rPr lang="fr-FR" dirty="0" smtClean="0">
+                <a:solidFill>
+                  <a:srgbClr val="FF0000"/>
+                </a:solidFill>
+              </a:rPr>
+              <a:t>* How </a:t>
+            </a:r>
+            <a:r>
+              <a:rPr lang="fr-FR" dirty="0" err="1" smtClean="0">
+                <a:solidFill>
+                  <a:srgbClr val="FF0000"/>
+                </a:solidFill>
+              </a:rPr>
+              <a:t>can</a:t>
+            </a:r>
+            <a:r>
+              <a:rPr lang="fr-FR" dirty="0" smtClean="0">
+                <a:solidFill>
+                  <a:srgbClr val="FF0000"/>
+                </a:solidFill>
+              </a:rPr>
+              <a:t> </a:t>
+            </a:r>
+            <a:r>
+              <a:rPr lang="fr-FR" dirty="0" err="1" smtClean="0">
+                <a:solidFill>
+                  <a:srgbClr val="FF0000"/>
+                </a:solidFill>
+              </a:rPr>
+              <a:t>we</a:t>
+            </a:r>
+            <a:r>
+              <a:rPr lang="fr-FR" dirty="0" smtClean="0">
+                <a:solidFill>
+                  <a:srgbClr val="FF0000"/>
+                </a:solidFill>
+              </a:rPr>
+              <a:t> block </a:t>
+            </a:r>
+            <a:r>
+              <a:rPr lang="fr-FR" dirty="0" err="1" smtClean="0">
+                <a:solidFill>
+                  <a:srgbClr val="FF0000"/>
+                </a:solidFill>
+              </a:rPr>
+              <a:t>teachers</a:t>
+            </a:r>
+            <a:r>
+              <a:rPr lang="fr-FR" dirty="0" smtClean="0">
+                <a:solidFill>
+                  <a:srgbClr val="FF0000"/>
+                </a:solidFill>
+              </a:rPr>
+              <a:t> to </a:t>
+            </a:r>
+            <a:r>
+              <a:rPr lang="fr-FR" dirty="0" err="1" smtClean="0">
+                <a:solidFill>
+                  <a:srgbClr val="FF0000"/>
+                </a:solidFill>
+              </a:rPr>
+              <a:t>add</a:t>
+            </a:r>
+            <a:r>
+              <a:rPr lang="fr-FR" dirty="0" smtClean="0">
+                <a:solidFill>
+                  <a:srgbClr val="FF0000"/>
+                </a:solidFill>
+              </a:rPr>
+              <a:t> the class alias? </a:t>
+            </a:r>
+            <a:endParaRPr lang="fr-FR" dirty="0">
+              <a:solidFill>
+                <a:srgbClr val="FF0000"/>
+              </a:solidFill>
+            </a:endParaRPr>
+          </a:p>
+        </p:txBody>
+      </p:sp>
+      <p:sp>
+        <p:nvSpPr>
+          <p:cNvPr id="65" name="Rectangle 64"/>
+          <p:cNvSpPr/>
+          <p:nvPr/>
+        </p:nvSpPr>
+        <p:spPr>
+          <a:xfrm>
+            <a:off x="8319182" y="4608576"/>
+            <a:ext cx="1413226" cy="896112"/>
+          </a:xfrm>
+          <a:prstGeom prst="rect">
+            <a:avLst/>
+          </a:prstGeom>
+        </p:spPr>
+        <p:style>
+          <a:lnRef idx="2">
+            <a:schemeClr val="accent1">
+              <a:shade val="50000"/>
+            </a:schemeClr>
+          </a:lnRef>
+          <a:fillRef idx="1">
+            <a:schemeClr val="accent1"/>
+          </a:fillRef>
+          <a:effectRef idx="0">
+            <a:schemeClr val="accent1"/>
+          </a:effectRef>
+          <a:fontRef idx="minor">
+            <a:schemeClr val="lt1"/>
+          </a:fontRef>
+        </p:style>
+        <p:txBody>
+          <a:bodyPr rtlCol="0" anchor="ctr"/>
+          <a:lstStyle/>
+          <a:p>
+            <a:pPr algn="ctr"/>
+            <a:r>
+              <a:rPr lang="fr-FR" dirty="0" smtClean="0">
+                <a:solidFill>
+                  <a:schemeClr val="tx1"/>
+                </a:solidFill>
+              </a:rPr>
+              <a:t>Compose </a:t>
+            </a:r>
+            <a:r>
+              <a:rPr lang="fr-FR" dirty="0" err="1" smtClean="0">
+                <a:solidFill>
+                  <a:schemeClr val="tx1"/>
+                </a:solidFill>
+              </a:rPr>
+              <a:t>reply</a:t>
+            </a:r>
+            <a:r>
+              <a:rPr lang="fr-FR" dirty="0" smtClean="0">
+                <a:solidFill>
+                  <a:schemeClr val="tx1"/>
+                </a:solidFill>
+              </a:rPr>
+              <a:t> message</a:t>
+            </a:r>
+            <a:endParaRPr lang="fr-FR" dirty="0">
+              <a:solidFill>
+                <a:schemeClr val="tx1"/>
+              </a:solidFill>
+            </a:endParaRPr>
+          </a:p>
+        </p:txBody>
+      </p:sp>
+      <p:cxnSp>
+        <p:nvCxnSpPr>
+          <p:cNvPr id="67" name="Straight Arrow Connector 66"/>
+          <p:cNvCxnSpPr>
+            <a:stCxn id="38" idx="3"/>
+            <a:endCxn id="65" idx="1"/>
+          </p:cNvCxnSpPr>
+          <p:nvPr/>
+        </p:nvCxnSpPr>
+        <p:spPr>
+          <a:xfrm>
+            <a:off x="7779352" y="5056632"/>
+            <a:ext cx="539830" cy="0"/>
           </a:xfrm>
           <a:prstGeom prst="straightConnector1">
             <a:avLst/>
@@ -4963,19 +6510,14 @@
             <p:ph type="title"/>
           </p:nvPr>
         </p:nvSpPr>
-        <p:spPr>
-          <a:xfrm>
-            <a:off x="826008" y="430498"/>
-            <a:ext cx="10515600" cy="1325563"/>
-          </a:xfrm>
-        </p:spPr>
+        <p:spPr/>
         <p:txBody>
           <a:bodyPr/>
           <a:lstStyle/>
           <a:p>
             <a:r>
               <a:rPr lang="fr-FR" dirty="0" smtClean="0"/>
-              <a:t>Class info – Pri2</a:t>
+              <a:t>Q&amp;A flow – Pri2</a:t>
             </a:r>
             <a:endParaRPr lang="fr-FR" dirty="0"/>
           </a:p>
@@ -4983,14 +6525,14 @@
       </p:sp>
       <p:sp>
         <p:nvSpPr>
-          <p:cNvPr id="4" name="Rectangle 3"/>
+          <p:cNvPr id="3" name="Rectangle 2"/>
           <p:cNvSpPr/>
           <p:nvPr/>
         </p:nvSpPr>
         <p:spPr>
           <a:xfrm>
-            <a:off x="306705" y="2614446"/>
-            <a:ext cx="1574673" cy="864156"/>
+            <a:off x="509016" y="2005267"/>
+            <a:ext cx="1597152" cy="755904"/>
           </a:xfrm>
           <a:prstGeom prst="rect">
             <a:avLst/>
@@ -5019,7 +6561,7 @@
             <a:pPr algn="ctr"/>
             <a:r>
               <a:rPr lang="fr-FR" dirty="0" smtClean="0"/>
-              <a:t>Select Class tab</a:t>
+              <a:t>Select FAQ tab</a:t>
             </a:r>
             <a:endParaRPr lang="fr-FR" dirty="0"/>
           </a:p>
@@ -5027,14 +6569,14 @@
       </p:sp>
       <p:sp>
         <p:nvSpPr>
-          <p:cNvPr id="5" name="Rectangle 4"/>
+          <p:cNvPr id="4" name="Rectangle 3"/>
           <p:cNvSpPr/>
           <p:nvPr/>
         </p:nvSpPr>
         <p:spPr>
           <a:xfrm>
-            <a:off x="4477512" y="2445630"/>
-            <a:ext cx="1994916" cy="1194816"/>
+            <a:off x="2712686" y="2011618"/>
+            <a:ext cx="1597152" cy="755904"/>
           </a:xfrm>
           <a:prstGeom prst="rect">
             <a:avLst/>
@@ -5062,12 +6604,8 @@
           <a:p>
             <a:pPr algn="ctr"/>
             <a:r>
-              <a:rPr lang="fr-FR" dirty="0" err="1" smtClean="0"/>
-              <a:t>View</a:t>
-            </a:r>
-            <a:r>
-              <a:rPr lang="fr-FR" dirty="0" smtClean="0"/>
-              <a:t> </a:t>
+              <a:rPr lang="fr-FR" dirty="0" smtClean="0"/>
+              <a:t>Display </a:t>
             </a:r>
             <a:r>
               <a:rPr lang="fr-FR" dirty="0" err="1" smtClean="0"/>
@@ -5075,66 +6613,26 @@
             </a:r>
             <a:r>
               <a:rPr lang="fr-FR" dirty="0" smtClean="0"/>
-              <a:t> of classes (public and </a:t>
+              <a:t> of Question </a:t>
             </a:r>
             <a:r>
               <a:rPr lang="fr-FR" dirty="0" err="1" smtClean="0"/>
-              <a:t>private</a:t>
-            </a:r>
-            <a:r>
-              <a:rPr lang="fr-FR" dirty="0" smtClean="0"/>
-              <a:t>)</a:t>
+              <a:t>title</a:t>
             </a:r>
             <a:endParaRPr lang="fr-FR" dirty="0"/>
           </a:p>
         </p:txBody>
       </p:sp>
-      <p:cxnSp>
-        <p:nvCxnSpPr>
-          <p:cNvPr id="7" name="Straight Arrow Connector 6"/>
-          <p:cNvCxnSpPr>
-            <a:stCxn id="4" idx="3"/>
-            <a:endCxn id="28" idx="1"/>
-          </p:cNvCxnSpPr>
-          <p:nvPr/>
-        </p:nvCxnSpPr>
-        <p:spPr>
-          <a:xfrm flipV="1">
-            <a:off x="1881378" y="3043039"/>
-            <a:ext cx="500634" cy="3485"/>
-          </a:xfrm>
-          <a:prstGeom prst="straightConnector1">
-            <a:avLst/>
-          </a:prstGeom>
-          <a:ln>
-            <a:tailEnd type="triangle"/>
-          </a:ln>
-        </p:spPr>
-        <p:style>
-          <a:lnRef idx="1">
-            <a:schemeClr val="accent1"/>
-          </a:lnRef>
-          <a:fillRef idx="0">
-            <a:schemeClr val="accent1"/>
-          </a:fillRef>
-          <a:effectRef idx="0">
-            <a:schemeClr val="accent1"/>
-          </a:effectRef>
-          <a:fontRef idx="minor">
-            <a:schemeClr val="tx1"/>
-          </a:fontRef>
-        </p:style>
-      </p:cxnSp>
-      <p:sp>
-        <p:nvSpPr>
-          <p:cNvPr id="6" name="Rectangle 5"/>
+      <p:sp>
+        <p:nvSpPr>
+          <p:cNvPr id="8" name="Rectangle 7"/>
           <p:cNvSpPr/>
           <p:nvPr/>
         </p:nvSpPr>
         <p:spPr>
           <a:xfrm>
-            <a:off x="7543038" y="1778968"/>
-            <a:ext cx="1994916" cy="1194816"/>
+            <a:off x="7528458" y="2023872"/>
+            <a:ext cx="1597152" cy="755904"/>
           </a:xfrm>
           <a:prstGeom prst="rect">
             <a:avLst/>
@@ -5162,79 +6660,27 @@
           <a:p>
             <a:pPr algn="ctr"/>
             <a:r>
-              <a:rPr lang="fr-FR" altLang="zh-CN" dirty="0" smtClean="0"/>
-              <a:t>For public classes, show </a:t>
-            </a:r>
-            <a:r>
-              <a:rPr lang="fr-FR" altLang="zh-CN" dirty="0" err="1" smtClean="0"/>
-              <a:t>teacher</a:t>
-            </a:r>
-            <a:r>
-              <a:rPr lang="fr-FR" altLang="zh-CN" dirty="0" smtClean="0"/>
-              <a:t> and </a:t>
-            </a:r>
-            <a:r>
-              <a:rPr lang="fr-FR" altLang="zh-CN" dirty="0" err="1" smtClean="0"/>
-              <a:t>list</a:t>
-            </a:r>
-            <a:r>
-              <a:rPr lang="fr-FR" altLang="zh-CN" dirty="0" smtClean="0"/>
-              <a:t> of </a:t>
-            </a:r>
-            <a:r>
-              <a:rPr lang="fr-FR" altLang="zh-CN" dirty="0" err="1" smtClean="0"/>
-              <a:t>students</a:t>
+              <a:rPr lang="fr-FR" dirty="0" smtClean="0"/>
+              <a:t>Input question and </a:t>
+            </a:r>
+            <a:r>
+              <a:rPr lang="fr-FR" dirty="0" err="1" smtClean="0"/>
+              <a:t>answer</a:t>
             </a:r>
             <a:endParaRPr lang="fr-FR" dirty="0"/>
           </a:p>
         </p:txBody>
       </p:sp>
-      <p:cxnSp>
-        <p:nvCxnSpPr>
-          <p:cNvPr id="8" name="Straight Arrow Connector 7"/>
-          <p:cNvCxnSpPr>
-            <a:stCxn id="5" idx="3"/>
-            <a:endCxn id="6" idx="1"/>
-          </p:cNvCxnSpPr>
-          <p:nvPr/>
-        </p:nvCxnSpPr>
-        <p:spPr>
-          <a:xfrm flipV="1">
-            <a:off x="6472428" y="2376376"/>
-            <a:ext cx="1070610" cy="666662"/>
-          </a:xfrm>
-          <a:prstGeom prst="straightConnector1">
-            <a:avLst/>
-          </a:prstGeom>
-          <a:ln>
-            <a:tailEnd type="triangle"/>
-          </a:ln>
-        </p:spPr>
-        <p:style>
-          <a:lnRef idx="1">
-            <a:schemeClr val="accent1"/>
-          </a:lnRef>
-          <a:fillRef idx="0">
-            <a:schemeClr val="accent1"/>
-          </a:fillRef>
-          <a:effectRef idx="0">
-            <a:schemeClr val="accent1"/>
-          </a:effectRef>
-          <a:fontRef idx="minor">
-            <a:schemeClr val="tx1"/>
-          </a:fontRef>
-        </p:style>
-      </p:cxnSp>
-      <p:sp>
-        <p:nvSpPr>
-          <p:cNvPr id="12" name="Rectangle 11"/>
+      <p:sp>
+        <p:nvSpPr>
+          <p:cNvPr id="9" name="Rectangle 8"/>
           <p:cNvSpPr/>
           <p:nvPr/>
         </p:nvSpPr>
         <p:spPr>
           <a:xfrm>
-            <a:off x="7522464" y="3396933"/>
-            <a:ext cx="1994916" cy="1194816"/>
+            <a:off x="10008006" y="1224979"/>
+            <a:ext cx="1597152" cy="755904"/>
           </a:xfrm>
           <a:prstGeom prst="rect">
             <a:avLst/>
@@ -5262,38 +6708,100 @@
           <a:p>
             <a:pPr algn="ctr"/>
             <a:r>
-              <a:rPr lang="fr-FR" altLang="zh-CN" dirty="0" smtClean="0"/>
-              <a:t>For </a:t>
-            </a:r>
-            <a:r>
-              <a:rPr lang="fr-FR" altLang="zh-CN" dirty="0" err="1" smtClean="0"/>
-              <a:t>privtae</a:t>
-            </a:r>
-            <a:r>
-              <a:rPr lang="fr-FR" altLang="zh-CN" dirty="0" smtClean="0"/>
-              <a:t> classes, show </a:t>
-            </a:r>
-            <a:r>
-              <a:rPr lang="fr-FR" altLang="zh-CN" dirty="0" err="1" smtClean="0"/>
-              <a:t>teacher</a:t>
+              <a:rPr lang="fr-FR" dirty="0" smtClean="0"/>
+              <a:t>Save </a:t>
+            </a:r>
+            <a:r>
+              <a:rPr lang="fr-FR" dirty="0" err="1" smtClean="0"/>
+              <a:t>draft</a:t>
             </a:r>
             <a:endParaRPr lang="fr-FR" dirty="0"/>
           </a:p>
         </p:txBody>
       </p:sp>
+      <p:cxnSp>
+        <p:nvCxnSpPr>
+          <p:cNvPr id="10" name="Straight Arrow Connector 9"/>
+          <p:cNvCxnSpPr>
+            <a:stCxn id="3" idx="3"/>
+            <a:endCxn id="4" idx="1"/>
+          </p:cNvCxnSpPr>
+          <p:nvPr/>
+        </p:nvCxnSpPr>
+        <p:spPr>
+          <a:xfrm>
+            <a:off x="2106168" y="2383219"/>
+            <a:ext cx="606518" cy="6351"/>
+          </a:xfrm>
+          <a:prstGeom prst="straightConnector1">
+            <a:avLst/>
+          </a:prstGeom>
+          <a:ln>
+            <a:tailEnd type="triangle"/>
+          </a:ln>
+        </p:spPr>
+        <p:style>
+          <a:lnRef idx="1">
+            <a:schemeClr val="accent1"/>
+          </a:lnRef>
+          <a:fillRef idx="0">
+            <a:schemeClr val="accent1"/>
+          </a:fillRef>
+          <a:effectRef idx="0">
+            <a:schemeClr val="accent1"/>
+          </a:effectRef>
+          <a:fontRef idx="minor">
+            <a:schemeClr val="tx1"/>
+          </a:fontRef>
+        </p:style>
+      </p:cxnSp>
+      <p:cxnSp>
+        <p:nvCxnSpPr>
+          <p:cNvPr id="11" name="Straight Arrow Connector 10"/>
+          <p:cNvCxnSpPr>
+            <a:stCxn id="4" idx="3"/>
+          </p:cNvCxnSpPr>
+          <p:nvPr/>
+        </p:nvCxnSpPr>
+        <p:spPr>
+          <a:xfrm>
+            <a:off x="4309838" y="2389570"/>
+            <a:ext cx="635508" cy="0"/>
+          </a:xfrm>
+          <a:prstGeom prst="straightConnector1">
+            <a:avLst/>
+          </a:prstGeom>
+          <a:ln>
+            <a:tailEnd type="triangle"/>
+          </a:ln>
+        </p:spPr>
+        <p:style>
+          <a:lnRef idx="1">
+            <a:schemeClr val="accent1"/>
+          </a:lnRef>
+          <a:fillRef idx="0">
+            <a:schemeClr val="accent1"/>
+          </a:fillRef>
+          <a:effectRef idx="0">
+            <a:schemeClr val="accent1"/>
+          </a:effectRef>
+          <a:fontRef idx="minor">
+            <a:schemeClr val="tx1"/>
+          </a:fontRef>
+        </p:style>
+      </p:cxnSp>
       <p:cxnSp>
         <p:nvCxnSpPr>
           <p:cNvPr id="14" name="Straight Arrow Connector 13"/>
           <p:cNvCxnSpPr>
-            <a:stCxn id="5" idx="3"/>
-            <a:endCxn id="12" idx="1"/>
+            <a:endCxn id="8" idx="1"/>
           </p:cNvCxnSpPr>
           <p:nvPr/>
         </p:nvCxnSpPr>
         <p:spPr>
           <a:xfrm>
-            <a:off x="6472428" y="3043038"/>
-            <a:ext cx="1050036" cy="951303"/>
+            <a:off x="6542498" y="2389570"/>
+            <a:ext cx="985960" cy="12254"/>
           </a:xfrm>
           <a:prstGeom prst="straightConnector1">
             <a:avLst/>
@@ -5317,16 +6825,52 @@
           </a:fontRef>
         </p:style>
       </p:cxnSp>
-      <p:sp>
-        <p:nvSpPr>
-          <p:cNvPr id="28" name="Rectangle 27"/>
+      <p:cxnSp>
+        <p:nvCxnSpPr>
+          <p:cNvPr id="15" name="Straight Arrow Connector 14"/>
+          <p:cNvCxnSpPr>
+            <a:stCxn id="8" idx="3"/>
+            <a:endCxn id="9" idx="1"/>
+          </p:cNvCxnSpPr>
+          <p:nvPr/>
+        </p:nvCxnSpPr>
+        <p:spPr>
+          <a:xfrm flipV="1">
+            <a:off x="9125610" y="1602931"/>
+            <a:ext cx="882396" cy="798893"/>
+          </a:xfrm>
+          <a:prstGeom prst="straightConnector1">
+            <a:avLst/>
+          </a:prstGeom>
+          <a:ln>
+            <a:tailEnd type="triangle"/>
+          </a:ln>
+        </p:spPr>
+        <p:style>
+          <a:lnRef idx="1">
+            <a:schemeClr val="accent1"/>
+          </a:lnRef>
+          <a:fillRef idx="0">
+            <a:schemeClr val="accent1"/>
+          </a:fillRef>
+          <a:effectRef idx="0">
+            <a:schemeClr val="accent1"/>
+          </a:effectRef>
+          <a:fontRef idx="minor">
+            <a:schemeClr val="tx1"/>
+          </a:fontRef>
+        </p:style>
+      </p:cxnSp>
+      <p:sp>
+        <p:nvSpPr>
+          <p:cNvPr id="21" name="Rectangle 20"/>
           <p:cNvSpPr/>
           <p:nvPr/>
         </p:nvSpPr>
         <p:spPr>
           <a:xfrm>
-            <a:off x="2382012" y="2696511"/>
-            <a:ext cx="1594866" cy="693055"/>
+            <a:off x="10008006" y="2710532"/>
+            <a:ext cx="1510284" cy="761713"/>
           </a:xfrm>
           <a:prstGeom prst="rect">
             <a:avLst/>
@@ -5354,24 +6898,8 @@
           <a:p>
             <a:pPr algn="ctr"/>
             <a:r>
-              <a:rPr lang="fr-FR" dirty="0" smtClean="0"/>
-              <a:t>Show </a:t>
-            </a:r>
-            <a:r>
               <a:rPr lang="fr-FR" dirty="0" err="1" smtClean="0"/>
-              <a:t>my</a:t>
-            </a:r>
-            <a:r>
-              <a:rPr lang="fr-FR" dirty="0" smtClean="0"/>
-              <a:t> </a:t>
-            </a:r>
-            <a:r>
-              <a:rPr lang="fr-FR" dirty="0" err="1" smtClean="0"/>
-              <a:t>joined</a:t>
-            </a:r>
-            <a:r>
-              <a:rPr lang="fr-FR" dirty="0" smtClean="0"/>
-              <a:t> classes</a:t>
+              <a:t>Publish</a:t>
             </a:r>
             <a:endParaRPr lang="fr-FR" dirty="0"/>
           </a:p>
@@ -5379,17 +6907,17 @@
       </p:sp>
       <p:cxnSp>
         <p:nvCxnSpPr>
-          <p:cNvPr id="33" name="Straight Arrow Connector 32"/>
+          <p:cNvPr id="23" name="Straight Arrow Connector 22"/>
           <p:cNvCxnSpPr>
-            <a:stCxn id="28" idx="3"/>
-            <a:endCxn id="5" idx="1"/>
+            <a:stCxn id="8" idx="3"/>
+            <a:endCxn id="21" idx="1"/>
           </p:cNvCxnSpPr>
           <p:nvPr/>
         </p:nvCxnSpPr>
         <p:spPr>
-          <a:xfrm flipV="1">
-            <a:off x="3976878" y="3043038"/>
-            <a:ext cx="500634" cy="1"/>
+          <a:xfrm>
+            <a:off x="9125610" y="2401824"/>
+            <a:ext cx="882396" cy="689565"/>
           </a:xfrm>
           <a:prstGeom prst="straightConnector1">
             <a:avLst/>
@@ -5415,14 +6943,14 @@
       </p:cxnSp>
       <p:sp>
         <p:nvSpPr>
-          <p:cNvPr id="53" name="Rectangle 52"/>
+          <p:cNvPr id="22" name="Rectangle 21"/>
           <p:cNvSpPr/>
           <p:nvPr/>
         </p:nvSpPr>
         <p:spPr>
           <a:xfrm>
-            <a:off x="10338816" y="2077672"/>
-            <a:ext cx="1621536" cy="597408"/>
+            <a:off x="4945346" y="1992155"/>
+            <a:ext cx="1597152" cy="755904"/>
           </a:xfrm>
           <a:prstGeom prst="rect">
             <a:avLst/>
@@ -5451,62 +6979,26 @@
             <a:pPr algn="ctr"/>
             <a:r>
               <a:rPr lang="fr-FR" dirty="0" smtClean="0"/>
-              <a:t>Auto-</a:t>
+              <a:t>Select to </a:t>
             </a:r>
             <a:r>
               <a:rPr lang="fr-FR" dirty="0" err="1" smtClean="0"/>
-              <a:t>join</a:t>
+              <a:t>create</a:t>
             </a:r>
             <a:endParaRPr lang="fr-FR" dirty="0"/>
           </a:p>
         </p:txBody>
       </p:sp>
-      <p:cxnSp>
-        <p:nvCxnSpPr>
-          <p:cNvPr id="55" name="Straight Arrow Connector 54"/>
-          <p:cNvCxnSpPr>
-            <a:stCxn id="6" idx="3"/>
-            <a:endCxn id="53" idx="1"/>
-          </p:cNvCxnSpPr>
-          <p:nvPr/>
-        </p:nvCxnSpPr>
-        <p:spPr>
-          <a:xfrm>
-            <a:off x="9537954" y="2376376"/>
-            <a:ext cx="800862" cy="0"/>
-          </a:xfrm>
-          <a:prstGeom prst="straightConnector1">
-            <a:avLst/>
-          </a:prstGeom>
-          <a:ln>
-            <a:tailEnd type="triangle"/>
-          </a:ln>
-        </p:spPr>
-        <p:style>
-          <a:lnRef idx="1">
-            <a:schemeClr val="accent1"/>
-          </a:lnRef>
-          <a:fillRef idx="0">
-            <a:schemeClr val="accent1"/>
-          </a:fillRef>
-          <a:effectRef idx="0">
-            <a:schemeClr val="accent1"/>
-          </a:effectRef>
-          <a:fontRef idx="minor">
-            <a:schemeClr val="tx1"/>
-          </a:fontRef>
-        </p:style>
-      </p:cxnSp>
-      <p:sp>
-        <p:nvSpPr>
-          <p:cNvPr id="64" name="Rectangle 63"/>
+      <p:sp>
+        <p:nvSpPr>
+          <p:cNvPr id="38" name="Rectangle 37"/>
           <p:cNvSpPr/>
           <p:nvPr/>
         </p:nvSpPr>
         <p:spPr>
           <a:xfrm>
-            <a:off x="10217659" y="3426349"/>
-            <a:ext cx="1816608" cy="1020557"/>
+            <a:off x="9921036" y="4033364"/>
+            <a:ext cx="1684122" cy="989740"/>
           </a:xfrm>
           <a:prstGeom prst="rect">
             <a:avLst/>
@@ -5539,127 +7031,15 @@
             </a:r>
             <a:r>
               <a:rPr lang="fr-FR" dirty="0" smtClean="0"/>
-              <a:t> </a:t>
+              <a:t> an </a:t>
             </a:r>
             <a:r>
               <a:rPr lang="fr-FR" dirty="0" err="1" smtClean="0"/>
-              <a:t>join</a:t>
-            </a:r>
-            <a:r>
-              <a:rPr lang="fr-FR" dirty="0" smtClean="0"/>
-              <a:t> </a:t>
-            </a:r>
-            <a:r>
-              <a:rPr lang="fr-FR" dirty="0" err="1" smtClean="0"/>
-              <a:t>request</a:t>
-            </a:r>
-            <a:r>
-              <a:rPr lang="fr-FR" dirty="0" smtClean="0"/>
-              <a:t> to </a:t>
-            </a:r>
-            <a:r>
-              <a:rPr lang="fr-FR" dirty="0" err="1" smtClean="0"/>
-              <a:t>teacher</a:t>
-            </a:r>
-            <a:r>
-              <a:rPr lang="fr-FR" dirty="0" smtClean="0"/>
-              <a:t> </a:t>
-            </a:r>
-            <a:r>
-              <a:rPr lang="fr-FR" dirty="0" smtClean="0">
-                <a:solidFill>
-                  <a:srgbClr val="FF0000"/>
-                </a:solidFill>
-              </a:rPr>
-              <a:t>(no </a:t>
-            </a:r>
-            <a:r>
-              <a:rPr lang="fr-FR" dirty="0" err="1" smtClean="0">
-                <a:solidFill>
-                  <a:srgbClr val="FF0000"/>
-                </a:solidFill>
-              </a:rPr>
-              <a:t>access</a:t>
-            </a:r>
-            <a:r>
-              <a:rPr lang="fr-FR" dirty="0" smtClean="0">
-                <a:solidFill>
-                  <a:srgbClr val="FF0000"/>
-                </a:solidFill>
-              </a:rPr>
-              <a:t> code </a:t>
-            </a:r>
-            <a:r>
-              <a:rPr lang="fr-FR" dirty="0" err="1" smtClean="0">
-                <a:solidFill>
-                  <a:srgbClr val="FF0000"/>
-                </a:solidFill>
-              </a:rPr>
-              <a:t>needed</a:t>
-            </a:r>
-            <a:r>
-              <a:rPr lang="fr-FR" dirty="0" smtClean="0">
-                <a:solidFill>
-                  <a:srgbClr val="FF0000"/>
-                </a:solidFill>
-              </a:rPr>
-              <a:t>?)</a:t>
-            </a:r>
-            <a:endParaRPr lang="fr-FR" dirty="0">
-              <a:solidFill>
-                <a:srgbClr val="FF0000"/>
-              </a:solidFill>
-            </a:endParaRPr>
-          </a:p>
-        </p:txBody>
-      </p:sp>
-      <p:sp>
-        <p:nvSpPr>
-          <p:cNvPr id="65" name="Rectangle 64"/>
-          <p:cNvSpPr/>
-          <p:nvPr/>
-        </p:nvSpPr>
-        <p:spPr>
-          <a:xfrm>
-            <a:off x="10189464" y="5313601"/>
-            <a:ext cx="1816608" cy="597408"/>
-          </a:xfrm>
-          <a:prstGeom prst="rect">
-            <a:avLst/>
-          </a:prstGeom>
-        </p:spPr>
-        <p:style>
-          <a:lnRef idx="2">
-            <a:schemeClr val="accent1">
-              <a:shade val="50000"/>
-            </a:schemeClr>
-          </a:lnRef>
-          <a:fillRef idx="1">
-            <a:schemeClr val="accent1"/>
-          </a:fillRef>
-          <a:effectRef idx="0">
-            <a:schemeClr val="accent1"/>
-          </a:effectRef>
-          <a:fontRef idx="minor">
-            <a:schemeClr val="lt1"/>
-          </a:fontRef>
-        </p:style>
-        <p:txBody>
-          <a:bodyPr rtlCol="0" anchor="ctr"/>
-          <a:lstStyle/>
-          <a:p>
-            <a:pPr algn="ctr"/>
-            <a:r>
-              <a:rPr lang="fr-FR" dirty="0" smtClean="0"/>
-              <a:t>Teacher </a:t>
-            </a:r>
-            <a:r>
-              <a:rPr lang="fr-FR" dirty="0" err="1" smtClean="0"/>
-              <a:t>approves</a:t>
-            </a:r>
-            <a:r>
-              <a:rPr lang="fr-FR" dirty="0" smtClean="0"/>
-              <a:t> </a:t>
+              <a:t>announcement</a:t>
+            </a:r>
+            <a:r>
+              <a:rPr lang="fr-FR" dirty="0" smtClean="0"/>
+              <a:t> to the class</a:t>
             </a:r>
             <a:endParaRPr lang="fr-FR" dirty="0"/>
           </a:p>
@@ -5667,91 +7047,19 @@
       </p:sp>
       <p:cxnSp>
         <p:nvCxnSpPr>
-          <p:cNvPr id="67" name="Straight Arrow Connector 66"/>
+          <p:cNvPr id="35" name="Straight Arrow Connector 34"/>
           <p:cNvCxnSpPr>
-            <a:stCxn id="12" idx="3"/>
-            <a:endCxn id="64" idx="1"/>
+            <a:stCxn id="21" idx="2"/>
+            <a:endCxn id="38" idx="0"/>
           </p:cNvCxnSpPr>
           <p:nvPr/>
         </p:nvCxnSpPr>
         <p:spPr>
-          <a:xfrm flipV="1">
-            <a:off x="9517380" y="3936628"/>
-            <a:ext cx="700279" cy="57713"/>
+          <a:xfrm flipH="1">
+            <a:off x="10763097" y="3472245"/>
+            <a:ext cx="51" cy="561119"/>
           </a:xfrm>
           <a:prstGeom prst="straightConnector1">
-            <a:avLst/>
-          </a:prstGeom>
-          <a:ln>
-            <a:tailEnd type="triangle"/>
-          </a:ln>
-        </p:spPr>
-        <p:style>
-          <a:lnRef idx="1">
-            <a:schemeClr val="accent1"/>
-          </a:lnRef>
-          <a:fillRef idx="0">
-            <a:schemeClr val="accent1"/>
-          </a:fillRef>
-          <a:effectRef idx="0">
-            <a:schemeClr val="accent1"/>
-          </a:effectRef>
-          <a:fontRef idx="minor">
-            <a:schemeClr val="tx1"/>
-          </a:fontRef>
-        </p:style>
-      </p:cxnSp>
-      <p:cxnSp>
-        <p:nvCxnSpPr>
-          <p:cNvPr id="70" name="Straight Arrow Connector 69"/>
-          <p:cNvCxnSpPr>
-            <a:stCxn id="64" idx="2"/>
-            <a:endCxn id="65" idx="0"/>
-          </p:cNvCxnSpPr>
-          <p:nvPr/>
-        </p:nvCxnSpPr>
-        <p:spPr>
-          <a:xfrm flipH="1">
-            <a:off x="11097768" y="4446906"/>
-            <a:ext cx="28195" cy="866695"/>
-          </a:xfrm>
-          <a:prstGeom prst="straightConnector1">
-            <a:avLst/>
-          </a:prstGeom>
-          <a:ln>
-            <a:tailEnd type="triangle"/>
-          </a:ln>
-        </p:spPr>
-        <p:style>
-          <a:lnRef idx="1">
-            <a:schemeClr val="accent1"/>
-          </a:lnRef>
-          <a:fillRef idx="0">
-            <a:schemeClr val="accent1"/>
-          </a:fillRef>
-          <a:effectRef idx="0">
-            <a:schemeClr val="accent1"/>
-          </a:effectRef>
-          <a:fontRef idx="minor">
-            <a:schemeClr val="tx1"/>
-          </a:fontRef>
-        </p:style>
-      </p:cxnSp>
-      <p:cxnSp>
-        <p:nvCxnSpPr>
-          <p:cNvPr id="73" name="Elbow Connector 72"/>
-          <p:cNvCxnSpPr>
-            <a:stCxn id="65" idx="1"/>
-            <a:endCxn id="28" idx="2"/>
-          </p:cNvCxnSpPr>
-          <p:nvPr/>
-        </p:nvCxnSpPr>
-        <p:spPr>
-          <a:xfrm rot="10800000">
-            <a:off x="3179446" y="3389567"/>
-            <a:ext cx="7010019" cy="2222739"/>
-          </a:xfrm>
-          <a:prstGeom prst="bentConnector2">
             <a:avLst/>
           </a:prstGeom>
           <a:ln>
@@ -5776,7 +7084,7 @@
     </p:spTree>
     <p:extLst>
       <p:ext uri="{BB962C8B-B14F-4D97-AF65-F5344CB8AC3E}">
-        <p14:creationId xmlns:p14="http://schemas.microsoft.com/office/powerpoint/2010/main" val="1986660502"/>
+        <p14:creationId xmlns:p14="http://schemas.microsoft.com/office/powerpoint/2010/main" val="2136243009"/>
       </p:ext>
     </p:extLst>
   </p:cSld>
@@ -5820,22 +7128,23 @@
             <p:ph type="title"/>
           </p:nvPr>
         </p:nvSpPr>
-        <p:spPr/>
+        <p:spPr>
+          <a:xfrm>
+            <a:off x="765598" y="377455"/>
+            <a:ext cx="10515600" cy="1325563"/>
+          </a:xfrm>
+        </p:spPr>
         <p:txBody>
           <a:bodyPr/>
           <a:lstStyle/>
           <a:p>
             <a:r>
-              <a:rPr lang="fr-FR" dirty="0" smtClean="0"/>
-              <a:t>Q&amp;A</a:t>
-            </a:r>
-            <a:r>
-              <a:rPr lang="fr-FR" dirty="0" smtClean="0"/>
-              <a:t> </a:t>
-            </a:r>
-            <a:r>
-              <a:rPr lang="fr-FR" dirty="0" smtClean="0"/>
-              <a:t>flow – Pri2</a:t>
+              <a:rPr lang="fr-FR" dirty="0" err="1" smtClean="0"/>
+              <a:t>Exercises</a:t>
+            </a:r>
+            <a:r>
+              <a:rPr lang="fr-FR" dirty="0" smtClean="0"/>
+              <a:t> flow</a:t>
             </a:r>
             <a:endParaRPr lang="fr-FR" dirty="0"/>
           </a:p>
@@ -5849,7 +7158,7 @@
         </p:nvSpPr>
         <p:spPr>
           <a:xfrm>
-            <a:off x="509016" y="2005267"/>
+            <a:off x="206721" y="1930324"/>
             <a:ext cx="1597152" cy="755904"/>
           </a:xfrm>
           <a:prstGeom prst="rect">
@@ -5879,7 +7188,15 @@
             <a:pPr algn="ctr"/>
             <a:r>
               <a:rPr lang="fr-FR" dirty="0" smtClean="0"/>
-              <a:t>Select FAQ tab</a:t>
+              <a:t>Select </a:t>
+            </a:r>
+            <a:r>
+              <a:rPr lang="fr-FR" dirty="0" err="1" smtClean="0"/>
+              <a:t>Exercise</a:t>
+            </a:r>
+            <a:r>
+              <a:rPr lang="fr-FR" dirty="0" smtClean="0"/>
+              <a:t> tab</a:t>
             </a:r>
             <a:endParaRPr lang="fr-FR" dirty="0"/>
           </a:p>
@@ -5893,7 +7210,7 @@
         </p:nvSpPr>
         <p:spPr>
           <a:xfrm>
-            <a:off x="2712686" y="2011618"/>
+            <a:off x="2092603" y="1939110"/>
             <a:ext cx="1597152" cy="755904"/>
           </a:xfrm>
           <a:prstGeom prst="rect">
@@ -5922,12 +7239,20 @@
           <a:p>
             <a:pPr algn="ctr"/>
             <a:r>
+              <a:rPr lang="fr-FR" dirty="0" smtClean="0"/>
+              <a:t>Select to </a:t>
+            </a:r>
+            <a:r>
               <a:rPr lang="fr-FR" dirty="0" err="1" smtClean="0"/>
-              <a:t>Search</a:t>
-            </a:r>
-            <a:r>
-              <a:rPr lang="fr-FR" dirty="0" smtClean="0"/>
-              <a:t> keyword</a:t>
+              <a:t>create</a:t>
+            </a:r>
+            <a:r>
+              <a:rPr lang="fr-FR" dirty="0" smtClean="0"/>
+              <a:t> a </a:t>
+            </a:r>
+            <a:r>
+              <a:rPr lang="fr-FR" dirty="0" err="1" smtClean="0"/>
+              <a:t>sequence</a:t>
             </a:r>
             <a:endParaRPr lang="fr-FR" dirty="0"/>
           </a:p>
@@ -5935,13 +7260,13 @@
       </p:sp>
       <p:sp>
         <p:nvSpPr>
-          <p:cNvPr id="8" name="Rectangle 7"/>
+          <p:cNvPr id="5" name="Rectangle 4"/>
           <p:cNvSpPr/>
           <p:nvPr/>
         </p:nvSpPr>
         <p:spPr>
           <a:xfrm>
-            <a:off x="7528458" y="2023872"/>
+            <a:off x="6503382" y="2432462"/>
             <a:ext cx="1597152" cy="755904"/>
           </a:xfrm>
           <a:prstGeom prst="rect">
@@ -5971,11 +7296,15 @@
             <a:pPr algn="ctr"/>
             <a:r>
               <a:rPr lang="fr-FR" dirty="0" smtClean="0"/>
-              <a:t>Compose question and </a:t>
+              <a:t>Select </a:t>
             </a:r>
             <a:r>
               <a:rPr lang="fr-FR" dirty="0" err="1" smtClean="0"/>
-              <a:t>submit</a:t>
+              <a:t>exercise</a:t>
+            </a:r>
+            <a:r>
+              <a:rPr lang="fr-FR" dirty="0" smtClean="0"/>
+              <a:t> type</a:t>
             </a:r>
             <a:endParaRPr lang="fr-FR" dirty="0"/>
           </a:p>
@@ -5983,14 +7312,14 @@
       </p:sp>
       <p:sp>
         <p:nvSpPr>
-          <p:cNvPr id="9" name="Rectangle 8"/>
+          <p:cNvPr id="6" name="Rectangle 5"/>
           <p:cNvSpPr/>
           <p:nvPr/>
         </p:nvSpPr>
         <p:spPr>
           <a:xfrm>
-            <a:off x="9945590" y="2011618"/>
-            <a:ext cx="1597152" cy="755904"/>
+            <a:off x="8357277" y="2308858"/>
+            <a:ext cx="2091030" cy="1017553"/>
           </a:xfrm>
           <a:prstGeom prst="rect">
             <a:avLst/>
@@ -6018,42 +7347,154 @@
           <a:p>
             <a:pPr algn="ctr"/>
             <a:r>
+              <a:rPr lang="fr-FR" dirty="0" smtClean="0"/>
+              <a:t>Input description and </a:t>
+            </a:r>
+            <a:r>
               <a:rPr lang="fr-FR" dirty="0" err="1" smtClean="0"/>
-              <a:t>G</a:t>
-            </a:r>
-            <a:r>
-              <a:rPr lang="fr-FR" altLang="zh-CN" dirty="0" err="1" smtClean="0"/>
-              <a:t>enerate</a:t>
-            </a:r>
-            <a:r>
-              <a:rPr lang="fr-FR" altLang="zh-CN" dirty="0" smtClean="0"/>
-              <a:t> a message </a:t>
-            </a:r>
-            <a:r>
-              <a:rPr lang="fr-FR" dirty="0" smtClean="0"/>
-              <a:t>at </a:t>
+              <a:t>upload</a:t>
+            </a:r>
+            <a:r>
+              <a:rPr lang="fr-FR" dirty="0" smtClean="0"/>
+              <a:t> image/audio if </a:t>
             </a:r>
             <a:r>
               <a:rPr lang="fr-FR" dirty="0" err="1" smtClean="0"/>
-              <a:t>Inbox</a:t>
+              <a:t>needed</a:t>
             </a:r>
             <a:endParaRPr lang="fr-FR" dirty="0"/>
           </a:p>
         </p:txBody>
       </p:sp>
+      <p:sp>
+        <p:nvSpPr>
+          <p:cNvPr id="7" name="Rectangle 6"/>
+          <p:cNvSpPr/>
+          <p:nvPr/>
+        </p:nvSpPr>
+        <p:spPr>
+          <a:xfrm>
+            <a:off x="10768381" y="2446905"/>
+            <a:ext cx="1307998" cy="741461"/>
+          </a:xfrm>
+          <a:prstGeom prst="rect">
+            <a:avLst/>
+          </a:prstGeom>
+        </p:spPr>
+        <p:style>
+          <a:lnRef idx="2">
+            <a:schemeClr val="accent1">
+              <a:shade val="50000"/>
+            </a:schemeClr>
+          </a:lnRef>
+          <a:fillRef idx="1">
+            <a:schemeClr val="accent1"/>
+          </a:fillRef>
+          <a:effectRef idx="0">
+            <a:schemeClr val="accent1"/>
+          </a:effectRef>
+          <a:fontRef idx="minor">
+            <a:schemeClr val="lt1"/>
+          </a:fontRef>
+        </p:style>
+        <p:txBody>
+          <a:bodyPr rtlCol="0" anchor="ctr"/>
+          <a:lstStyle/>
+          <a:p>
+            <a:pPr algn="ctr"/>
+            <a:r>
+              <a:rPr lang="fr-FR" dirty="0" smtClean="0"/>
+              <a:t>Input questions</a:t>
+            </a:r>
+            <a:endParaRPr lang="fr-FR" dirty="0"/>
+          </a:p>
+        </p:txBody>
+      </p:sp>
+      <p:cxnSp>
+        <p:nvCxnSpPr>
+          <p:cNvPr id="8" name="Straight Arrow Connector 7"/>
+          <p:cNvCxnSpPr>
+            <a:stCxn id="3" idx="3"/>
+            <a:endCxn id="4" idx="1"/>
+          </p:cNvCxnSpPr>
+          <p:nvPr/>
+        </p:nvCxnSpPr>
+        <p:spPr>
+          <a:xfrm>
+            <a:off x="1803873" y="2308276"/>
+            <a:ext cx="288730" cy="8786"/>
+          </a:xfrm>
+          <a:prstGeom prst="straightConnector1">
+            <a:avLst/>
+          </a:prstGeom>
+          <a:ln>
+            <a:tailEnd type="triangle"/>
+          </a:ln>
+        </p:spPr>
+        <p:style>
+          <a:lnRef idx="1">
+            <a:schemeClr val="accent1"/>
+          </a:lnRef>
+          <a:fillRef idx="0">
+            <a:schemeClr val="accent1"/>
+          </a:fillRef>
+          <a:effectRef idx="0">
+            <a:schemeClr val="accent1"/>
+          </a:effectRef>
+          <a:fontRef idx="minor">
+            <a:schemeClr val="tx1"/>
+          </a:fontRef>
+        </p:style>
+      </p:cxnSp>
+      <p:cxnSp>
+        <p:nvCxnSpPr>
+          <p:cNvPr id="9" name="Straight Arrow Connector 8"/>
+          <p:cNvCxnSpPr>
+            <a:stCxn id="4" idx="3"/>
+            <a:endCxn id="36" idx="1"/>
+          </p:cNvCxnSpPr>
+          <p:nvPr/>
+        </p:nvCxnSpPr>
+        <p:spPr>
+          <a:xfrm flipV="1">
+            <a:off x="3689755" y="2310389"/>
+            <a:ext cx="335501" cy="6673"/>
+          </a:xfrm>
+          <a:prstGeom prst="straightConnector1">
+            <a:avLst/>
+          </a:prstGeom>
+          <a:ln>
+            <a:tailEnd type="triangle"/>
+          </a:ln>
+        </p:spPr>
+        <p:style>
+          <a:lnRef idx="1">
+            <a:schemeClr val="accent1"/>
+          </a:lnRef>
+          <a:fillRef idx="0">
+            <a:schemeClr val="accent1"/>
+          </a:fillRef>
+          <a:effectRef idx="0">
+            <a:schemeClr val="accent1"/>
+          </a:effectRef>
+          <a:fontRef idx="minor">
+            <a:schemeClr val="tx1"/>
+          </a:fontRef>
+        </p:style>
+      </p:cxnSp>
       <p:cxnSp>
         <p:nvCxnSpPr>
           <p:cNvPr id="10" name="Straight Arrow Connector 9"/>
           <p:cNvCxnSpPr>
-            <a:stCxn id="3" idx="3"/>
-            <a:endCxn id="4" idx="1"/>
+            <a:stCxn id="5" idx="3"/>
+            <a:endCxn id="6" idx="1"/>
           </p:cNvCxnSpPr>
           <p:nvPr/>
         </p:nvCxnSpPr>
         <p:spPr>
           <a:xfrm>
-            <a:off x="2106168" y="2383219"/>
-            <a:ext cx="606518" cy="6351"/>
+            <a:off x="8100534" y="2810414"/>
+            <a:ext cx="256743" cy="7221"/>
           </a:xfrm>
           <a:prstGeom prst="straightConnector1">
             <a:avLst/>
@@ -6081,14 +7522,15 @@
         <p:nvCxnSpPr>
           <p:cNvPr id="11" name="Straight Arrow Connector 10"/>
           <p:cNvCxnSpPr>
-            <a:stCxn id="4" idx="3"/>
+            <a:stCxn id="6" idx="3"/>
+            <a:endCxn id="7" idx="1"/>
           </p:cNvCxnSpPr>
           <p:nvPr/>
         </p:nvCxnSpPr>
         <p:spPr>
           <a:xfrm>
-            <a:off x="4309838" y="2389570"/>
-            <a:ext cx="635508" cy="0"/>
+            <a:off x="10448307" y="2817635"/>
+            <a:ext cx="320074" cy="1"/>
           </a:xfrm>
           <a:prstGeom prst="straightConnector1">
             <a:avLst/>
@@ -6112,87 +7554,16 @@
           </a:fontRef>
         </p:style>
       </p:cxnSp>
-      <p:cxnSp>
-        <p:nvCxnSpPr>
-          <p:cNvPr id="14" name="Straight Arrow Connector 13"/>
-          <p:cNvCxnSpPr>
-            <a:endCxn id="8" idx="1"/>
-          </p:cNvCxnSpPr>
-          <p:nvPr/>
-        </p:nvCxnSpPr>
-        <p:spPr>
-          <a:xfrm>
-            <a:off x="6542498" y="2389570"/>
-            <a:ext cx="985960" cy="12254"/>
-          </a:xfrm>
-          <a:prstGeom prst="straightConnector1">
-            <a:avLst/>
-          </a:prstGeom>
-          <a:ln>
-            <a:tailEnd type="triangle"/>
-          </a:ln>
-        </p:spPr>
-        <p:style>
-          <a:lnRef idx="1">
-            <a:schemeClr val="accent1"/>
-          </a:lnRef>
-          <a:fillRef idx="0">
-            <a:schemeClr val="accent1"/>
-          </a:fillRef>
-          <a:effectRef idx="0">
-            <a:schemeClr val="accent1"/>
-          </a:effectRef>
-          <a:fontRef idx="minor">
-            <a:schemeClr val="tx1"/>
-          </a:fontRef>
-        </p:style>
-      </p:cxnSp>
-      <p:cxnSp>
-        <p:nvCxnSpPr>
-          <p:cNvPr id="15" name="Straight Arrow Connector 14"/>
-          <p:cNvCxnSpPr>
-            <a:stCxn id="8" idx="3"/>
-            <a:endCxn id="9" idx="1"/>
-          </p:cNvCxnSpPr>
-          <p:nvPr/>
-        </p:nvCxnSpPr>
-        <p:spPr>
-          <a:xfrm flipV="1">
-            <a:off x="9125610" y="2389570"/>
-            <a:ext cx="819980" cy="12254"/>
-          </a:xfrm>
-          <a:prstGeom prst="straightConnector1">
-            <a:avLst/>
-          </a:prstGeom>
-          <a:ln>
-            <a:tailEnd type="triangle"/>
-          </a:ln>
-        </p:spPr>
-        <p:style>
-          <a:lnRef idx="1">
-            <a:schemeClr val="accent1"/>
-          </a:lnRef>
-          <a:fillRef idx="0">
-            <a:schemeClr val="accent1"/>
-          </a:fillRef>
-          <a:effectRef idx="0">
-            <a:schemeClr val="accent1"/>
-          </a:effectRef>
-          <a:fontRef idx="minor">
-            <a:schemeClr val="tx1"/>
-          </a:fontRef>
-        </p:style>
-      </p:cxnSp>
-      <p:sp>
-        <p:nvSpPr>
-          <p:cNvPr id="21" name="Rectangle 20"/>
+      <p:sp>
+        <p:nvSpPr>
+          <p:cNvPr id="36" name="Rectangle 35"/>
           <p:cNvSpPr/>
           <p:nvPr/>
         </p:nvSpPr>
         <p:spPr>
           <a:xfrm>
-            <a:off x="9883174" y="3433974"/>
-            <a:ext cx="1721984" cy="926623"/>
+            <a:off x="4025256" y="1892138"/>
+            <a:ext cx="2060042" cy="836501"/>
           </a:xfrm>
           <a:prstGeom prst="rect">
             <a:avLst/>
@@ -6220,8 +7591,12 @@
           <a:p>
             <a:pPr algn="ctr"/>
             <a:r>
+              <a:rPr lang="fr-FR" dirty="0" smtClean="0"/>
+              <a:t>Select to </a:t>
+            </a:r>
+            <a:r>
               <a:rPr lang="fr-FR" dirty="0" err="1" smtClean="0"/>
-              <a:t>Receive</a:t>
+              <a:t>add</a:t>
             </a:r>
             <a:r>
               <a:rPr lang="fr-FR" dirty="0" smtClean="0"/>
@@ -6229,7 +7604,15 @@
             </a:r>
             <a:r>
               <a:rPr lang="fr-FR" dirty="0" err="1" smtClean="0"/>
-              <a:t>answer</a:t>
+              <a:t>exercise</a:t>
+            </a:r>
+            <a:r>
+              <a:rPr lang="fr-FR" dirty="0" smtClean="0"/>
+              <a:t> to </a:t>
+            </a:r>
+            <a:r>
+              <a:rPr lang="fr-FR" dirty="0" err="1" smtClean="0"/>
+              <a:t>created</a:t>
             </a:r>
             <a:r>
               <a:rPr lang="fr-FR" dirty="0" smtClean="0"/>
@@ -6237,23 +7620,7 @@
             </a:r>
             <a:r>
               <a:rPr lang="fr-FR" dirty="0" err="1" smtClean="0"/>
-              <a:t>from</a:t>
-            </a:r>
-            <a:r>
-              <a:rPr lang="fr-FR" dirty="0" smtClean="0"/>
-              <a:t> </a:t>
-            </a:r>
-            <a:r>
-              <a:rPr lang="fr-FR" dirty="0" err="1" smtClean="0"/>
-              <a:t>teacher</a:t>
-            </a:r>
-            <a:r>
-              <a:rPr lang="fr-FR" dirty="0" smtClean="0"/>
-              <a:t> at </a:t>
-            </a:r>
-            <a:r>
-              <a:rPr lang="fr-FR" dirty="0" err="1" smtClean="0"/>
-              <a:t>Inbox</a:t>
+              <a:t>sequence</a:t>
             </a:r>
             <a:endParaRPr lang="fr-FR" dirty="0"/>
           </a:p>
@@ -6261,17 +7628,17 @@
       </p:sp>
       <p:cxnSp>
         <p:nvCxnSpPr>
-          <p:cNvPr id="23" name="Straight Arrow Connector 22"/>
+          <p:cNvPr id="47" name="Straight Arrow Connector 46"/>
           <p:cNvCxnSpPr>
-            <a:stCxn id="9" idx="2"/>
-            <a:endCxn id="21" idx="0"/>
+            <a:stCxn id="36" idx="3"/>
+            <a:endCxn id="5" idx="1"/>
           </p:cNvCxnSpPr>
           <p:nvPr/>
         </p:nvCxnSpPr>
         <p:spPr>
           <a:xfrm>
-            <a:off x="10744166" y="2767522"/>
-            <a:ext cx="0" cy="666452"/>
+            <a:off x="6085298" y="2310389"/>
+            <a:ext cx="418084" cy="500025"/>
           </a:xfrm>
           <a:prstGeom prst="straightConnector1">
             <a:avLst/>
@@ -6297,21 +7664,18 @@
       </p:cxnSp>
       <p:sp>
         <p:nvSpPr>
-          <p:cNvPr id="25" name="Rectangle 24"/>
+          <p:cNvPr id="64" name="Rectangle 63"/>
           <p:cNvSpPr/>
           <p:nvPr/>
         </p:nvSpPr>
         <p:spPr>
           <a:xfrm>
-            <a:off x="2423922" y="3476121"/>
-            <a:ext cx="2203670" cy="850082"/>
+            <a:off x="310353" y="3219843"/>
+            <a:ext cx="1597152" cy="755904"/>
           </a:xfrm>
           <a:prstGeom prst="rect">
             <a:avLst/>
           </a:prstGeom>
-          <a:solidFill>
-            <a:schemeClr val="accent6"/>
-          </a:solidFill>
         </p:spPr>
         <p:style>
           <a:lnRef idx="2">
@@ -6336,27 +7700,15 @@
             <a:pPr algn="ctr"/>
             <a:r>
               <a:rPr lang="fr-FR" dirty="0" smtClean="0"/>
-              <a:t>Teacher notices to </a:t>
+              <a:t>Select </a:t>
             </a:r>
             <a:r>
               <a:rPr lang="fr-FR" dirty="0" err="1" smtClean="0"/>
-              <a:t>recieve</a:t>
-            </a:r>
-            <a:r>
-              <a:rPr lang="fr-FR" dirty="0" smtClean="0"/>
-              <a:t> a question at </a:t>
-            </a:r>
-            <a:r>
-              <a:rPr lang="fr-FR" dirty="0" err="1" smtClean="0"/>
-              <a:t>Inbox</a:t>
-            </a:r>
-            <a:r>
-              <a:rPr lang="fr-FR" dirty="0" smtClean="0"/>
-              <a:t> at admin </a:t>
-            </a:r>
-            <a:r>
-              <a:rPr lang="fr-FR" dirty="0" err="1" smtClean="0"/>
-              <a:t>tool</a:t>
+              <a:t>Exercise</a:t>
+            </a:r>
+            <a:r>
+              <a:rPr lang="fr-FR" dirty="0" smtClean="0"/>
+              <a:t> tab</a:t>
             </a:r>
             <a:endParaRPr lang="fr-FR" dirty="0"/>
           </a:p>
@@ -6364,21 +7716,18 @@
       </p:sp>
       <p:sp>
         <p:nvSpPr>
-          <p:cNvPr id="26" name="Rectangle 25"/>
+          <p:cNvPr id="65" name="Rectangle 64"/>
           <p:cNvSpPr/>
           <p:nvPr/>
         </p:nvSpPr>
         <p:spPr>
           <a:xfrm>
-            <a:off x="6096000" y="3472245"/>
-            <a:ext cx="2203670" cy="850082"/>
+            <a:off x="2196235" y="3228629"/>
+            <a:ext cx="1597152" cy="755904"/>
           </a:xfrm>
           <a:prstGeom prst="rect">
             <a:avLst/>
           </a:prstGeom>
-          <a:solidFill>
-            <a:schemeClr val="accent6"/>
-          </a:solidFill>
         </p:spPr>
         <p:style>
           <a:lnRef idx="2">
@@ -6403,27 +7752,11 @@
             <a:pPr algn="ctr"/>
             <a:r>
               <a:rPr lang="fr-FR" dirty="0" smtClean="0"/>
-              <a:t>Teacher </a:t>
+              <a:t>Select a </a:t>
             </a:r>
             <a:r>
               <a:rPr lang="fr-FR" dirty="0" err="1" smtClean="0"/>
-              <a:t>answers</a:t>
-            </a:r>
-            <a:r>
-              <a:rPr lang="fr-FR" dirty="0" smtClean="0"/>
-              <a:t> the question and </a:t>
-            </a:r>
-            <a:r>
-              <a:rPr lang="fr-FR" dirty="0" err="1" smtClean="0"/>
-              <a:t>sends</a:t>
-            </a:r>
-            <a:r>
-              <a:rPr lang="fr-FR" dirty="0" smtClean="0"/>
-              <a:t> to </a:t>
-            </a:r>
-            <a:r>
-              <a:rPr lang="fr-FR" dirty="0" err="1" smtClean="0"/>
-              <a:t>Inbox</a:t>
+              <a:t>sequqnce</a:t>
             </a:r>
             <a:endParaRPr lang="fr-FR" dirty="0"/>
           </a:p>
@@ -6431,17 +7764,17 @@
       </p:sp>
       <p:cxnSp>
         <p:nvCxnSpPr>
-          <p:cNvPr id="28" name="Straight Arrow Connector 27"/>
+          <p:cNvPr id="69" name="Straight Arrow Connector 68"/>
           <p:cNvCxnSpPr>
-            <a:stCxn id="25" idx="3"/>
-            <a:endCxn id="26" idx="1"/>
+            <a:stCxn id="64" idx="3"/>
+            <a:endCxn id="65" idx="1"/>
           </p:cNvCxnSpPr>
           <p:nvPr/>
         </p:nvCxnSpPr>
         <p:spPr>
-          <a:xfrm flipV="1">
-            <a:off x="4627592" y="3897286"/>
-            <a:ext cx="1468408" cy="3876"/>
+          <a:xfrm>
+            <a:off x="1907505" y="3597795"/>
+            <a:ext cx="288730" cy="8786"/>
           </a:xfrm>
           <a:prstGeom prst="straightConnector1">
             <a:avLst/>
@@ -6467,17 +7800,17 @@
       </p:cxnSp>
       <p:cxnSp>
         <p:nvCxnSpPr>
-          <p:cNvPr id="30" name="Straight Arrow Connector 29"/>
+          <p:cNvPr id="70" name="Straight Arrow Connector 69"/>
           <p:cNvCxnSpPr>
-            <a:stCxn id="26" idx="3"/>
-            <a:endCxn id="21" idx="1"/>
+            <a:stCxn id="65" idx="3"/>
+            <a:endCxn id="73" idx="1"/>
           </p:cNvCxnSpPr>
           <p:nvPr/>
         </p:nvCxnSpPr>
         <p:spPr>
-          <a:xfrm>
-            <a:off x="8299670" y="3897286"/>
-            <a:ext cx="1583504" cy="0"/>
+          <a:xfrm flipV="1">
+            <a:off x="3793387" y="3599908"/>
+            <a:ext cx="335501" cy="6673"/>
           </a:xfrm>
           <a:prstGeom prst="straightConnector1">
             <a:avLst/>
@@ -6503,21 +7836,18 @@
       </p:cxnSp>
       <p:sp>
         <p:nvSpPr>
-          <p:cNvPr id="33" name="Rectangle 32"/>
+          <p:cNvPr id="73" name="Rectangle 72"/>
           <p:cNvSpPr/>
           <p:nvPr/>
         </p:nvSpPr>
         <p:spPr>
           <a:xfrm>
-            <a:off x="6123364" y="4743491"/>
-            <a:ext cx="2176306" cy="1074297"/>
+            <a:off x="4128888" y="3181657"/>
+            <a:ext cx="2060042" cy="836501"/>
           </a:xfrm>
           <a:prstGeom prst="rect">
             <a:avLst/>
           </a:prstGeom>
-          <a:solidFill>
-            <a:schemeClr val="accent6"/>
-          </a:solidFill>
         </p:spPr>
         <p:style>
           <a:lnRef idx="2">
@@ -6542,95 +7872,27 @@
             <a:pPr algn="ctr"/>
             <a:r>
               <a:rPr lang="fr-FR" dirty="0" smtClean="0"/>
-              <a:t>If the Q&amp;A </a:t>
+              <a:t>Select to </a:t>
             </a:r>
             <a:r>
               <a:rPr lang="fr-FR" dirty="0" err="1" smtClean="0"/>
-              <a:t>applies</a:t>
-            </a:r>
-            <a:r>
-              <a:rPr lang="fr-FR" dirty="0" smtClean="0"/>
-              <a:t> to all, </a:t>
+              <a:t>add</a:t>
+            </a:r>
+            <a:r>
+              <a:rPr lang="fr-FR" dirty="0" smtClean="0"/>
+              <a:t> </a:t>
             </a:r>
             <a:r>
               <a:rPr lang="fr-FR" dirty="0" err="1" smtClean="0"/>
-              <a:t>teacher</a:t>
-            </a:r>
-            <a:r>
-              <a:rPr lang="fr-FR" dirty="0" smtClean="0"/>
-              <a:t> </a:t>
+              <a:t>exercise</a:t>
+            </a:r>
+            <a:r>
+              <a:rPr lang="fr-FR" dirty="0" smtClean="0"/>
+              <a:t> to the </a:t>
             </a:r>
             <a:r>
               <a:rPr lang="fr-FR" dirty="0" err="1" smtClean="0"/>
-              <a:t>adds</a:t>
-            </a:r>
-            <a:r>
-              <a:rPr lang="fr-FR" dirty="0" smtClean="0"/>
-              <a:t> </a:t>
-            </a:r>
-            <a:r>
-              <a:rPr lang="fr-FR" dirty="0" err="1" smtClean="0"/>
-              <a:t>it</a:t>
-            </a:r>
-            <a:r>
-              <a:rPr lang="fr-FR" dirty="0" smtClean="0"/>
-              <a:t> </a:t>
-            </a:r>
-            <a:r>
-              <a:rPr lang="fr-FR" dirty="0" err="1" smtClean="0"/>
-              <a:t>knowledge</a:t>
-            </a:r>
-            <a:r>
-              <a:rPr lang="fr-FR" dirty="0" smtClean="0"/>
-              <a:t> base. </a:t>
-            </a:r>
-            <a:endParaRPr lang="fr-FR" dirty="0"/>
-          </a:p>
-        </p:txBody>
-      </p:sp>
-      <p:sp>
-        <p:nvSpPr>
-          <p:cNvPr id="34" name="Diamond 33"/>
-          <p:cNvSpPr/>
-          <p:nvPr/>
-        </p:nvSpPr>
-        <p:spPr>
-          <a:xfrm>
-            <a:off x="4945346" y="1877568"/>
-            <a:ext cx="1618556" cy="1042416"/>
-          </a:xfrm>
-          <a:prstGeom prst="diamond">
-            <a:avLst/>
-          </a:prstGeom>
-        </p:spPr>
-        <p:style>
-          <a:lnRef idx="2">
-            <a:schemeClr val="accent1">
-              <a:shade val="50000"/>
-            </a:schemeClr>
-          </a:lnRef>
-          <a:fillRef idx="1">
-            <a:schemeClr val="accent1"/>
-          </a:fillRef>
-          <a:effectRef idx="0">
-            <a:schemeClr val="accent1"/>
-          </a:effectRef>
-          <a:fontRef idx="minor">
-            <a:schemeClr val="lt1"/>
-          </a:fontRef>
-        </p:style>
-        <p:txBody>
-          <a:bodyPr rtlCol="0" anchor="ctr"/>
-          <a:lstStyle/>
-          <a:p>
-            <a:pPr algn="ctr"/>
-            <a:r>
-              <a:rPr lang="fr-FR" dirty="0" smtClean="0"/>
-              <a:t>If not </a:t>
-            </a:r>
-            <a:r>
-              <a:rPr lang="fr-FR" dirty="0" err="1" smtClean="0"/>
-              <a:t>found</a:t>
+              <a:t>sequence</a:t>
             </a:r>
             <a:endParaRPr lang="fr-FR" dirty="0"/>
           </a:p>
@@ -6638,17 +7900,17 @@
       </p:sp>
       <p:cxnSp>
         <p:nvCxnSpPr>
-          <p:cNvPr id="36" name="Straight Arrow Connector 35"/>
+          <p:cNvPr id="74" name="Straight Arrow Connector 73"/>
           <p:cNvCxnSpPr>
-            <a:stCxn id="26" idx="2"/>
-            <a:endCxn id="33" idx="0"/>
+            <a:stCxn id="73" idx="3"/>
+            <a:endCxn id="5" idx="1"/>
           </p:cNvCxnSpPr>
           <p:nvPr/>
         </p:nvCxnSpPr>
         <p:spPr>
-          <a:xfrm>
-            <a:off x="7197835" y="4322327"/>
-            <a:ext cx="13682" cy="421164"/>
+          <a:xfrm flipV="1">
+            <a:off x="6188930" y="2810414"/>
+            <a:ext cx="314452" cy="789494"/>
           </a:xfrm>
           <a:prstGeom prst="straightConnector1">
             <a:avLst/>
@@ -6672,89 +7934,16 @@
           </a:fontRef>
         </p:style>
       </p:cxnSp>
-      <p:sp>
-        <p:nvSpPr>
-          <p:cNvPr id="37" name="TextBox 36"/>
-          <p:cNvSpPr txBox="1"/>
-          <p:nvPr/>
-        </p:nvSpPr>
-        <p:spPr>
-          <a:xfrm>
-            <a:off x="509016" y="6132576"/>
-            <a:ext cx="5427640" cy="369332"/>
-          </a:xfrm>
-          <a:prstGeom prst="rect">
-            <a:avLst/>
-          </a:prstGeom>
-          <a:noFill/>
-        </p:spPr>
-        <p:txBody>
-          <a:bodyPr wrap="none" rtlCol="0">
-            <a:spAutoFit/>
-          </a:bodyPr>
-          <a:lstStyle/>
-          <a:p>
-            <a:r>
-              <a:rPr lang="fr-FR" dirty="0" smtClean="0"/>
-              <a:t>*</a:t>
-            </a:r>
-            <a:r>
-              <a:rPr lang="fr-FR" dirty="0" err="1" smtClean="0"/>
-              <a:t>students</a:t>
-            </a:r>
-            <a:r>
-              <a:rPr lang="fr-FR" dirty="0" smtClean="0"/>
-              <a:t> </a:t>
-            </a:r>
-            <a:r>
-              <a:rPr lang="fr-FR" dirty="0" err="1" smtClean="0"/>
-              <a:t>cannot</a:t>
-            </a:r>
-            <a:r>
-              <a:rPr lang="fr-FR" dirty="0" smtClean="0"/>
-              <a:t> </a:t>
-            </a:r>
-            <a:r>
-              <a:rPr lang="fr-FR" dirty="0" err="1" smtClean="0"/>
-              <a:t>reply</a:t>
-            </a:r>
-            <a:r>
-              <a:rPr lang="fr-FR" dirty="0" smtClean="0"/>
-              <a:t> back messages </a:t>
-            </a:r>
-            <a:r>
-              <a:rPr lang="fr-FR" dirty="0" err="1" smtClean="0"/>
-              <a:t>received</a:t>
-            </a:r>
-            <a:r>
-              <a:rPr lang="fr-FR" dirty="0" smtClean="0"/>
-              <a:t> in </a:t>
-            </a:r>
-            <a:r>
-              <a:rPr lang="fr-FR" dirty="0" err="1" smtClean="0"/>
-              <a:t>Inbox</a:t>
-            </a:r>
-            <a:endParaRPr lang="fr-FR" dirty="0"/>
-          </a:p>
-        </p:txBody>
-      </p:sp>
     </p:spTree>
     <p:extLst>
       <p:ext uri="{BB962C8B-B14F-4D97-AF65-F5344CB8AC3E}">
-        <p14:creationId xmlns:p14="http://schemas.microsoft.com/office/powerpoint/2010/main" val="2136243009"/>
+        <p14:creationId xmlns:p14="http://schemas.microsoft.com/office/powerpoint/2010/main" val="3003571946"/>
       </p:ext>
     </p:extLst>
   </p:cSld>
   <p:clrMapOvr>
     <a:masterClrMapping/>
   </p:clrMapOvr>
-  <p:timing>
-    <p:tnLst>
-      <p:par>
-        <p:cTn id="1" dur="indefinite" restart="never" nodeType="tmRoot"/>
-      </p:par>
-    </p:tnLst>
-  </p:timing>
 </p:sld>
 </file>
 

</xml_diff>

<commit_message>
update for admin tool  part
</commit_message>
<xml_diff>
--- a/Admin tool flow.pptx
+++ b/Admin tool flow.pptx
@@ -8,9 +8,10 @@
     <p:sldId id="256" r:id="rId2"/>
     <p:sldId id="258" r:id="rId3"/>
     <p:sldId id="259" r:id="rId4"/>
-    <p:sldId id="261" r:id="rId5"/>
-    <p:sldId id="263" r:id="rId6"/>
-    <p:sldId id="264" r:id="rId7"/>
+    <p:sldId id="265" r:id="rId5"/>
+    <p:sldId id="261" r:id="rId6"/>
+    <p:sldId id="263" r:id="rId7"/>
+    <p:sldId id="264" r:id="rId8"/>
   </p:sldIdLst>
   <p:sldSz cx="12192000" cy="6858000"/>
   <p:notesSz cx="6858000" cy="9144000"/>
@@ -248,7 +249,7 @@
           <a:p>
             <a:fld id="{244407FF-88D8-4799-B8FC-E0203F3B8DD7}" type="datetimeFigureOut">
               <a:rPr lang="fr-FR" smtClean="0"/>
-              <a:t>25/09/2014</a:t>
+              <a:t>08/10/2014</a:t>
             </a:fld>
             <a:endParaRPr lang="fr-FR"/>
           </a:p>
@@ -418,7 +419,7 @@
           <a:p>
             <a:fld id="{244407FF-88D8-4799-B8FC-E0203F3B8DD7}" type="datetimeFigureOut">
               <a:rPr lang="fr-FR" smtClean="0"/>
-              <a:t>25/09/2014</a:t>
+              <a:t>08/10/2014</a:t>
             </a:fld>
             <a:endParaRPr lang="fr-FR"/>
           </a:p>
@@ -598,7 +599,7 @@
           <a:p>
             <a:fld id="{244407FF-88D8-4799-B8FC-E0203F3B8DD7}" type="datetimeFigureOut">
               <a:rPr lang="fr-FR" smtClean="0"/>
-              <a:t>25/09/2014</a:t>
+              <a:t>08/10/2014</a:t>
             </a:fld>
             <a:endParaRPr lang="fr-FR"/>
           </a:p>
@@ -768,7 +769,7 @@
           <a:p>
             <a:fld id="{244407FF-88D8-4799-B8FC-E0203F3B8DD7}" type="datetimeFigureOut">
               <a:rPr lang="fr-FR" smtClean="0"/>
-              <a:t>25/09/2014</a:t>
+              <a:t>08/10/2014</a:t>
             </a:fld>
             <a:endParaRPr lang="fr-FR"/>
           </a:p>
@@ -1014,7 +1015,7 @@
           <a:p>
             <a:fld id="{244407FF-88D8-4799-B8FC-E0203F3B8DD7}" type="datetimeFigureOut">
               <a:rPr lang="fr-FR" smtClean="0"/>
-              <a:t>25/09/2014</a:t>
+              <a:t>08/10/2014</a:t>
             </a:fld>
             <a:endParaRPr lang="fr-FR"/>
           </a:p>
@@ -1246,7 +1247,7 @@
           <a:p>
             <a:fld id="{244407FF-88D8-4799-B8FC-E0203F3B8DD7}" type="datetimeFigureOut">
               <a:rPr lang="fr-FR" smtClean="0"/>
-              <a:t>25/09/2014</a:t>
+              <a:t>08/10/2014</a:t>
             </a:fld>
             <a:endParaRPr lang="fr-FR"/>
           </a:p>
@@ -1613,7 +1614,7 @@
           <a:p>
             <a:fld id="{244407FF-88D8-4799-B8FC-E0203F3B8DD7}" type="datetimeFigureOut">
               <a:rPr lang="fr-FR" smtClean="0"/>
-              <a:t>25/09/2014</a:t>
+              <a:t>08/10/2014</a:t>
             </a:fld>
             <a:endParaRPr lang="fr-FR"/>
           </a:p>
@@ -1731,7 +1732,7 @@
           <a:p>
             <a:fld id="{244407FF-88D8-4799-B8FC-E0203F3B8DD7}" type="datetimeFigureOut">
               <a:rPr lang="fr-FR" smtClean="0"/>
-              <a:t>25/09/2014</a:t>
+              <a:t>08/10/2014</a:t>
             </a:fld>
             <a:endParaRPr lang="fr-FR"/>
           </a:p>
@@ -1826,7 +1827,7 @@
           <a:p>
             <a:fld id="{244407FF-88D8-4799-B8FC-E0203F3B8DD7}" type="datetimeFigureOut">
               <a:rPr lang="fr-FR" smtClean="0"/>
-              <a:t>25/09/2014</a:t>
+              <a:t>08/10/2014</a:t>
             </a:fld>
             <a:endParaRPr lang="fr-FR"/>
           </a:p>
@@ -2103,7 +2104,7 @@
           <a:p>
             <a:fld id="{244407FF-88D8-4799-B8FC-E0203F3B8DD7}" type="datetimeFigureOut">
               <a:rPr lang="fr-FR" smtClean="0"/>
-              <a:t>25/09/2014</a:t>
+              <a:t>08/10/2014</a:t>
             </a:fld>
             <a:endParaRPr lang="fr-FR"/>
           </a:p>
@@ -2356,7 +2357,7 @@
           <a:p>
             <a:fld id="{244407FF-88D8-4799-B8FC-E0203F3B8DD7}" type="datetimeFigureOut">
               <a:rPr lang="fr-FR" smtClean="0"/>
-              <a:t>25/09/2014</a:t>
+              <a:t>08/10/2014</a:t>
             </a:fld>
             <a:endParaRPr lang="fr-FR"/>
           </a:p>
@@ -2569,7 +2570,7 @@
           <a:p>
             <a:fld id="{244407FF-88D8-4799-B8FC-E0203F3B8DD7}" type="datetimeFigureOut">
               <a:rPr lang="fr-FR" smtClean="0"/>
-              <a:t>25/09/2014</a:t>
+              <a:t>08/10/2014</a:t>
             </a:fld>
             <a:endParaRPr lang="fr-FR"/>
           </a:p>
@@ -3022,11 +3023,7 @@
           <a:p>
             <a:r>
               <a:rPr lang="fr-FR" dirty="0" smtClean="0"/>
-              <a:t>PC </a:t>
-            </a:r>
-            <a:r>
-              <a:rPr lang="fr-FR" dirty="0" smtClean="0"/>
-              <a:t>version</a:t>
+              <a:t>PC version</a:t>
             </a:r>
           </a:p>
           <a:p>
@@ -3116,7 +3113,23 @@
             <a:pPr algn="ctr"/>
             <a:r>
               <a:rPr lang="fr-FR" altLang="zh-CN" dirty="0" smtClean="0"/>
-              <a:t>Go to web site</a:t>
+              <a:t>Go to web </a:t>
+            </a:r>
+            <a:r>
+              <a:rPr lang="fr-FR" altLang="zh-CN" dirty="0" smtClean="0"/>
+              <a:t>site/</a:t>
+            </a:r>
+            <a:r>
+              <a:rPr lang="fr-FR" altLang="zh-CN" dirty="0" err="1" smtClean="0"/>
+              <a:t>teacher</a:t>
+            </a:r>
+            <a:r>
+              <a:rPr lang="fr-FR" altLang="zh-CN" dirty="0" smtClean="0"/>
+              <a:t> </a:t>
+            </a:r>
+            <a:r>
+              <a:rPr lang="fr-FR" altLang="zh-CN" dirty="0" err="1" smtClean="0"/>
+              <a:t>app</a:t>
             </a:r>
             <a:endParaRPr lang="fr-FR" dirty="0"/>
           </a:p>
@@ -3164,11 +3177,7 @@
             </a:r>
             <a:r>
               <a:rPr lang="fr-FR" dirty="0" err="1" smtClean="0"/>
-              <a:t>password</a:t>
-            </a:r>
-            <a:r>
-              <a:rPr lang="fr-FR" dirty="0" smtClean="0"/>
-              <a:t> </a:t>
+              <a:t>pwd</a:t>
             </a:r>
             <a:endParaRPr lang="fr-FR" dirty="0"/>
           </a:p>
@@ -3346,8 +3355,8 @@
         </p:nvSpPr>
         <p:spPr>
           <a:xfrm>
-            <a:off x="10148282" y="3534666"/>
-            <a:ext cx="1853184" cy="780443"/>
+            <a:off x="10148282" y="2911576"/>
+            <a:ext cx="1348029" cy="480583"/>
           </a:xfrm>
           <a:prstGeom prst="rect">
             <a:avLst/>
@@ -3376,7 +3385,11 @@
             <a:pPr algn="ctr"/>
             <a:r>
               <a:rPr lang="fr-FR" dirty="0" smtClean="0"/>
-              <a:t>Q &amp; A management</a:t>
+              <a:t>Q &amp; </a:t>
+            </a:r>
+            <a:r>
+              <a:rPr lang="fr-FR" dirty="0" smtClean="0"/>
+              <a:t>A</a:t>
             </a:r>
             <a:endParaRPr lang="fr-FR" dirty="0"/>
           </a:p>
@@ -3390,8 +3403,8 @@
         </p:nvSpPr>
         <p:spPr>
           <a:xfrm>
-            <a:off x="10082784" y="1438501"/>
-            <a:ext cx="1853184" cy="780443"/>
+            <a:off x="10254285" y="1397957"/>
+            <a:ext cx="1242026" cy="457200"/>
           </a:xfrm>
           <a:prstGeom prst="rect">
             <a:avLst/>
@@ -3420,7 +3433,15 @@
             <a:pPr algn="ctr"/>
             <a:r>
               <a:rPr lang="fr-FR" dirty="0" smtClean="0"/>
-              <a:t>Class management</a:t>
+              <a:t>Class </a:t>
+            </a:r>
+            <a:r>
+              <a:rPr lang="fr-FR" dirty="0" err="1" smtClean="0"/>
+              <a:t>mgr</a:t>
+            </a:r>
+            <a:r>
+              <a:rPr lang="fr-FR" dirty="0" smtClean="0"/>
+              <a:t>.</a:t>
             </a:r>
             <a:endParaRPr lang="fr-FR" dirty="0"/>
           </a:p>
@@ -3434,8 +3455,8 @@
         </p:nvSpPr>
         <p:spPr>
           <a:xfrm>
-            <a:off x="10254285" y="2385695"/>
-            <a:ext cx="1714534" cy="780443"/>
+            <a:off x="10254285" y="2195467"/>
+            <a:ext cx="1242026" cy="528053"/>
           </a:xfrm>
           <a:prstGeom prst="rect">
             <a:avLst/>
@@ -3464,7 +3485,15 @@
             <a:pPr algn="ctr"/>
             <a:r>
               <a:rPr lang="fr-FR" dirty="0" smtClean="0"/>
-              <a:t>Test management</a:t>
+              <a:t>Course </a:t>
+            </a:r>
+            <a:r>
+              <a:rPr lang="fr-FR" dirty="0" err="1" smtClean="0"/>
+              <a:t>mrg</a:t>
+            </a:r>
+            <a:r>
+              <a:rPr lang="fr-FR" dirty="0" smtClean="0"/>
+              <a:t>.</a:t>
             </a:r>
             <a:endParaRPr lang="fr-FR" dirty="0"/>
           </a:p>
@@ -3481,8 +3510,8 @@
         </p:nvCxnSpPr>
         <p:spPr>
           <a:xfrm flipV="1">
-            <a:off x="9238488" y="1828723"/>
-            <a:ext cx="844296" cy="1941388"/>
+            <a:off x="9238488" y="1626557"/>
+            <a:ext cx="1015797" cy="2143554"/>
           </a:xfrm>
           <a:prstGeom prst="straightConnector1">
             <a:avLst/>
@@ -3517,8 +3546,8 @@
         </p:nvCxnSpPr>
         <p:spPr>
           <a:xfrm flipV="1">
-            <a:off x="9238488" y="2775917"/>
-            <a:ext cx="1015797" cy="994194"/>
+            <a:off x="9238488" y="2459494"/>
+            <a:ext cx="1015797" cy="1310617"/>
           </a:xfrm>
           <a:prstGeom prst="straightConnector1">
             <a:avLst/>
@@ -3552,9 +3581,9 @@
           <p:nvPr/>
         </p:nvCxnSpPr>
         <p:spPr>
-          <a:xfrm>
-            <a:off x="9238488" y="3770111"/>
-            <a:ext cx="909794" cy="154777"/>
+          <a:xfrm flipV="1">
+            <a:off x="9238488" y="3151868"/>
+            <a:ext cx="909794" cy="618243"/>
           </a:xfrm>
           <a:prstGeom prst="straightConnector1">
             <a:avLst/>
@@ -3682,8 +3711,8 @@
         </p:nvSpPr>
         <p:spPr>
           <a:xfrm>
-            <a:off x="10082784" y="4857622"/>
-            <a:ext cx="1853184" cy="780443"/>
+            <a:off x="10219876" y="4848699"/>
+            <a:ext cx="1443194" cy="500666"/>
           </a:xfrm>
           <a:prstGeom prst="rect">
             <a:avLst/>
@@ -3711,12 +3740,16 @@
           <a:p>
             <a:pPr algn="ctr"/>
             <a:r>
+              <a:rPr lang="fr-FR" dirty="0" smtClean="0"/>
+              <a:t>People </a:t>
+            </a:r>
+            <a:r>
               <a:rPr lang="fr-FR" dirty="0" err="1" smtClean="0"/>
-              <a:t>Students</a:t>
-            </a:r>
-            <a:r>
-              <a:rPr lang="fr-FR" dirty="0" smtClean="0"/>
-              <a:t> management</a:t>
+              <a:t>mgr</a:t>
+            </a:r>
+            <a:r>
+              <a:rPr lang="fr-FR" dirty="0" smtClean="0"/>
+              <a:t>.</a:t>
             </a:r>
             <a:endParaRPr lang="fr-FR" dirty="0"/>
           </a:p>
@@ -3734,7 +3767,7 @@
         <p:spPr>
           <a:xfrm>
             <a:off x="9238488" y="3770111"/>
-            <a:ext cx="844296" cy="1477733"/>
+            <a:ext cx="981388" cy="1328921"/>
           </a:xfrm>
           <a:prstGeom prst="straightConnector1">
             <a:avLst/>
@@ -3766,8 +3799,8 @@
         </p:nvSpPr>
         <p:spPr>
           <a:xfrm>
-            <a:off x="10148282" y="5790356"/>
-            <a:ext cx="1853184" cy="780443"/>
+            <a:off x="10194002" y="5556233"/>
+            <a:ext cx="1469068" cy="640566"/>
           </a:xfrm>
           <a:prstGeom prst="rect">
             <a:avLst/>
@@ -3802,6 +3835,172 @@
           </a:p>
         </p:txBody>
       </p:sp>
+      <p:sp>
+        <p:nvSpPr>
+          <p:cNvPr id="3" name="TextBox 2"/>
+          <p:cNvSpPr txBox="1"/>
+          <p:nvPr/>
+        </p:nvSpPr>
+        <p:spPr>
+          <a:xfrm>
+            <a:off x="694944" y="6059424"/>
+            <a:ext cx="6819431" cy="369332"/>
+          </a:xfrm>
+          <a:prstGeom prst="rect">
+            <a:avLst/>
+          </a:prstGeom>
+          <a:noFill/>
+        </p:spPr>
+        <p:txBody>
+          <a:bodyPr wrap="none" rtlCol="0">
+            <a:spAutoFit/>
+          </a:bodyPr>
+          <a:lstStyle/>
+          <a:p>
+            <a:r>
+              <a:rPr lang="fr-FR" dirty="0" smtClean="0"/>
+              <a:t>*people management </a:t>
+            </a:r>
+            <a:r>
+              <a:rPr lang="fr-FR" dirty="0" err="1" smtClean="0"/>
+              <a:t>includes</a:t>
+            </a:r>
+            <a:r>
+              <a:rPr lang="fr-FR" dirty="0" smtClean="0"/>
+              <a:t> management for </a:t>
+            </a:r>
+            <a:r>
+              <a:rPr lang="fr-FR" dirty="0" err="1" smtClean="0"/>
+              <a:t>teachers</a:t>
+            </a:r>
+            <a:r>
+              <a:rPr lang="fr-FR" dirty="0" smtClean="0"/>
+              <a:t> and </a:t>
+            </a:r>
+            <a:r>
+              <a:rPr lang="fr-FR" dirty="0" err="1" smtClean="0"/>
+              <a:t>students</a:t>
+            </a:r>
+            <a:endParaRPr lang="fr-FR" dirty="0"/>
+          </a:p>
+        </p:txBody>
+      </p:sp>
+      <p:sp>
+        <p:nvSpPr>
+          <p:cNvPr id="23" name="Rectangle 22"/>
+          <p:cNvSpPr/>
+          <p:nvPr/>
+        </p:nvSpPr>
+        <p:spPr>
+          <a:xfrm>
+            <a:off x="10203891" y="3690338"/>
+            <a:ext cx="1331976" cy="640127"/>
+          </a:xfrm>
+          <a:prstGeom prst="rect">
+            <a:avLst/>
+          </a:prstGeom>
+        </p:spPr>
+        <p:style>
+          <a:lnRef idx="2">
+            <a:schemeClr val="accent1">
+              <a:shade val="50000"/>
+            </a:schemeClr>
+          </a:lnRef>
+          <a:fillRef idx="1">
+            <a:schemeClr val="accent1"/>
+          </a:fillRef>
+          <a:effectRef idx="0">
+            <a:schemeClr val="accent1"/>
+          </a:effectRef>
+          <a:fontRef idx="minor">
+            <a:schemeClr val="lt1"/>
+          </a:fontRef>
+        </p:style>
+        <p:txBody>
+          <a:bodyPr rtlCol="0" anchor="ctr"/>
+          <a:lstStyle/>
+          <a:p>
+            <a:pPr algn="ctr"/>
+            <a:r>
+              <a:rPr lang="fr-FR" dirty="0" err="1" smtClean="0"/>
+              <a:t>Inbox</a:t>
+            </a:r>
+            <a:endParaRPr lang="fr-FR" dirty="0"/>
+          </a:p>
+        </p:txBody>
+      </p:sp>
+      <p:cxnSp>
+        <p:nvCxnSpPr>
+          <p:cNvPr id="27" name="Straight Arrow Connector 26"/>
+          <p:cNvCxnSpPr>
+            <a:stCxn id="8" idx="3"/>
+            <a:endCxn id="23" idx="1"/>
+          </p:cNvCxnSpPr>
+          <p:nvPr/>
+        </p:nvCxnSpPr>
+        <p:spPr>
+          <a:xfrm>
+            <a:off x="9238488" y="3770111"/>
+            <a:ext cx="965403" cy="240291"/>
+          </a:xfrm>
+          <a:prstGeom prst="straightConnector1">
+            <a:avLst/>
+          </a:prstGeom>
+          <a:ln>
+            <a:tailEnd type="triangle"/>
+          </a:ln>
+        </p:spPr>
+        <p:style>
+          <a:lnRef idx="1">
+            <a:schemeClr val="accent1"/>
+          </a:lnRef>
+          <a:fillRef idx="0">
+            <a:schemeClr val="accent1"/>
+          </a:fillRef>
+          <a:effectRef idx="0">
+            <a:schemeClr val="accent1"/>
+          </a:effectRef>
+          <a:fontRef idx="minor">
+            <a:schemeClr val="tx1"/>
+          </a:fontRef>
+        </p:style>
+      </p:cxnSp>
+      <p:cxnSp>
+        <p:nvCxnSpPr>
+          <p:cNvPr id="31" name="Straight Arrow Connector 30"/>
+          <p:cNvCxnSpPr>
+            <a:stCxn id="8" idx="3"/>
+            <a:endCxn id="22" idx="1"/>
+          </p:cNvCxnSpPr>
+          <p:nvPr/>
+        </p:nvCxnSpPr>
+        <p:spPr>
+          <a:xfrm>
+            <a:off x="9238488" y="3770111"/>
+            <a:ext cx="955514" cy="2106405"/>
+          </a:xfrm>
+          <a:prstGeom prst="straightConnector1">
+            <a:avLst/>
+          </a:prstGeom>
+          <a:ln>
+            <a:tailEnd type="triangle"/>
+          </a:ln>
+        </p:spPr>
+        <p:style>
+          <a:lnRef idx="1">
+            <a:schemeClr val="accent1"/>
+          </a:lnRef>
+          <a:fillRef idx="0">
+            <a:schemeClr val="accent1"/>
+          </a:fillRef>
+          <a:effectRef idx="0">
+            <a:schemeClr val="accent1"/>
+          </a:effectRef>
+          <a:fontRef idx="minor">
+            <a:schemeClr val="tx1"/>
+          </a:fontRef>
+        </p:style>
+      </p:cxnSp>
     </p:spTree>
     <p:extLst>
       <p:ext uri="{BB962C8B-B14F-4D97-AF65-F5344CB8AC3E}">
@@ -3900,11 +4099,7 @@
             <a:pPr algn="ctr"/>
             <a:r>
               <a:rPr lang="fr-FR" dirty="0" smtClean="0"/>
-              <a:t>Select </a:t>
-            </a:r>
-            <a:r>
-              <a:rPr lang="fr-FR" dirty="0" smtClean="0"/>
-              <a:t>Class tab</a:t>
+              <a:t>Select Class tab</a:t>
             </a:r>
             <a:endParaRPr lang="fr-FR" dirty="0"/>
           </a:p>
@@ -4000,23 +4195,11 @@
             <a:pPr algn="ctr"/>
             <a:r>
               <a:rPr lang="fr-FR" dirty="0" smtClean="0"/>
-              <a:t>Set class </a:t>
+              <a:t>Input class </a:t>
             </a:r>
             <a:r>
               <a:rPr lang="fr-FR" dirty="0" err="1" smtClean="0"/>
               <a:t>name</a:t>
-            </a:r>
-            <a:r>
-              <a:rPr lang="fr-FR" dirty="0" smtClean="0"/>
-              <a:t> </a:t>
-            </a:r>
-            <a:r>
-              <a:rPr lang="fr-FR" dirty="0" err="1" smtClean="0"/>
-              <a:t>e.g</a:t>
-            </a:r>
-            <a:r>
-              <a:rPr lang="fr-FR" dirty="0" smtClean="0"/>
-              <a:t>. A1.1</a:t>
             </a:r>
             <a:endParaRPr lang="fr-FR" dirty="0"/>
           </a:p>
@@ -4063,8 +4246,12 @@
               <a:t>Select </a:t>
             </a:r>
             <a:r>
+              <a:rPr lang="fr-FR" dirty="0" smtClean="0"/>
+              <a:t>a </a:t>
+            </a:r>
+            <a:r>
               <a:rPr lang="fr-FR" dirty="0" err="1" smtClean="0"/>
-              <a:t>teachers</a:t>
+              <a:t>teacher</a:t>
             </a:r>
             <a:r>
               <a:rPr lang="fr-FR" dirty="0" smtClean="0"/>
@@ -4472,6 +4659,38 @@
                   <a:srgbClr val="FF0000"/>
                 </a:solidFill>
               </a:rPr>
+              <a:t> or </a:t>
+            </a:r>
+            <a:r>
+              <a:rPr lang="fr-FR" dirty="0" err="1" smtClean="0">
+                <a:solidFill>
+                  <a:srgbClr val="FF0000"/>
+                </a:solidFill>
+              </a:rPr>
+              <a:t>should</a:t>
+            </a:r>
+            <a:r>
+              <a:rPr lang="fr-FR" dirty="0" smtClean="0">
+                <a:solidFill>
+                  <a:srgbClr val="FF0000"/>
+                </a:solidFill>
+              </a:rPr>
+              <a:t> go to </a:t>
+            </a:r>
+            <a:r>
+              <a:rPr lang="fr-FR" altLang="zh-CN" dirty="0" smtClean="0">
+                <a:solidFill>
+                  <a:srgbClr val="FF0000"/>
+                </a:solidFill>
+              </a:rPr>
+              <a:t>People tab</a:t>
+            </a:r>
+            <a:r>
+              <a:rPr lang="fr-FR" dirty="0" smtClean="0">
+                <a:solidFill>
+                  <a:srgbClr val="FF0000"/>
+                </a:solidFill>
+              </a:rPr>
               <a:t>?</a:t>
             </a:r>
             <a:endParaRPr lang="fr-FR" dirty="0">
@@ -4520,11 +4739,7 @@
             <a:pPr algn="ctr"/>
             <a:r>
               <a:rPr lang="fr-FR" dirty="0" smtClean="0"/>
-              <a:t>Select </a:t>
-            </a:r>
-            <a:r>
-              <a:rPr lang="fr-FR" dirty="0" smtClean="0"/>
-              <a:t>Class tab</a:t>
+              <a:t>Select Class tab</a:t>
             </a:r>
             <a:endParaRPr lang="fr-FR" dirty="0"/>
           </a:p>
@@ -4627,8 +4842,8 @@
               <a:t>Edit class </a:t>
             </a:r>
             <a:r>
-              <a:rPr lang="fr-FR" dirty="0" err="1" smtClean="0"/>
-              <a:t>name</a:t>
+              <a:rPr lang="fr-FR" dirty="0" smtClean="0"/>
+              <a:t>info</a:t>
             </a:r>
             <a:endParaRPr lang="fr-FR" dirty="0"/>
           </a:p>
@@ -4968,11 +5183,7 @@
             <a:pPr algn="ctr"/>
             <a:r>
               <a:rPr lang="fr-FR" dirty="0" smtClean="0"/>
-              <a:t>Select </a:t>
-            </a:r>
-            <a:r>
-              <a:rPr lang="fr-FR" dirty="0" smtClean="0"/>
-              <a:t>Class tab</a:t>
+              <a:t>Select Class tab</a:t>
             </a:r>
             <a:endParaRPr lang="fr-FR" dirty="0"/>
           </a:p>
@@ -5158,6 +5369,96 @@
           </a:fontRef>
         </p:style>
       </p:cxnSp>
+      <p:sp>
+        <p:nvSpPr>
+          <p:cNvPr id="35" name="TextBox 34"/>
+          <p:cNvSpPr txBox="1"/>
+          <p:nvPr/>
+        </p:nvSpPr>
+        <p:spPr>
+          <a:xfrm>
+            <a:off x="194163" y="2003319"/>
+            <a:ext cx="613117" cy="369332"/>
+          </a:xfrm>
+          <a:prstGeom prst="rect">
+            <a:avLst/>
+          </a:prstGeom>
+          <a:noFill/>
+        </p:spPr>
+        <p:txBody>
+          <a:bodyPr wrap="none" rtlCol="0">
+            <a:spAutoFit/>
+          </a:bodyPr>
+          <a:lstStyle/>
+          <a:p>
+            <a:r>
+              <a:rPr lang="fr-FR" dirty="0" smtClean="0"/>
+              <a:t>New</a:t>
+            </a:r>
+            <a:endParaRPr lang="fr-FR" dirty="0"/>
+          </a:p>
+        </p:txBody>
+      </p:sp>
+      <p:sp>
+        <p:nvSpPr>
+          <p:cNvPr id="36" name="TextBox 35"/>
+          <p:cNvSpPr txBox="1"/>
+          <p:nvPr/>
+        </p:nvSpPr>
+        <p:spPr>
+          <a:xfrm>
+            <a:off x="155636" y="3176164"/>
+            <a:ext cx="545149" cy="369332"/>
+          </a:xfrm>
+          <a:prstGeom prst="rect">
+            <a:avLst/>
+          </a:prstGeom>
+          <a:noFill/>
+        </p:spPr>
+        <p:txBody>
+          <a:bodyPr wrap="none" rtlCol="0">
+            <a:spAutoFit/>
+          </a:bodyPr>
+          <a:lstStyle/>
+          <a:p>
+            <a:r>
+              <a:rPr lang="fr-FR" dirty="0" smtClean="0"/>
+              <a:t>Edit</a:t>
+            </a:r>
+            <a:endParaRPr lang="fr-FR" dirty="0"/>
+          </a:p>
+        </p:txBody>
+      </p:sp>
+      <p:sp>
+        <p:nvSpPr>
+          <p:cNvPr id="39" name="TextBox 38"/>
+          <p:cNvSpPr txBox="1"/>
+          <p:nvPr/>
+        </p:nvSpPr>
+        <p:spPr>
+          <a:xfrm>
+            <a:off x="69414" y="4191635"/>
+            <a:ext cx="799706" cy="369332"/>
+          </a:xfrm>
+          <a:prstGeom prst="rect">
+            <a:avLst/>
+          </a:prstGeom>
+          <a:noFill/>
+        </p:spPr>
+        <p:txBody>
+          <a:bodyPr wrap="none" rtlCol="0">
+            <a:spAutoFit/>
+          </a:bodyPr>
+          <a:lstStyle/>
+          <a:p>
+            <a:r>
+              <a:rPr lang="fr-FR" dirty="0" err="1" smtClean="0"/>
+              <a:t>Delete</a:t>
+            </a:r>
+            <a:endParaRPr lang="fr-FR" dirty="0"/>
+          </a:p>
+        </p:txBody>
+      </p:sp>
     </p:spTree>
     <p:extLst>
       <p:ext uri="{BB962C8B-B14F-4D97-AF65-F5344CB8AC3E}">
@@ -5205,44 +5506,33 @@
             <p:ph type="title"/>
           </p:nvPr>
         </p:nvSpPr>
-        <p:spPr>
-          <a:xfrm>
-            <a:off x="838200" y="365125"/>
-            <a:ext cx="10515600" cy="768731"/>
-          </a:xfrm>
-        </p:spPr>
-        <p:txBody>
-          <a:bodyPr>
-            <a:normAutofit/>
-          </a:bodyPr>
-          <a:lstStyle/>
-          <a:p>
-            <a:r>
-              <a:rPr lang="fr-FR" dirty="0" err="1" smtClean="0"/>
-              <a:t>Mail</a:t>
-            </a:r>
-            <a:r>
-              <a:rPr lang="fr-FR" dirty="0" err="1" smtClean="0"/>
-              <a:t>box</a:t>
-            </a:r>
-            <a:r>
-              <a:rPr lang="fr-FR" dirty="0" smtClean="0"/>
-              <a:t> flow</a:t>
-            </a:r>
-            <a:endParaRPr lang="fr-FR" sz="3600" dirty="0"/>
-          </a:p>
-        </p:txBody>
-      </p:sp>
-      <p:sp>
-        <p:nvSpPr>
-          <p:cNvPr id="4" name="Rectangle 3"/>
+        <p:spPr/>
+        <p:txBody>
+          <a:bodyPr/>
+          <a:lstStyle/>
+          <a:p>
+            <a:r>
+              <a:rPr lang="fr-FR" dirty="0" smtClean="0"/>
+              <a:t>People management </a:t>
+            </a:r>
+            <a:r>
+              <a:rPr lang="fr-FR" dirty="0" smtClean="0"/>
+              <a:t>flow</a:t>
+            </a:r>
+            <a:endParaRPr lang="fr-FR" dirty="0"/>
+          </a:p>
+        </p:txBody>
+      </p:sp>
+      <p:sp>
+        <p:nvSpPr>
+          <p:cNvPr id="3" name="Rectangle 2"/>
           <p:cNvSpPr/>
           <p:nvPr/>
         </p:nvSpPr>
         <p:spPr>
           <a:xfrm>
-            <a:off x="1067753" y="1746504"/>
-            <a:ext cx="1477518" cy="960120"/>
+            <a:off x="869120" y="1791428"/>
+            <a:ext cx="1597152" cy="755904"/>
           </a:xfrm>
           <a:prstGeom prst="rect">
             <a:avLst/>
@@ -5274,20 +5564,8 @@
               <a:t>Select </a:t>
             </a:r>
             <a:r>
-              <a:rPr lang="fr-FR" dirty="0" err="1" smtClean="0"/>
-              <a:t>Mail</a:t>
-            </a:r>
-            <a:r>
-              <a:rPr lang="fr-FR" dirty="0" err="1" smtClean="0"/>
-              <a:t>box</a:t>
-            </a:r>
-            <a:r>
-              <a:rPr lang="fr-FR" dirty="0" smtClean="0"/>
-              <a:t> </a:t>
-            </a:r>
-            <a:r>
-              <a:rPr lang="fr-FR" dirty="0" smtClean="0"/>
-              <a:t>tab</a:t>
+              <a:rPr lang="fr-FR" dirty="0" smtClean="0"/>
+              <a:t>People tab</a:t>
             </a:r>
             <a:endParaRPr lang="fr-FR" dirty="0"/>
           </a:p>
@@ -5295,14 +5573,14 @@
       </p:sp>
       <p:sp>
         <p:nvSpPr>
-          <p:cNvPr id="5" name="Rectangle 4"/>
+          <p:cNvPr id="4" name="Rectangle 3"/>
           <p:cNvSpPr/>
           <p:nvPr/>
         </p:nvSpPr>
         <p:spPr>
           <a:xfrm>
-            <a:off x="3247073" y="1603248"/>
-            <a:ext cx="1580769" cy="1194816"/>
+            <a:off x="3072790" y="1797779"/>
+            <a:ext cx="1597152" cy="755904"/>
           </a:xfrm>
           <a:prstGeom prst="rect">
             <a:avLst/>
@@ -5331,11 +5609,202 @@
             <a:pPr algn="ctr"/>
             <a:r>
               <a:rPr lang="fr-FR" dirty="0" smtClean="0"/>
-              <a:t>Display List of messages </a:t>
+              <a:t>Select </a:t>
+            </a:r>
+            <a:r>
+              <a:rPr lang="fr-FR" altLang="zh-CN" dirty="0" smtClean="0"/>
+              <a:t>New</a:t>
+            </a:r>
+            <a:endParaRPr lang="fr-FR" dirty="0"/>
+          </a:p>
+        </p:txBody>
+      </p:sp>
+      <p:sp>
+        <p:nvSpPr>
+          <p:cNvPr id="5" name="Rectangle 4"/>
+          <p:cNvSpPr/>
+          <p:nvPr/>
+        </p:nvSpPr>
+        <p:spPr>
+          <a:xfrm>
+            <a:off x="5305450" y="1762855"/>
+            <a:ext cx="1763132" cy="825752"/>
+          </a:xfrm>
+          <a:prstGeom prst="rect">
+            <a:avLst/>
+          </a:prstGeom>
+        </p:spPr>
+        <p:style>
+          <a:lnRef idx="2">
+            <a:schemeClr val="accent1">
+              <a:shade val="50000"/>
+            </a:schemeClr>
+          </a:lnRef>
+          <a:fillRef idx="1">
+            <a:schemeClr val="accent1"/>
+          </a:fillRef>
+          <a:effectRef idx="0">
+            <a:schemeClr val="accent1"/>
+          </a:effectRef>
+          <a:fontRef idx="minor">
+            <a:schemeClr val="lt1"/>
+          </a:fontRef>
+        </p:style>
+        <p:txBody>
+          <a:bodyPr rtlCol="0" anchor="ctr"/>
+          <a:lstStyle/>
+          <a:p>
+            <a:pPr algn="ctr"/>
+            <a:r>
+              <a:rPr lang="fr-FR" dirty="0" smtClean="0"/>
+              <a:t>Input </a:t>
             </a:r>
             <a:r>
               <a:rPr lang="fr-FR" dirty="0" err="1" smtClean="0"/>
-              <a:t>received</a:t>
+              <a:t>name</a:t>
+            </a:r>
+            <a:r>
+              <a:rPr lang="fr-FR" dirty="0" smtClean="0"/>
+              <a:t>, </a:t>
+            </a:r>
+            <a:r>
+              <a:rPr lang="fr-FR" dirty="0" err="1" smtClean="0"/>
+              <a:t>role</a:t>
+            </a:r>
+            <a:r>
+              <a:rPr lang="fr-FR" dirty="0" smtClean="0"/>
+              <a:t> (</a:t>
+            </a:r>
+            <a:r>
+              <a:rPr lang="fr-FR" dirty="0" err="1" smtClean="0"/>
+              <a:t>teacher</a:t>
+            </a:r>
+            <a:r>
+              <a:rPr lang="fr-FR" dirty="0" smtClean="0"/>
+              <a:t> or </a:t>
+            </a:r>
+            <a:r>
+              <a:rPr lang="fr-FR" dirty="0" err="1" smtClean="0"/>
+              <a:t>student</a:t>
+            </a:r>
+            <a:r>
+              <a:rPr lang="fr-FR" dirty="0" smtClean="0"/>
+              <a:t>), etc.</a:t>
+            </a:r>
+            <a:endParaRPr lang="fr-FR" dirty="0"/>
+          </a:p>
+        </p:txBody>
+      </p:sp>
+      <p:sp>
+        <p:nvSpPr>
+          <p:cNvPr id="8" name="Rectangle 7"/>
+          <p:cNvSpPr/>
+          <p:nvPr/>
+        </p:nvSpPr>
+        <p:spPr>
+          <a:xfrm>
+            <a:off x="7888562" y="1810033"/>
+            <a:ext cx="1597152" cy="755904"/>
+          </a:xfrm>
+          <a:prstGeom prst="rect">
+            <a:avLst/>
+          </a:prstGeom>
+          <a:solidFill>
+            <a:srgbClr val="FF0000"/>
+          </a:solidFill>
+        </p:spPr>
+        <p:style>
+          <a:lnRef idx="2">
+            <a:schemeClr val="accent1">
+              <a:shade val="50000"/>
+            </a:schemeClr>
+          </a:lnRef>
+          <a:fillRef idx="1">
+            <a:schemeClr val="accent1"/>
+          </a:fillRef>
+          <a:effectRef idx="0">
+            <a:schemeClr val="accent1"/>
+          </a:effectRef>
+          <a:fontRef idx="minor">
+            <a:schemeClr val="lt1"/>
+          </a:fontRef>
+        </p:style>
+        <p:txBody>
+          <a:bodyPr rtlCol="0" anchor="ctr"/>
+          <a:lstStyle/>
+          <a:p>
+            <a:pPr algn="ctr"/>
+            <a:r>
+              <a:rPr lang="fr-FR" dirty="0" err="1" smtClean="0"/>
+              <a:t>Assign</a:t>
+            </a:r>
+            <a:r>
+              <a:rPr lang="fr-FR" dirty="0" smtClean="0"/>
+              <a:t> to a class</a:t>
+            </a:r>
+            <a:endParaRPr lang="fr-FR" dirty="0"/>
+          </a:p>
+        </p:txBody>
+      </p:sp>
+      <p:sp>
+        <p:nvSpPr>
+          <p:cNvPr id="9" name="Rectangle 8"/>
+          <p:cNvSpPr/>
+          <p:nvPr/>
+        </p:nvSpPr>
+        <p:spPr>
+          <a:xfrm>
+            <a:off x="10305694" y="1797779"/>
+            <a:ext cx="1597152" cy="755904"/>
+          </a:xfrm>
+          <a:prstGeom prst="rect">
+            <a:avLst/>
+          </a:prstGeom>
+        </p:spPr>
+        <p:style>
+          <a:lnRef idx="2">
+            <a:schemeClr val="accent1">
+              <a:shade val="50000"/>
+            </a:schemeClr>
+          </a:lnRef>
+          <a:fillRef idx="1">
+            <a:schemeClr val="accent1"/>
+          </a:fillRef>
+          <a:effectRef idx="0">
+            <a:schemeClr val="accent1"/>
+          </a:effectRef>
+          <a:fontRef idx="minor">
+            <a:schemeClr val="lt1"/>
+          </a:fontRef>
+        </p:style>
+        <p:txBody>
+          <a:bodyPr rtlCol="0" anchor="ctr"/>
+          <a:lstStyle/>
+          <a:p>
+            <a:pPr algn="ctr"/>
+            <a:r>
+              <a:rPr lang="fr-FR" dirty="0" smtClean="0"/>
+              <a:t>Select </a:t>
+            </a:r>
+            <a:r>
+              <a:rPr lang="fr-FR" dirty="0" err="1" smtClean="0"/>
+              <a:t>students</a:t>
+            </a:r>
+            <a:r>
+              <a:rPr lang="fr-FR" dirty="0" smtClean="0"/>
+              <a:t> </a:t>
+            </a:r>
+            <a:r>
+              <a:rPr lang="fr-FR" dirty="0" err="1" smtClean="0"/>
+              <a:t>from</a:t>
+            </a:r>
+            <a:r>
+              <a:rPr lang="fr-FR" dirty="0" smtClean="0"/>
+              <a:t> the </a:t>
+            </a:r>
+            <a:r>
+              <a:rPr lang="fr-FR" dirty="0" err="1" smtClean="0"/>
+              <a:t>list</a:t>
             </a:r>
             <a:endParaRPr lang="fr-FR" dirty="0"/>
           </a:p>
@@ -5343,7 +5812,43 @@
       </p:sp>
       <p:cxnSp>
         <p:nvCxnSpPr>
-          <p:cNvPr id="7" name="Straight Arrow Connector 6"/>
+          <p:cNvPr id="11" name="Straight Arrow Connector 10"/>
+          <p:cNvCxnSpPr>
+            <a:stCxn id="3" idx="3"/>
+            <a:endCxn id="4" idx="1"/>
+          </p:cNvCxnSpPr>
+          <p:nvPr/>
+        </p:nvCxnSpPr>
+        <p:spPr>
+          <a:xfrm>
+            <a:off x="2466272" y="2169380"/>
+            <a:ext cx="606518" cy="6351"/>
+          </a:xfrm>
+          <a:prstGeom prst="straightConnector1">
+            <a:avLst/>
+          </a:prstGeom>
+          <a:ln>
+            <a:tailEnd type="triangle"/>
+          </a:ln>
+        </p:spPr>
+        <p:style>
+          <a:lnRef idx="1">
+            <a:schemeClr val="accent1"/>
+          </a:lnRef>
+          <a:fillRef idx="0">
+            <a:schemeClr val="accent1"/>
+          </a:fillRef>
+          <a:effectRef idx="0">
+            <a:schemeClr val="accent1"/>
+          </a:effectRef>
+          <a:fontRef idx="minor">
+            <a:schemeClr val="tx1"/>
+          </a:fontRef>
+        </p:style>
+      </p:cxnSp>
+      <p:cxnSp>
+        <p:nvCxnSpPr>
+          <p:cNvPr id="13" name="Straight Arrow Connector 12"/>
           <p:cNvCxnSpPr>
             <a:stCxn id="4" idx="3"/>
             <a:endCxn id="5" idx="1"/>
@@ -5351,9 +5856,9 @@
           <p:nvPr/>
         </p:nvCxnSpPr>
         <p:spPr>
-          <a:xfrm flipV="1">
-            <a:off x="2545271" y="2200656"/>
-            <a:ext cx="701802" cy="25908"/>
+          <a:xfrm>
+            <a:off x="4669942" y="2175731"/>
+            <a:ext cx="635508" cy="0"/>
           </a:xfrm>
           <a:prstGeom prst="straightConnector1">
             <a:avLst/>
@@ -5377,16 +5882,88 @@
           </a:fontRef>
         </p:style>
       </p:cxnSp>
-      <p:sp>
-        <p:nvSpPr>
-          <p:cNvPr id="8" name="Rectangle 7"/>
+      <p:cxnSp>
+        <p:nvCxnSpPr>
+          <p:cNvPr id="19" name="Straight Arrow Connector 18"/>
+          <p:cNvCxnSpPr>
+            <a:stCxn id="5" idx="3"/>
+            <a:endCxn id="8" idx="1"/>
+          </p:cNvCxnSpPr>
+          <p:nvPr/>
+        </p:nvCxnSpPr>
+        <p:spPr>
+          <a:xfrm>
+            <a:off x="7068582" y="2175731"/>
+            <a:ext cx="819980" cy="12254"/>
+          </a:xfrm>
+          <a:prstGeom prst="straightConnector1">
+            <a:avLst/>
+          </a:prstGeom>
+          <a:ln>
+            <a:tailEnd type="triangle"/>
+          </a:ln>
+        </p:spPr>
+        <p:style>
+          <a:lnRef idx="1">
+            <a:schemeClr val="accent1"/>
+          </a:lnRef>
+          <a:fillRef idx="0">
+            <a:schemeClr val="accent1"/>
+          </a:fillRef>
+          <a:effectRef idx="0">
+            <a:schemeClr val="accent1"/>
+          </a:effectRef>
+          <a:fontRef idx="minor">
+            <a:schemeClr val="tx1"/>
+          </a:fontRef>
+        </p:style>
+      </p:cxnSp>
+      <p:cxnSp>
+        <p:nvCxnSpPr>
+          <p:cNvPr id="21" name="Straight Arrow Connector 20"/>
+          <p:cNvCxnSpPr>
+            <a:stCxn id="8" idx="3"/>
+            <a:endCxn id="9" idx="1"/>
+          </p:cNvCxnSpPr>
+          <p:nvPr/>
+        </p:nvCxnSpPr>
+        <p:spPr>
+          <a:xfrm flipV="1">
+            <a:off x="9485714" y="2175731"/>
+            <a:ext cx="819980" cy="12254"/>
+          </a:xfrm>
+          <a:prstGeom prst="straightConnector1">
+            <a:avLst/>
+          </a:prstGeom>
+          <a:ln>
+            <a:tailEnd type="triangle"/>
+          </a:ln>
+        </p:spPr>
+        <p:style>
+          <a:lnRef idx="1">
+            <a:schemeClr val="accent1"/>
+          </a:lnRef>
+          <a:fillRef idx="0">
+            <a:schemeClr val="accent1"/>
+          </a:fillRef>
+          <a:effectRef idx="0">
+            <a:schemeClr val="accent1"/>
+          </a:effectRef>
+          <a:fontRef idx="minor">
+            <a:schemeClr val="tx1"/>
+          </a:fontRef>
+        </p:style>
+      </p:cxnSp>
+      <p:sp>
+        <p:nvSpPr>
+          <p:cNvPr id="22" name="Rectangle 21"/>
           <p:cNvSpPr/>
           <p:nvPr/>
         </p:nvSpPr>
         <p:spPr>
           <a:xfrm>
-            <a:off x="5241418" y="1746504"/>
-            <a:ext cx="1645920" cy="908304"/>
+            <a:off x="838200" y="2982878"/>
+            <a:ext cx="1597152" cy="755904"/>
           </a:xfrm>
           <a:prstGeom prst="rect">
             <a:avLst/>
@@ -5415,66 +5992,26 @@
             <a:pPr algn="ctr"/>
             <a:r>
               <a:rPr lang="fr-FR" dirty="0" smtClean="0"/>
-              <a:t>Select compose to </a:t>
-            </a:r>
-            <a:r>
-              <a:rPr lang="fr-FR" dirty="0" err="1" smtClean="0"/>
-              <a:t>create</a:t>
-            </a:r>
-            <a:r>
-              <a:rPr lang="fr-FR" dirty="0" smtClean="0"/>
-              <a:t> a new message</a:t>
+              <a:t>Select </a:t>
+            </a:r>
+            <a:r>
+              <a:rPr lang="fr-FR" dirty="0" smtClean="0"/>
+              <a:t>People tab</a:t>
             </a:r>
             <a:endParaRPr lang="fr-FR" dirty="0"/>
           </a:p>
         </p:txBody>
       </p:sp>
-      <p:cxnSp>
-        <p:nvCxnSpPr>
-          <p:cNvPr id="11" name="Straight Arrow Connector 10"/>
-          <p:cNvCxnSpPr>
-            <a:stCxn id="5" idx="3"/>
-            <a:endCxn id="8" idx="1"/>
-          </p:cNvCxnSpPr>
-          <p:nvPr/>
-        </p:nvCxnSpPr>
-        <p:spPr>
-          <a:xfrm>
-            <a:off x="4827842" y="2200656"/>
-            <a:ext cx="413576" cy="0"/>
-          </a:xfrm>
-          <a:prstGeom prst="straightConnector1">
-            <a:avLst/>
-          </a:prstGeom>
-          <a:ln>
-            <a:tailEnd type="triangle"/>
-          </a:ln>
-        </p:spPr>
-        <p:style>
-          <a:lnRef idx="1">
-            <a:schemeClr val="accent1"/>
-          </a:lnRef>
-          <a:fillRef idx="0">
-            <a:schemeClr val="accent1"/>
-          </a:fillRef>
-          <a:effectRef idx="0">
-            <a:schemeClr val="accent1"/>
-          </a:effectRef>
-          <a:fontRef idx="minor">
-            <a:schemeClr val="tx1"/>
-          </a:fontRef>
-        </p:style>
-      </p:cxnSp>
-      <p:sp>
-        <p:nvSpPr>
-          <p:cNvPr id="15" name="Rectangle 14"/>
+      <p:sp>
+        <p:nvSpPr>
+          <p:cNvPr id="24" name="Rectangle 23"/>
           <p:cNvSpPr/>
           <p:nvPr/>
         </p:nvSpPr>
         <p:spPr>
           <a:xfrm>
-            <a:off x="7300914" y="1749552"/>
-            <a:ext cx="1645920" cy="908304"/>
+            <a:off x="3041870" y="2989229"/>
+            <a:ext cx="1597152" cy="755904"/>
           </a:xfrm>
           <a:prstGeom prst="rect">
             <a:avLst/>
@@ -5502,75 +6039,47 @@
           <a:p>
             <a:pPr algn="ctr"/>
             <a:r>
-              <a:rPr lang="fr-FR" dirty="0" smtClean="0"/>
-              <a:t>S</a:t>
-            </a:r>
-            <a:r>
-              <a:rPr lang="fr-FR" altLang="zh-CN" dirty="0" smtClean="0"/>
-              <a:t>elect </a:t>
-            </a:r>
-            <a:r>
-              <a:rPr lang="fr-FR" altLang="zh-CN" dirty="0" err="1" smtClean="0"/>
-              <a:t>receiver</a:t>
-            </a:r>
-            <a:r>
-              <a:rPr lang="fr-FR" altLang="zh-CN" dirty="0" smtClean="0"/>
-              <a:t>: class or a </a:t>
-            </a:r>
-            <a:r>
-              <a:rPr lang="fr-FR" altLang="zh-CN" dirty="0" err="1" smtClean="0"/>
-              <a:t>student</a:t>
+              <a:rPr lang="fr-FR" dirty="0" err="1" smtClean="0"/>
+              <a:t>Pick</a:t>
+            </a:r>
+            <a:r>
+              <a:rPr lang="fr-FR" dirty="0" smtClean="0"/>
+              <a:t> a </a:t>
+            </a:r>
+            <a:r>
+              <a:rPr lang="fr-FR" dirty="0" err="1" smtClean="0"/>
+              <a:t>person</a:t>
+            </a:r>
+            <a:r>
+              <a:rPr lang="fr-FR" dirty="0" smtClean="0"/>
+              <a:t> and </a:t>
+            </a:r>
+            <a:r>
+              <a:rPr lang="fr-FR" dirty="0" smtClean="0"/>
+              <a:t>select « </a:t>
+            </a:r>
+            <a:r>
+              <a:rPr lang="fr-FR" dirty="0" err="1" smtClean="0"/>
+              <a:t>edit</a:t>
+            </a:r>
+            <a:r>
+              <a:rPr lang="fr-FR" dirty="0" smtClean="0"/>
+              <a:t> »</a:t>
             </a:r>
             <a:endParaRPr lang="fr-FR" dirty="0"/>
           </a:p>
         </p:txBody>
       </p:sp>
-      <p:cxnSp>
-        <p:nvCxnSpPr>
-          <p:cNvPr id="17" name="Straight Arrow Connector 16"/>
-          <p:cNvCxnSpPr>
-            <a:stCxn id="8" idx="3"/>
-            <a:endCxn id="15" idx="1"/>
-          </p:cNvCxnSpPr>
-          <p:nvPr/>
-        </p:nvCxnSpPr>
-        <p:spPr>
-          <a:xfrm>
-            <a:off x="6887338" y="2200656"/>
-            <a:ext cx="413576" cy="3048"/>
-          </a:xfrm>
-          <a:prstGeom prst="straightConnector1">
-            <a:avLst/>
-          </a:prstGeom>
-          <a:ln>
-            <a:tailEnd type="triangle"/>
-          </a:ln>
-        </p:spPr>
-        <p:style>
-          <a:lnRef idx="1">
-            <a:schemeClr val="accent1"/>
-          </a:lnRef>
-          <a:fillRef idx="0">
-            <a:schemeClr val="accent1"/>
-          </a:fillRef>
-          <a:effectRef idx="0">
-            <a:schemeClr val="accent1"/>
-          </a:effectRef>
-          <a:fontRef idx="minor">
-            <a:schemeClr val="tx1"/>
-          </a:fontRef>
-        </p:style>
-      </p:cxnSp>
-      <p:sp>
-        <p:nvSpPr>
-          <p:cNvPr id="27" name="Rectangle 26"/>
+      <p:sp>
+        <p:nvSpPr>
+          <p:cNvPr id="25" name="Rectangle 24"/>
           <p:cNvSpPr/>
           <p:nvPr/>
         </p:nvSpPr>
         <p:spPr>
           <a:xfrm>
-            <a:off x="9616061" y="2654808"/>
-            <a:ext cx="1645920" cy="908304"/>
+            <a:off x="5274530" y="2989229"/>
+            <a:ext cx="1597152" cy="755904"/>
           </a:xfrm>
           <a:prstGeom prst="rect">
             <a:avLst/>
@@ -5598,8 +6107,20 @@
           <a:p>
             <a:pPr algn="ctr"/>
             <a:r>
+              <a:rPr lang="fr-FR" dirty="0" smtClean="0"/>
+              <a:t>Edit </a:t>
+            </a:r>
+            <a:r>
               <a:rPr lang="fr-FR" dirty="0" err="1" smtClean="0"/>
-              <a:t>Send</a:t>
+              <a:t>personal</a:t>
+            </a:r>
+            <a:r>
+              <a:rPr lang="fr-FR" dirty="0" smtClean="0"/>
+              <a:t> info, class </a:t>
+            </a:r>
+            <a:r>
+              <a:rPr lang="fr-FR" dirty="0" err="1" smtClean="0"/>
+              <a:t>assigned</a:t>
             </a:r>
             <a:endParaRPr lang="fr-FR" dirty="0"/>
           </a:p>
@@ -5607,14 +6128,14 @@
       </p:sp>
       <p:sp>
         <p:nvSpPr>
-          <p:cNvPr id="28" name="Rectangle 27"/>
+          <p:cNvPr id="27" name="Rectangle 26"/>
           <p:cNvSpPr/>
           <p:nvPr/>
         </p:nvSpPr>
         <p:spPr>
           <a:xfrm>
-            <a:off x="9616061" y="1261872"/>
-            <a:ext cx="1645920" cy="908304"/>
+            <a:off x="7888562" y="2943239"/>
+            <a:ext cx="1597152" cy="755904"/>
           </a:xfrm>
           <a:prstGeom prst="rect">
             <a:avLst/>
@@ -5642,30 +6163,97 @@
           <a:p>
             <a:pPr algn="ctr"/>
             <a:r>
-              <a:rPr lang="fr-FR" dirty="0" smtClean="0"/>
-              <a:t>Save </a:t>
-            </a:r>
-            <a:r>
               <a:rPr lang="fr-FR" dirty="0" err="1" smtClean="0"/>
-              <a:t>draft</a:t>
+              <a:t>Confirm</a:t>
             </a:r>
             <a:endParaRPr lang="fr-FR" dirty="0"/>
           </a:p>
         </p:txBody>
       </p:sp>
+      <p:cxnSp>
+        <p:nvCxnSpPr>
+          <p:cNvPr id="28" name="Straight Arrow Connector 27"/>
+          <p:cNvCxnSpPr>
+            <a:stCxn id="22" idx="3"/>
+            <a:endCxn id="24" idx="1"/>
+          </p:cNvCxnSpPr>
+          <p:nvPr/>
+        </p:nvCxnSpPr>
+        <p:spPr>
+          <a:xfrm>
+            <a:off x="2435352" y="3360830"/>
+            <a:ext cx="606518" cy="6351"/>
+          </a:xfrm>
+          <a:prstGeom prst="straightConnector1">
+            <a:avLst/>
+          </a:prstGeom>
+          <a:ln>
+            <a:tailEnd type="triangle"/>
+          </a:ln>
+        </p:spPr>
+        <p:style>
+          <a:lnRef idx="1">
+            <a:schemeClr val="accent1"/>
+          </a:lnRef>
+          <a:fillRef idx="0">
+            <a:schemeClr val="accent1"/>
+          </a:fillRef>
+          <a:effectRef idx="0">
+            <a:schemeClr val="accent1"/>
+          </a:effectRef>
+          <a:fontRef idx="minor">
+            <a:schemeClr val="tx1"/>
+          </a:fontRef>
+        </p:style>
+      </p:cxnSp>
+      <p:cxnSp>
+        <p:nvCxnSpPr>
+          <p:cNvPr id="29" name="Straight Arrow Connector 28"/>
+          <p:cNvCxnSpPr>
+            <a:stCxn id="24" idx="3"/>
+            <a:endCxn id="25" idx="1"/>
+          </p:cNvCxnSpPr>
+          <p:nvPr/>
+        </p:nvCxnSpPr>
+        <p:spPr>
+          <a:xfrm>
+            <a:off x="4639022" y="3367181"/>
+            <a:ext cx="635508" cy="0"/>
+          </a:xfrm>
+          <a:prstGeom prst="straightConnector1">
+            <a:avLst/>
+          </a:prstGeom>
+          <a:ln>
+            <a:tailEnd type="triangle"/>
+          </a:ln>
+        </p:spPr>
+        <p:style>
+          <a:lnRef idx="1">
+            <a:schemeClr val="accent1"/>
+          </a:lnRef>
+          <a:fillRef idx="0">
+            <a:schemeClr val="accent1"/>
+          </a:fillRef>
+          <a:effectRef idx="0">
+            <a:schemeClr val="accent1"/>
+          </a:effectRef>
+          <a:fontRef idx="minor">
+            <a:schemeClr val="tx1"/>
+          </a:fontRef>
+        </p:style>
+      </p:cxnSp>
       <p:cxnSp>
         <p:nvCxnSpPr>
           <p:cNvPr id="30" name="Straight Arrow Connector 29"/>
           <p:cNvCxnSpPr>
-            <a:stCxn id="15" idx="3"/>
-            <a:endCxn id="28" idx="1"/>
+            <a:stCxn id="25" idx="3"/>
           </p:cNvCxnSpPr>
           <p:nvPr/>
         </p:nvCxnSpPr>
         <p:spPr>
-          <a:xfrm flipV="1">
-            <a:off x="8946834" y="1716024"/>
-            <a:ext cx="669227" cy="487680"/>
+          <a:xfrm>
+            <a:off x="6871682" y="3367181"/>
+            <a:ext cx="985960" cy="12254"/>
           </a:xfrm>
           <a:prstGeom prst="straightConnector1">
             <a:avLst/>
@@ -5689,52 +6277,16 @@
           </a:fontRef>
         </p:style>
       </p:cxnSp>
-      <p:cxnSp>
-        <p:nvCxnSpPr>
-          <p:cNvPr id="32" name="Straight Arrow Connector 31"/>
-          <p:cNvCxnSpPr>
-            <a:stCxn id="15" idx="3"/>
-            <a:endCxn id="27" idx="1"/>
-          </p:cNvCxnSpPr>
-          <p:nvPr/>
-        </p:nvCxnSpPr>
-        <p:spPr>
-          <a:xfrm>
-            <a:off x="8946834" y="2203704"/>
-            <a:ext cx="669227" cy="905256"/>
-          </a:xfrm>
-          <a:prstGeom prst="straightConnector1">
-            <a:avLst/>
-          </a:prstGeom>
-          <a:ln>
-            <a:tailEnd type="triangle"/>
-          </a:ln>
-        </p:spPr>
-        <p:style>
-          <a:lnRef idx="1">
-            <a:schemeClr val="accent1"/>
-          </a:lnRef>
-          <a:fillRef idx="0">
-            <a:schemeClr val="accent1"/>
-          </a:fillRef>
-          <a:effectRef idx="0">
-            <a:schemeClr val="accent1"/>
-          </a:effectRef>
-          <a:fontRef idx="minor">
-            <a:schemeClr val="tx1"/>
-          </a:fontRef>
-        </p:style>
-      </p:cxnSp>
-      <p:sp>
-        <p:nvSpPr>
-          <p:cNvPr id="33" name="Rectangle 32"/>
+      <p:sp>
+        <p:nvSpPr>
+          <p:cNvPr id="32" name="Rectangle 31"/>
           <p:cNvSpPr/>
           <p:nvPr/>
         </p:nvSpPr>
         <p:spPr>
           <a:xfrm>
-            <a:off x="590836" y="4596384"/>
-            <a:ext cx="1311306" cy="908304"/>
+            <a:off x="869120" y="4209017"/>
+            <a:ext cx="1597152" cy="755904"/>
           </a:xfrm>
           <a:prstGeom prst="rect">
             <a:avLst/>
@@ -5766,20 +6318,8 @@
               <a:t>Select </a:t>
             </a:r>
             <a:r>
-              <a:rPr lang="fr-FR" dirty="0" err="1" smtClean="0"/>
-              <a:t>Mail</a:t>
-            </a:r>
-            <a:r>
-              <a:rPr lang="fr-FR" dirty="0" err="1" smtClean="0"/>
-              <a:t>box</a:t>
-            </a:r>
-            <a:r>
-              <a:rPr lang="fr-FR" dirty="0" smtClean="0"/>
-              <a:t> </a:t>
-            </a:r>
-            <a:r>
-              <a:rPr lang="fr-FR" dirty="0" smtClean="0"/>
-              <a:t>tab</a:t>
+              <a:rPr lang="fr-FR" dirty="0" smtClean="0"/>
+              <a:t>People tab</a:t>
             </a:r>
             <a:endParaRPr lang="fr-FR" dirty="0"/>
           </a:p>
@@ -5787,14 +6327,14 @@
       </p:sp>
       <p:sp>
         <p:nvSpPr>
-          <p:cNvPr id="34" name="Rectangle 33"/>
+          <p:cNvPr id="33" name="Rectangle 32"/>
           <p:cNvSpPr/>
           <p:nvPr/>
         </p:nvSpPr>
         <p:spPr>
           <a:xfrm>
-            <a:off x="2236756" y="4453128"/>
-            <a:ext cx="1580769" cy="1194816"/>
+            <a:off x="3060530" y="4209017"/>
+            <a:ext cx="1597152" cy="755904"/>
           </a:xfrm>
           <a:prstGeom prst="rect">
             <a:avLst/>
@@ -5822,20 +6362,108 @@
           <a:p>
             <a:pPr algn="ctr"/>
             <a:r>
-              <a:rPr lang="fr-FR" dirty="0" smtClean="0"/>
-              <a:t>Display </a:t>
-            </a:r>
-            <a:r>
               <a:rPr lang="fr-FR" dirty="0" err="1" smtClean="0"/>
-              <a:t>list</a:t>
-            </a:r>
-            <a:r>
-              <a:rPr lang="fr-FR" dirty="0" smtClean="0"/>
-              <a:t> of messages </a:t>
+              <a:t>Pick</a:t>
+            </a:r>
+            <a:r>
+              <a:rPr lang="fr-FR" dirty="0" smtClean="0"/>
+              <a:t> a </a:t>
+            </a:r>
+            <a:r>
+              <a:rPr lang="fr-FR" dirty="0" smtClean="0"/>
+              <a:t>people and </a:t>
+            </a:r>
+            <a:r>
+              <a:rPr lang="fr-FR" dirty="0" smtClean="0"/>
+              <a:t>select « </a:t>
             </a:r>
             <a:r>
               <a:rPr lang="fr-FR" dirty="0" err="1" smtClean="0"/>
-              <a:t>received</a:t>
+              <a:t>delete</a:t>
+            </a:r>
+            <a:r>
+              <a:rPr lang="fr-FR" dirty="0" smtClean="0"/>
+              <a:t> »</a:t>
+            </a:r>
+            <a:endParaRPr lang="fr-FR" dirty="0"/>
+          </a:p>
+        </p:txBody>
+      </p:sp>
+      <p:sp>
+        <p:nvSpPr>
+          <p:cNvPr id="34" name="Rectangle 33"/>
+          <p:cNvSpPr/>
+          <p:nvPr/>
+        </p:nvSpPr>
+        <p:spPr>
+          <a:xfrm>
+            <a:off x="5282861" y="3976071"/>
+            <a:ext cx="1930942" cy="1235045"/>
+          </a:xfrm>
+          <a:prstGeom prst="rect">
+            <a:avLst/>
+          </a:prstGeom>
+        </p:spPr>
+        <p:style>
+          <a:lnRef idx="2">
+            <a:schemeClr val="accent1">
+              <a:shade val="50000"/>
+            </a:schemeClr>
+          </a:lnRef>
+          <a:fillRef idx="1">
+            <a:schemeClr val="accent1"/>
+          </a:fillRef>
+          <a:effectRef idx="0">
+            <a:schemeClr val="accent1"/>
+          </a:effectRef>
+          <a:fontRef idx="minor">
+            <a:schemeClr val="lt1"/>
+          </a:fontRef>
+        </p:style>
+        <p:txBody>
+          <a:bodyPr rtlCol="0" anchor="ctr"/>
+          <a:lstStyle/>
+          <a:p>
+            <a:pPr algn="ctr"/>
+            <a:r>
+              <a:rPr lang="fr-FR" dirty="0" err="1" smtClean="0"/>
+              <a:t>Cannot</a:t>
+            </a:r>
+            <a:r>
+              <a:rPr lang="fr-FR" dirty="0" smtClean="0"/>
+              <a:t> </a:t>
+            </a:r>
+            <a:r>
+              <a:rPr lang="fr-FR" dirty="0" err="1" smtClean="0"/>
+              <a:t>delete</a:t>
+            </a:r>
+            <a:r>
+              <a:rPr lang="fr-FR" dirty="0" smtClean="0"/>
+              <a:t> a </a:t>
+            </a:r>
+            <a:r>
+              <a:rPr lang="fr-FR" dirty="0" err="1" smtClean="0"/>
+              <a:t>teacher</a:t>
+            </a:r>
+            <a:r>
+              <a:rPr lang="fr-FR" dirty="0" smtClean="0"/>
+              <a:t> if the </a:t>
+            </a:r>
+            <a:r>
+              <a:rPr lang="fr-FR" dirty="0" err="1" smtClean="0"/>
+              <a:t>only</a:t>
+            </a:r>
+            <a:r>
+              <a:rPr lang="fr-FR" dirty="0" smtClean="0"/>
+              <a:t> one </a:t>
+            </a:r>
+            <a:r>
+              <a:rPr lang="fr-FR" dirty="0" err="1" smtClean="0"/>
+              <a:t>assigned</a:t>
+            </a:r>
+            <a:r>
+              <a:rPr lang="fr-FR" dirty="0" smtClean="0"/>
+              <a:t> to the class</a:t>
             </a:r>
             <a:endParaRPr lang="fr-FR" dirty="0"/>
           </a:p>
@@ -5843,7 +6471,43 @@
       </p:sp>
       <p:cxnSp>
         <p:nvCxnSpPr>
-          <p:cNvPr id="35" name="Straight Arrow Connector 34"/>
+          <p:cNvPr id="37" name="Straight Arrow Connector 36"/>
+          <p:cNvCxnSpPr>
+            <a:stCxn id="32" idx="3"/>
+            <a:endCxn id="33" idx="1"/>
+          </p:cNvCxnSpPr>
+          <p:nvPr/>
+        </p:nvCxnSpPr>
+        <p:spPr>
+          <a:xfrm>
+            <a:off x="2466272" y="4586969"/>
+            <a:ext cx="594258" cy="0"/>
+          </a:xfrm>
+          <a:prstGeom prst="straightConnector1">
+            <a:avLst/>
+          </a:prstGeom>
+          <a:ln>
+            <a:tailEnd type="triangle"/>
+          </a:ln>
+        </p:spPr>
+        <p:style>
+          <a:lnRef idx="1">
+            <a:schemeClr val="accent1"/>
+          </a:lnRef>
+          <a:fillRef idx="0">
+            <a:schemeClr val="accent1"/>
+          </a:fillRef>
+          <a:effectRef idx="0">
+            <a:schemeClr val="accent1"/>
+          </a:effectRef>
+          <a:fontRef idx="minor">
+            <a:schemeClr val="tx1"/>
+          </a:fontRef>
+        </p:style>
+      </p:cxnSp>
+      <p:cxnSp>
+        <p:nvCxnSpPr>
+          <p:cNvPr id="38" name="Straight Arrow Connector 37"/>
           <p:cNvCxnSpPr>
             <a:stCxn id="33" idx="3"/>
             <a:endCxn id="34" idx="1"/>
@@ -5852,8 +6516,8 @@
         </p:nvCxnSpPr>
         <p:spPr>
           <a:xfrm>
-            <a:off x="1902142" y="5050536"/>
-            <a:ext cx="334614" cy="0"/>
+            <a:off x="4657682" y="4586969"/>
+            <a:ext cx="625179" cy="6625"/>
           </a:xfrm>
           <a:prstGeom prst="straightConnector1">
             <a:avLst/>
@@ -5879,14 +6543,104 @@
       </p:cxnSp>
       <p:sp>
         <p:nvSpPr>
-          <p:cNvPr id="36" name="Rectangle 35"/>
+          <p:cNvPr id="14" name="TextBox 13"/>
+          <p:cNvSpPr txBox="1"/>
+          <p:nvPr/>
+        </p:nvSpPr>
+        <p:spPr>
+          <a:xfrm>
+            <a:off x="194163" y="2003319"/>
+            <a:ext cx="613117" cy="369332"/>
+          </a:xfrm>
+          <a:prstGeom prst="rect">
+            <a:avLst/>
+          </a:prstGeom>
+          <a:noFill/>
+        </p:spPr>
+        <p:txBody>
+          <a:bodyPr wrap="none" rtlCol="0">
+            <a:spAutoFit/>
+          </a:bodyPr>
+          <a:lstStyle/>
+          <a:p>
+            <a:r>
+              <a:rPr lang="fr-FR" dirty="0" smtClean="0"/>
+              <a:t>New</a:t>
+            </a:r>
+            <a:endParaRPr lang="fr-FR" dirty="0"/>
+          </a:p>
+        </p:txBody>
+      </p:sp>
+      <p:sp>
+        <p:nvSpPr>
+          <p:cNvPr id="35" name="TextBox 34"/>
+          <p:cNvSpPr txBox="1"/>
+          <p:nvPr/>
+        </p:nvSpPr>
+        <p:spPr>
+          <a:xfrm>
+            <a:off x="62355" y="3194769"/>
+            <a:ext cx="545149" cy="369332"/>
+          </a:xfrm>
+          <a:prstGeom prst="rect">
+            <a:avLst/>
+          </a:prstGeom>
+          <a:noFill/>
+        </p:spPr>
+        <p:txBody>
+          <a:bodyPr wrap="none" rtlCol="0">
+            <a:spAutoFit/>
+          </a:bodyPr>
+          <a:lstStyle/>
+          <a:p>
+            <a:r>
+              <a:rPr lang="fr-FR" dirty="0" smtClean="0"/>
+              <a:t>Edit</a:t>
+            </a:r>
+            <a:endParaRPr lang="fr-FR" dirty="0"/>
+          </a:p>
+        </p:txBody>
+      </p:sp>
+      <p:sp>
+        <p:nvSpPr>
+          <p:cNvPr id="36" name="TextBox 35"/>
+          <p:cNvSpPr txBox="1"/>
+          <p:nvPr/>
+        </p:nvSpPr>
+        <p:spPr>
+          <a:xfrm>
+            <a:off x="66559" y="4310468"/>
+            <a:ext cx="799706" cy="369332"/>
+          </a:xfrm>
+          <a:prstGeom prst="rect">
+            <a:avLst/>
+          </a:prstGeom>
+          <a:noFill/>
+        </p:spPr>
+        <p:txBody>
+          <a:bodyPr wrap="none" rtlCol="0">
+            <a:spAutoFit/>
+          </a:bodyPr>
+          <a:lstStyle/>
+          <a:p>
+            <a:r>
+              <a:rPr lang="fr-FR" dirty="0" err="1" smtClean="0"/>
+              <a:t>Delete</a:t>
+            </a:r>
+            <a:endParaRPr lang="fr-FR" dirty="0"/>
+          </a:p>
+        </p:txBody>
+      </p:sp>
+      <p:sp>
+        <p:nvSpPr>
+          <p:cNvPr id="39" name="Rectangle 38"/>
           <p:cNvSpPr/>
           <p:nvPr/>
         </p:nvSpPr>
         <p:spPr>
           <a:xfrm>
-            <a:off x="4269533" y="4596384"/>
-            <a:ext cx="1645920" cy="908304"/>
+            <a:off x="7857642" y="4207464"/>
+            <a:ext cx="1597152" cy="755904"/>
           </a:xfrm>
           <a:prstGeom prst="rect">
             <a:avLst/>
@@ -5914,58 +6668,34 @@
           <a:p>
             <a:pPr algn="ctr"/>
             <a:r>
-              <a:rPr lang="fr-FR" dirty="0" smtClean="0">
-                <a:solidFill>
-                  <a:schemeClr val="bg1"/>
-                </a:solidFill>
-              </a:rPr>
-              <a:t>Select a message sent </a:t>
-            </a:r>
-            <a:r>
-              <a:rPr lang="fr-FR" dirty="0" err="1" smtClean="0">
-                <a:solidFill>
-                  <a:schemeClr val="bg1"/>
-                </a:solidFill>
-              </a:rPr>
-              <a:t>from</a:t>
-            </a:r>
-            <a:r>
-              <a:rPr lang="fr-FR" dirty="0" smtClean="0">
-                <a:solidFill>
-                  <a:schemeClr val="bg1"/>
-                </a:solidFill>
-              </a:rPr>
-              <a:t> </a:t>
-            </a:r>
-            <a:r>
-              <a:rPr lang="fr-FR" dirty="0" err="1" smtClean="0">
-                <a:solidFill>
-                  <a:schemeClr val="bg1"/>
-                </a:solidFill>
-              </a:rPr>
-              <a:t>students</a:t>
-            </a:r>
-            <a:endParaRPr lang="fr-FR" dirty="0">
-              <a:solidFill>
-                <a:schemeClr val="bg1"/>
-              </a:solidFill>
-            </a:endParaRPr>
+              <a:rPr lang="fr-FR" dirty="0" err="1" smtClean="0"/>
+              <a:t>Confirm</a:t>
+            </a:r>
+            <a:r>
+              <a:rPr lang="fr-FR" dirty="0" smtClean="0"/>
+              <a:t> the </a:t>
+            </a:r>
+            <a:r>
+              <a:rPr lang="fr-FR" dirty="0" err="1" smtClean="0"/>
+              <a:t>deletion</a:t>
+            </a:r>
+            <a:endParaRPr lang="fr-FR" dirty="0"/>
           </a:p>
         </p:txBody>
       </p:sp>
       <p:cxnSp>
         <p:nvCxnSpPr>
-          <p:cNvPr id="37" name="Straight Arrow Connector 36"/>
+          <p:cNvPr id="41" name="Straight Arrow Connector 40"/>
           <p:cNvCxnSpPr>
             <a:stCxn id="34" idx="3"/>
-            <a:endCxn id="36" idx="1"/>
+            <a:endCxn id="39" idx="1"/>
           </p:cNvCxnSpPr>
           <p:nvPr/>
         </p:nvCxnSpPr>
         <p:spPr>
-          <a:xfrm>
-            <a:off x="3817525" y="5050536"/>
-            <a:ext cx="452008" cy="0"/>
+          <a:xfrm flipV="1">
+            <a:off x="7213803" y="4585416"/>
+            <a:ext cx="643839" cy="8178"/>
           </a:xfrm>
           <a:prstGeom prst="straightConnector1">
             <a:avLst/>
@@ -5991,47 +6721,37 @@
       </p:cxnSp>
       <p:sp>
         <p:nvSpPr>
-          <p:cNvPr id="38" name="Rectangle 37"/>
-          <p:cNvSpPr/>
-          <p:nvPr/>
-        </p:nvSpPr>
-        <p:spPr>
-          <a:xfrm>
-            <a:off x="6366126" y="4608576"/>
-            <a:ext cx="1413226" cy="896112"/>
+          <p:cNvPr id="43" name="TextBox 42"/>
+          <p:cNvSpPr txBox="1"/>
+          <p:nvPr/>
+        </p:nvSpPr>
+        <p:spPr>
+          <a:xfrm>
+            <a:off x="807280" y="5742432"/>
+            <a:ext cx="7648697" cy="369332"/>
           </a:xfrm>
           <a:prstGeom prst="rect">
             <a:avLst/>
           </a:prstGeom>
-        </p:spPr>
-        <p:style>
-          <a:lnRef idx="2">
-            <a:schemeClr val="accent1">
-              <a:shade val="50000"/>
-            </a:schemeClr>
-          </a:lnRef>
-          <a:fillRef idx="1">
-            <a:schemeClr val="accent1"/>
-          </a:fillRef>
-          <a:effectRef idx="0">
-            <a:schemeClr val="accent1"/>
-          </a:effectRef>
-          <a:fontRef idx="minor">
-            <a:schemeClr val="lt1"/>
-          </a:fontRef>
-        </p:style>
-        <p:txBody>
-          <a:bodyPr rtlCol="0" anchor="ctr"/>
-          <a:lstStyle/>
-          <a:p>
-            <a:pPr algn="ctr"/>
+          <a:noFill/>
+        </p:spPr>
+        <p:txBody>
+          <a:bodyPr wrap="none" rtlCol="0">
+            <a:spAutoFit/>
+          </a:bodyPr>
+          <a:lstStyle/>
+          <a:p>
+            <a:pPr marL="285750" indent="-285750">
+              <a:buFont typeface="Arial" panose="020B0604020202020204" pitchFamily="34" charset="0"/>
+              <a:buChar char="•"/>
+            </a:pPr>
             <a:r>
               <a:rPr lang="fr-FR" dirty="0" smtClean="0">
                 <a:solidFill>
                   <a:srgbClr val="FF0000"/>
                 </a:solidFill>
               </a:rPr>
-              <a:t>Select </a:t>
+              <a:t>Do </a:t>
             </a:r>
             <a:r>
               <a:rPr lang="fr-FR" dirty="0" err="1" smtClean="0">
@@ -6039,261 +6759,7 @@
                   <a:srgbClr val="FF0000"/>
                 </a:solidFill>
               </a:rPr>
-              <a:t>reply</a:t>
-            </a:r>
-            <a:r>
-              <a:rPr lang="fr-FR" dirty="0" smtClean="0">
-                <a:solidFill>
-                  <a:srgbClr val="FF0000"/>
-                </a:solidFill>
-              </a:rPr>
-              <a:t> back</a:t>
-            </a:r>
-            <a:endParaRPr lang="fr-FR" dirty="0">
-              <a:solidFill>
-                <a:srgbClr val="FF0000"/>
-              </a:solidFill>
-            </a:endParaRPr>
-          </a:p>
-        </p:txBody>
-      </p:sp>
-      <p:cxnSp>
-        <p:nvCxnSpPr>
-          <p:cNvPr id="39" name="Straight Arrow Connector 38"/>
-          <p:cNvCxnSpPr>
-            <a:stCxn id="36" idx="3"/>
-            <a:endCxn id="38" idx="1"/>
-          </p:cNvCxnSpPr>
-          <p:nvPr/>
-        </p:nvCxnSpPr>
-        <p:spPr>
-          <a:xfrm>
-            <a:off x="5915453" y="5050536"/>
-            <a:ext cx="450673" cy="6096"/>
-          </a:xfrm>
-          <a:prstGeom prst="straightConnector1">
-            <a:avLst/>
-          </a:prstGeom>
-          <a:ln>
-            <a:tailEnd type="triangle"/>
-          </a:ln>
-        </p:spPr>
-        <p:style>
-          <a:lnRef idx="1">
-            <a:schemeClr val="accent1"/>
-          </a:lnRef>
-          <a:fillRef idx="0">
-            <a:schemeClr val="accent1"/>
-          </a:fillRef>
-          <a:effectRef idx="0">
-            <a:schemeClr val="accent1"/>
-          </a:effectRef>
-          <a:fontRef idx="minor">
-            <a:schemeClr val="tx1"/>
-          </a:fontRef>
-        </p:style>
-      </p:cxnSp>
-      <p:sp>
-        <p:nvSpPr>
-          <p:cNvPr id="40" name="Rectangle 39"/>
-          <p:cNvSpPr/>
-          <p:nvPr/>
-        </p:nvSpPr>
-        <p:spPr>
-          <a:xfrm>
-            <a:off x="10439021" y="5398008"/>
-            <a:ext cx="1069469" cy="810768"/>
-          </a:xfrm>
-          <a:prstGeom prst="rect">
-            <a:avLst/>
-          </a:prstGeom>
-        </p:spPr>
-        <p:style>
-          <a:lnRef idx="2">
-            <a:schemeClr val="accent1">
-              <a:shade val="50000"/>
-            </a:schemeClr>
-          </a:lnRef>
-          <a:fillRef idx="1">
-            <a:schemeClr val="accent1"/>
-          </a:fillRef>
-          <a:effectRef idx="0">
-            <a:schemeClr val="accent1"/>
-          </a:effectRef>
-          <a:fontRef idx="minor">
-            <a:schemeClr val="lt1"/>
-          </a:fontRef>
-        </p:style>
-        <p:txBody>
-          <a:bodyPr rtlCol="0" anchor="ctr"/>
-          <a:lstStyle/>
-          <a:p>
-            <a:pPr algn="ctr"/>
-            <a:r>
-              <a:rPr lang="fr-FR" dirty="0" err="1" smtClean="0"/>
-              <a:t>Send</a:t>
-            </a:r>
-            <a:endParaRPr lang="fr-FR" dirty="0"/>
-          </a:p>
-        </p:txBody>
-      </p:sp>
-      <p:sp>
-        <p:nvSpPr>
-          <p:cNvPr id="41" name="Rectangle 40"/>
-          <p:cNvSpPr/>
-          <p:nvPr/>
-        </p:nvSpPr>
-        <p:spPr>
-          <a:xfrm>
-            <a:off x="10439021" y="4187952"/>
-            <a:ext cx="1334738" cy="762000"/>
-          </a:xfrm>
-          <a:prstGeom prst="rect">
-            <a:avLst/>
-          </a:prstGeom>
-        </p:spPr>
-        <p:style>
-          <a:lnRef idx="2">
-            <a:schemeClr val="accent1">
-              <a:shade val="50000"/>
-            </a:schemeClr>
-          </a:lnRef>
-          <a:fillRef idx="1">
-            <a:schemeClr val="accent1"/>
-          </a:fillRef>
-          <a:effectRef idx="0">
-            <a:schemeClr val="accent1"/>
-          </a:effectRef>
-          <a:fontRef idx="minor">
-            <a:schemeClr val="lt1"/>
-          </a:fontRef>
-        </p:style>
-        <p:txBody>
-          <a:bodyPr rtlCol="0" anchor="ctr"/>
-          <a:lstStyle/>
-          <a:p>
-            <a:pPr algn="ctr"/>
-            <a:r>
-              <a:rPr lang="fr-FR" dirty="0" smtClean="0"/>
-              <a:t>Save </a:t>
-            </a:r>
-            <a:r>
-              <a:rPr lang="fr-FR" dirty="0" err="1" smtClean="0"/>
-              <a:t>draft</a:t>
-            </a:r>
-            <a:endParaRPr lang="fr-FR" dirty="0"/>
-          </a:p>
-        </p:txBody>
-      </p:sp>
-      <p:cxnSp>
-        <p:nvCxnSpPr>
-          <p:cNvPr id="42" name="Straight Arrow Connector 41"/>
-          <p:cNvCxnSpPr>
-            <a:stCxn id="65" idx="3"/>
-            <a:endCxn id="41" idx="1"/>
-          </p:cNvCxnSpPr>
-          <p:nvPr/>
-        </p:nvCxnSpPr>
-        <p:spPr>
-          <a:xfrm flipV="1">
-            <a:off x="9732408" y="4568952"/>
-            <a:ext cx="706613" cy="487680"/>
-          </a:xfrm>
-          <a:prstGeom prst="straightConnector1">
-            <a:avLst/>
-          </a:prstGeom>
-          <a:ln>
-            <a:tailEnd type="triangle"/>
-          </a:ln>
-        </p:spPr>
-        <p:style>
-          <a:lnRef idx="1">
-            <a:schemeClr val="accent1"/>
-          </a:lnRef>
-          <a:fillRef idx="0">
-            <a:schemeClr val="accent1"/>
-          </a:fillRef>
-          <a:effectRef idx="0">
-            <a:schemeClr val="accent1"/>
-          </a:effectRef>
-          <a:fontRef idx="minor">
-            <a:schemeClr val="tx1"/>
-          </a:fontRef>
-        </p:style>
-      </p:cxnSp>
-      <p:cxnSp>
-        <p:nvCxnSpPr>
-          <p:cNvPr id="43" name="Straight Arrow Connector 42"/>
-          <p:cNvCxnSpPr>
-            <a:stCxn id="65" idx="3"/>
-            <a:endCxn id="40" idx="1"/>
-          </p:cNvCxnSpPr>
-          <p:nvPr/>
-        </p:nvCxnSpPr>
-        <p:spPr>
-          <a:xfrm>
-            <a:off x="9732408" y="5056632"/>
-            <a:ext cx="706613" cy="746760"/>
-          </a:xfrm>
-          <a:prstGeom prst="straightConnector1">
-            <a:avLst/>
-          </a:prstGeom>
-          <a:ln>
-            <a:tailEnd type="triangle"/>
-          </a:ln>
-        </p:spPr>
-        <p:style>
-          <a:lnRef idx="1">
-            <a:schemeClr val="accent1"/>
-          </a:lnRef>
-          <a:fillRef idx="0">
-            <a:schemeClr val="accent1"/>
-          </a:fillRef>
-          <a:effectRef idx="0">
-            <a:schemeClr val="accent1"/>
-          </a:effectRef>
-          <a:fontRef idx="minor">
-            <a:schemeClr val="tx1"/>
-          </a:fontRef>
-        </p:style>
-      </p:cxnSp>
-      <p:sp>
-        <p:nvSpPr>
-          <p:cNvPr id="45" name="TextBox 44"/>
-          <p:cNvSpPr txBox="1"/>
-          <p:nvPr/>
-        </p:nvSpPr>
-        <p:spPr>
-          <a:xfrm>
-            <a:off x="2182368" y="6352032"/>
-            <a:ext cx="5049011" cy="369332"/>
-          </a:xfrm>
-          <a:prstGeom prst="rect">
-            <a:avLst/>
-          </a:prstGeom>
-          <a:noFill/>
-        </p:spPr>
-        <p:txBody>
-          <a:bodyPr wrap="none" rtlCol="0">
-            <a:spAutoFit/>
-          </a:bodyPr>
-          <a:lstStyle/>
-          <a:p>
-            <a:r>
-              <a:rPr lang="fr-FR" dirty="0" smtClean="0">
-                <a:solidFill>
-                  <a:srgbClr val="FF0000"/>
-                </a:solidFill>
-              </a:rPr>
-              <a:t>* How </a:t>
-            </a:r>
-            <a:r>
-              <a:rPr lang="fr-FR" dirty="0" err="1" smtClean="0">
-                <a:solidFill>
-                  <a:srgbClr val="FF0000"/>
-                </a:solidFill>
-              </a:rPr>
-              <a:t>can</a:t>
+              <a:t>we</a:t>
             </a:r>
             <a:r>
               <a:rPr lang="fr-FR" dirty="0" smtClean="0">
@@ -6309,23 +6775,7 @@
                   <a:srgbClr val="FF0000"/>
                 </a:solidFill>
               </a:rPr>
-              <a:t>we</a:t>
-            </a:r>
-            <a:r>
-              <a:rPr lang="fr-FR" dirty="0" smtClean="0">
-                <a:solidFill>
-                  <a:srgbClr val="FF0000"/>
-                </a:solidFill>
-              </a:rPr>
-              <a:t> block </a:t>
-            </a:r>
-            <a:r>
-              <a:rPr lang="fr-FR" dirty="0" err="1" smtClean="0">
-                <a:solidFill>
-                  <a:srgbClr val="FF0000"/>
-                </a:solidFill>
-              </a:rPr>
-              <a:t>teachers</a:t>
+              <a:t>allow</a:t>
             </a:r>
             <a:r>
               <a:rPr lang="fr-FR" dirty="0" smtClean="0">
@@ -6341,7 +6791,7 @@
                   <a:srgbClr val="FF0000"/>
                 </a:solidFill>
               </a:rPr>
-              <a:t>add</a:t>
+              <a:t>assign</a:t>
             </a:r>
             <a:r>
               <a:rPr lang="fr-FR" dirty="0" smtClean="0">
@@ -6349,7 +6799,55 @@
                   <a:srgbClr val="FF0000"/>
                 </a:solidFill>
               </a:rPr>
-              <a:t> the class alias? </a:t>
+              <a:t> a </a:t>
+            </a:r>
+            <a:r>
+              <a:rPr lang="fr-FR" dirty="0" err="1" smtClean="0">
+                <a:solidFill>
+                  <a:srgbClr val="FF0000"/>
+                </a:solidFill>
+              </a:rPr>
+              <a:t>teacher</a:t>
+            </a:r>
+            <a:r>
+              <a:rPr lang="fr-FR" dirty="0" smtClean="0">
+                <a:solidFill>
+                  <a:srgbClr val="FF0000"/>
+                </a:solidFill>
+              </a:rPr>
+              <a:t> to a class </a:t>
+            </a:r>
+            <a:r>
+              <a:rPr lang="fr-FR" dirty="0" err="1" smtClean="0">
+                <a:solidFill>
+                  <a:srgbClr val="FF0000"/>
+                </a:solidFill>
+              </a:rPr>
+              <a:t>here</a:t>
+            </a:r>
+            <a:r>
+              <a:rPr lang="fr-FR" dirty="0" smtClean="0">
+                <a:solidFill>
+                  <a:srgbClr val="FF0000"/>
+                </a:solidFill>
+              </a:rPr>
+              <a:t> or </a:t>
+            </a:r>
+            <a:r>
+              <a:rPr lang="fr-FR" dirty="0" err="1" smtClean="0">
+                <a:solidFill>
+                  <a:srgbClr val="FF0000"/>
+                </a:solidFill>
+              </a:rPr>
+              <a:t>should</a:t>
+            </a:r>
+            <a:r>
+              <a:rPr lang="fr-FR" dirty="0" smtClean="0">
+                <a:solidFill>
+                  <a:srgbClr val="FF0000"/>
+                </a:solidFill>
+              </a:rPr>
+              <a:t> switch to Class tab?</a:t>
             </a:r>
             <a:endParaRPr lang="fr-FR" dirty="0">
               <a:solidFill>
@@ -6359,114 +6857,10 @@
           </a:p>
         </p:txBody>
       </p:sp>
-      <p:sp>
-        <p:nvSpPr>
-          <p:cNvPr id="65" name="Rectangle 64"/>
-          <p:cNvSpPr/>
-          <p:nvPr/>
-        </p:nvSpPr>
-        <p:spPr>
-          <a:xfrm>
-            <a:off x="8319182" y="4608576"/>
-            <a:ext cx="1413226" cy="896112"/>
-          </a:xfrm>
-          <a:prstGeom prst="rect">
-            <a:avLst/>
-          </a:prstGeom>
-        </p:spPr>
-        <p:style>
-          <a:lnRef idx="2">
-            <a:schemeClr val="accent1">
-              <a:shade val="50000"/>
-            </a:schemeClr>
-          </a:lnRef>
-          <a:fillRef idx="1">
-            <a:schemeClr val="accent1"/>
-          </a:fillRef>
-          <a:effectRef idx="0">
-            <a:schemeClr val="accent1"/>
-          </a:effectRef>
-          <a:fontRef idx="minor">
-            <a:schemeClr val="lt1"/>
-          </a:fontRef>
-        </p:style>
-        <p:txBody>
-          <a:bodyPr rtlCol="0" anchor="ctr"/>
-          <a:lstStyle/>
-          <a:p>
-            <a:pPr algn="ctr"/>
-            <a:r>
-              <a:rPr lang="fr-FR" dirty="0" smtClean="0">
-                <a:solidFill>
-                  <a:schemeClr val="tx1"/>
-                </a:solidFill>
-              </a:rPr>
-              <a:t>Compose </a:t>
-            </a:r>
-            <a:r>
-              <a:rPr lang="fr-FR" dirty="0" err="1" smtClean="0">
-                <a:solidFill>
-                  <a:schemeClr val="tx1"/>
-                </a:solidFill>
-              </a:rPr>
-              <a:t>reply</a:t>
-            </a:r>
-            <a:r>
-              <a:rPr lang="fr-FR" dirty="0" smtClean="0">
-                <a:solidFill>
-                  <a:schemeClr val="tx1"/>
-                </a:solidFill>
-              </a:rPr>
-              <a:t> message</a:t>
-            </a:r>
-            <a:endParaRPr lang="fr-FR" dirty="0">
-              <a:solidFill>
-                <a:schemeClr val="tx1"/>
-              </a:solidFill>
-            </a:endParaRPr>
-          </a:p>
-        </p:txBody>
-      </p:sp>
-      <p:cxnSp>
-        <p:nvCxnSpPr>
-          <p:cNvPr id="67" name="Straight Arrow Connector 66"/>
-          <p:cNvCxnSpPr>
-            <a:stCxn id="38" idx="3"/>
-            <a:endCxn id="65" idx="1"/>
-          </p:cNvCxnSpPr>
-          <p:nvPr/>
-        </p:nvCxnSpPr>
-        <p:spPr>
-          <a:xfrm>
-            <a:off x="7779352" y="5056632"/>
-            <a:ext cx="539830" cy="0"/>
-          </a:xfrm>
-          <a:prstGeom prst="straightConnector1">
-            <a:avLst/>
-          </a:prstGeom>
-          <a:ln>
-            <a:tailEnd type="triangle"/>
-          </a:ln>
-        </p:spPr>
-        <p:style>
-          <a:lnRef idx="1">
-            <a:schemeClr val="accent1"/>
-          </a:lnRef>
-          <a:fillRef idx="0">
-            <a:schemeClr val="accent1"/>
-          </a:fillRef>
-          <a:effectRef idx="0">
-            <a:schemeClr val="accent1"/>
-          </a:effectRef>
-          <a:fontRef idx="minor">
-            <a:schemeClr val="tx1"/>
-          </a:fontRef>
-        </p:style>
-      </p:cxnSp>
     </p:spTree>
     <p:extLst>
       <p:ext uri="{BB962C8B-B14F-4D97-AF65-F5344CB8AC3E}">
-        <p14:creationId xmlns:p14="http://schemas.microsoft.com/office/powerpoint/2010/main" val="1849182865"/>
+        <p14:creationId xmlns:p14="http://schemas.microsoft.com/office/powerpoint/2010/main" val="1421602634"/>
       </p:ext>
     </p:extLst>
   </p:cSld>
@@ -6510,29 +6904,44 @@
             <p:ph type="title"/>
           </p:nvPr>
         </p:nvSpPr>
-        <p:spPr/>
-        <p:txBody>
-          <a:bodyPr/>
-          <a:lstStyle/>
-          <a:p>
-            <a:r>
-              <a:rPr lang="fr-FR" dirty="0" smtClean="0"/>
-              <a:t>Q&amp;A flow – Pri2</a:t>
-            </a:r>
-            <a:endParaRPr lang="fr-FR" dirty="0"/>
-          </a:p>
-        </p:txBody>
-      </p:sp>
-      <p:sp>
-        <p:nvSpPr>
-          <p:cNvPr id="3" name="Rectangle 2"/>
+        <p:spPr>
+          <a:xfrm>
+            <a:off x="838200" y="365125"/>
+            <a:ext cx="10515600" cy="768731"/>
+          </a:xfrm>
+        </p:spPr>
+        <p:txBody>
+          <a:bodyPr>
+            <a:normAutofit/>
+          </a:bodyPr>
+          <a:lstStyle/>
+          <a:p>
+            <a:r>
+              <a:rPr lang="fr-FR" altLang="zh-CN" dirty="0" err="1" smtClean="0"/>
+              <a:t>Inbox</a:t>
+            </a:r>
+            <a:r>
+              <a:rPr lang="fr-FR" dirty="0" smtClean="0"/>
+              <a:t> </a:t>
+            </a:r>
+            <a:r>
+              <a:rPr lang="fr-FR" dirty="0" smtClean="0"/>
+              <a:t>flow</a:t>
+            </a:r>
+            <a:endParaRPr lang="fr-FR" sz="3600" dirty="0"/>
+          </a:p>
+        </p:txBody>
+      </p:sp>
+      <p:sp>
+        <p:nvSpPr>
+          <p:cNvPr id="4" name="Rectangle 3"/>
           <p:cNvSpPr/>
           <p:nvPr/>
         </p:nvSpPr>
         <p:spPr>
           <a:xfrm>
-            <a:off x="509016" y="2005267"/>
-            <a:ext cx="1597152" cy="755904"/>
+            <a:off x="1100328" y="1722120"/>
+            <a:ext cx="1477518" cy="960120"/>
           </a:xfrm>
           <a:prstGeom prst="rect">
             <a:avLst/>
@@ -6561,7 +6970,19 @@
             <a:pPr algn="ctr"/>
             <a:r>
               <a:rPr lang="fr-FR" dirty="0" smtClean="0"/>
-              <a:t>Select FAQ tab</a:t>
+              <a:t>Select </a:t>
+            </a:r>
+            <a:r>
+              <a:rPr lang="fr-FR" dirty="0" err="1" smtClean="0"/>
+              <a:t>Inbox</a:t>
+            </a:r>
+            <a:r>
+              <a:rPr lang="fr-FR" dirty="0" smtClean="0"/>
+              <a:t> </a:t>
+            </a:r>
+            <a:r>
+              <a:rPr lang="fr-FR" dirty="0" smtClean="0"/>
+              <a:t>tab</a:t>
             </a:r>
             <a:endParaRPr lang="fr-FR" dirty="0"/>
           </a:p>
@@ -6569,14 +6990,14 @@
       </p:sp>
       <p:sp>
         <p:nvSpPr>
-          <p:cNvPr id="4" name="Rectangle 3"/>
+          <p:cNvPr id="5" name="Rectangle 4"/>
           <p:cNvSpPr/>
           <p:nvPr/>
         </p:nvSpPr>
         <p:spPr>
           <a:xfrm>
-            <a:off x="2712686" y="2011618"/>
-            <a:ext cx="1597152" cy="755904"/>
+            <a:off x="3247073" y="1603248"/>
+            <a:ext cx="1580769" cy="1194816"/>
           </a:xfrm>
           <a:prstGeom prst="rect">
             <a:avLst/>
@@ -6605,24 +7026,52 @@
             <a:pPr algn="ctr"/>
             <a:r>
               <a:rPr lang="fr-FR" dirty="0" smtClean="0"/>
-              <a:t>Display </a:t>
+              <a:t>Display List of messages </a:t>
             </a:r>
             <a:r>
               <a:rPr lang="fr-FR" dirty="0" err="1" smtClean="0"/>
-              <a:t>list</a:t>
-            </a:r>
-            <a:r>
-              <a:rPr lang="fr-FR" dirty="0" smtClean="0"/>
-              <a:t> of Question </a:t>
-            </a:r>
-            <a:r>
-              <a:rPr lang="fr-FR" dirty="0" err="1" smtClean="0"/>
-              <a:t>title</a:t>
+              <a:t>received</a:t>
             </a:r>
             <a:endParaRPr lang="fr-FR" dirty="0"/>
           </a:p>
         </p:txBody>
       </p:sp>
+      <p:cxnSp>
+        <p:nvCxnSpPr>
+          <p:cNvPr id="7" name="Straight Arrow Connector 6"/>
+          <p:cNvCxnSpPr>
+            <a:stCxn id="4" idx="3"/>
+            <a:endCxn id="5" idx="1"/>
+          </p:cNvCxnSpPr>
+          <p:nvPr/>
+        </p:nvCxnSpPr>
+        <p:spPr>
+          <a:xfrm flipV="1">
+            <a:off x="2577846" y="2200656"/>
+            <a:ext cx="669227" cy="1524"/>
+          </a:xfrm>
+          <a:prstGeom prst="straightConnector1">
+            <a:avLst/>
+          </a:prstGeom>
+          <a:ln>
+            <a:tailEnd type="triangle"/>
+          </a:ln>
+        </p:spPr>
+        <p:style>
+          <a:lnRef idx="1">
+            <a:schemeClr val="accent1"/>
+          </a:lnRef>
+          <a:fillRef idx="0">
+            <a:schemeClr val="accent1"/>
+          </a:fillRef>
+          <a:effectRef idx="0">
+            <a:schemeClr val="accent1"/>
+          </a:effectRef>
+          <a:fontRef idx="minor">
+            <a:schemeClr val="tx1"/>
+          </a:fontRef>
+        </p:style>
+      </p:cxnSp>
       <p:sp>
         <p:nvSpPr>
           <p:cNvPr id="8" name="Rectangle 7"/>
@@ -6631,8 +7080,8 @@
         </p:nvSpPr>
         <p:spPr>
           <a:xfrm>
-            <a:off x="7528458" y="2023872"/>
-            <a:ext cx="1597152" cy="755904"/>
+            <a:off x="5241418" y="1746504"/>
+            <a:ext cx="1645920" cy="908304"/>
           </a:xfrm>
           <a:prstGeom prst="rect">
             <a:avLst/>
@@ -6661,26 +7110,70 @@
             <a:pPr algn="ctr"/>
             <a:r>
               <a:rPr lang="fr-FR" dirty="0" smtClean="0"/>
-              <a:t>Input question and </a:t>
+              <a:t>Select </a:t>
+            </a:r>
+            <a:r>
+              <a:rPr lang="fr-FR" dirty="0" smtClean="0"/>
+              <a:t>to </a:t>
             </a:r>
             <a:r>
               <a:rPr lang="fr-FR" dirty="0" err="1" smtClean="0"/>
-              <a:t>answer</a:t>
+              <a:t>create</a:t>
+            </a:r>
+            <a:r>
+              <a:rPr lang="fr-FR" dirty="0" smtClean="0"/>
+              <a:t> a new message</a:t>
             </a:r>
             <a:endParaRPr lang="fr-FR" dirty="0"/>
           </a:p>
         </p:txBody>
       </p:sp>
-      <p:sp>
-        <p:nvSpPr>
-          <p:cNvPr id="9" name="Rectangle 8"/>
+      <p:cxnSp>
+        <p:nvCxnSpPr>
+          <p:cNvPr id="11" name="Straight Arrow Connector 10"/>
+          <p:cNvCxnSpPr>
+            <a:stCxn id="5" idx="3"/>
+            <a:endCxn id="8" idx="1"/>
+          </p:cNvCxnSpPr>
+          <p:nvPr/>
+        </p:nvCxnSpPr>
+        <p:spPr>
+          <a:xfrm>
+            <a:off x="4827842" y="2200656"/>
+            <a:ext cx="413576" cy="0"/>
+          </a:xfrm>
+          <a:prstGeom prst="straightConnector1">
+            <a:avLst/>
+          </a:prstGeom>
+          <a:ln>
+            <a:tailEnd type="triangle"/>
+          </a:ln>
+        </p:spPr>
+        <p:style>
+          <a:lnRef idx="1">
+            <a:schemeClr val="accent1"/>
+          </a:lnRef>
+          <a:fillRef idx="0">
+            <a:schemeClr val="accent1"/>
+          </a:fillRef>
+          <a:effectRef idx="0">
+            <a:schemeClr val="accent1"/>
+          </a:effectRef>
+          <a:fontRef idx="minor">
+            <a:schemeClr val="tx1"/>
+          </a:fontRef>
+        </p:style>
+      </p:cxnSp>
+      <p:sp>
+        <p:nvSpPr>
+          <p:cNvPr id="15" name="Rectangle 14"/>
           <p:cNvSpPr/>
           <p:nvPr/>
         </p:nvSpPr>
         <p:spPr>
           <a:xfrm>
-            <a:off x="10008006" y="1224979"/>
-            <a:ext cx="1597152" cy="755904"/>
+            <a:off x="7300914" y="1749552"/>
+            <a:ext cx="1645920" cy="908304"/>
           </a:xfrm>
           <a:prstGeom prst="rect">
             <a:avLst/>
@@ -6709,11 +7202,23 @@
             <a:pPr algn="ctr"/>
             <a:r>
               <a:rPr lang="fr-FR" dirty="0" smtClean="0"/>
-              <a:t>Save </a:t>
-            </a:r>
-            <a:r>
-              <a:rPr lang="fr-FR" dirty="0" err="1" smtClean="0"/>
-              <a:t>draft</a:t>
+              <a:t>S</a:t>
+            </a:r>
+            <a:r>
+              <a:rPr lang="fr-FR" altLang="zh-CN" dirty="0" smtClean="0"/>
+              <a:t>elect </a:t>
+            </a:r>
+            <a:r>
+              <a:rPr lang="fr-FR" altLang="zh-CN" dirty="0" err="1" smtClean="0"/>
+              <a:t>receiver</a:t>
+            </a:r>
+            <a:r>
+              <a:rPr lang="fr-FR" altLang="zh-CN" dirty="0" smtClean="0"/>
+              <a:t>: class or a </a:t>
+            </a:r>
+            <a:r>
+              <a:rPr lang="fr-FR" altLang="zh-CN" dirty="0" err="1" smtClean="0"/>
+              <a:t>student</a:t>
             </a:r>
             <a:endParaRPr lang="fr-FR" dirty="0"/>
           </a:p>
@@ -6721,17 +7226,17 @@
       </p:sp>
       <p:cxnSp>
         <p:nvCxnSpPr>
-          <p:cNvPr id="10" name="Straight Arrow Connector 9"/>
+          <p:cNvPr id="17" name="Straight Arrow Connector 16"/>
           <p:cNvCxnSpPr>
-            <a:stCxn id="3" idx="3"/>
-            <a:endCxn id="4" idx="1"/>
+            <a:stCxn id="8" idx="3"/>
+            <a:endCxn id="15" idx="1"/>
           </p:cNvCxnSpPr>
           <p:nvPr/>
         </p:nvCxnSpPr>
         <p:spPr>
           <a:xfrm>
-            <a:off x="2106168" y="2383219"/>
-            <a:ext cx="606518" cy="6351"/>
+            <a:off x="6887338" y="2200656"/>
+            <a:ext cx="413576" cy="3048"/>
           </a:xfrm>
           <a:prstGeom prst="straightConnector1">
             <a:avLst/>
@@ -6755,122 +7260,16 @@
           </a:fontRef>
         </p:style>
       </p:cxnSp>
-      <p:cxnSp>
-        <p:nvCxnSpPr>
-          <p:cNvPr id="11" name="Straight Arrow Connector 10"/>
-          <p:cNvCxnSpPr>
-            <a:stCxn id="4" idx="3"/>
-          </p:cNvCxnSpPr>
-          <p:nvPr/>
-        </p:nvCxnSpPr>
-        <p:spPr>
-          <a:xfrm>
-            <a:off x="4309838" y="2389570"/>
-            <a:ext cx="635508" cy="0"/>
-          </a:xfrm>
-          <a:prstGeom prst="straightConnector1">
-            <a:avLst/>
-          </a:prstGeom>
-          <a:ln>
-            <a:tailEnd type="triangle"/>
-          </a:ln>
-        </p:spPr>
-        <p:style>
-          <a:lnRef idx="1">
-            <a:schemeClr val="accent1"/>
-          </a:lnRef>
-          <a:fillRef idx="0">
-            <a:schemeClr val="accent1"/>
-          </a:fillRef>
-          <a:effectRef idx="0">
-            <a:schemeClr val="accent1"/>
-          </a:effectRef>
-          <a:fontRef idx="minor">
-            <a:schemeClr val="tx1"/>
-          </a:fontRef>
-        </p:style>
-      </p:cxnSp>
-      <p:cxnSp>
-        <p:nvCxnSpPr>
-          <p:cNvPr id="14" name="Straight Arrow Connector 13"/>
-          <p:cNvCxnSpPr>
-            <a:endCxn id="8" idx="1"/>
-          </p:cNvCxnSpPr>
-          <p:nvPr/>
-        </p:nvCxnSpPr>
-        <p:spPr>
-          <a:xfrm>
-            <a:off x="6542498" y="2389570"/>
-            <a:ext cx="985960" cy="12254"/>
-          </a:xfrm>
-          <a:prstGeom prst="straightConnector1">
-            <a:avLst/>
-          </a:prstGeom>
-          <a:ln>
-            <a:tailEnd type="triangle"/>
-          </a:ln>
-        </p:spPr>
-        <p:style>
-          <a:lnRef idx="1">
-            <a:schemeClr val="accent1"/>
-          </a:lnRef>
-          <a:fillRef idx="0">
-            <a:schemeClr val="accent1"/>
-          </a:fillRef>
-          <a:effectRef idx="0">
-            <a:schemeClr val="accent1"/>
-          </a:effectRef>
-          <a:fontRef idx="minor">
-            <a:schemeClr val="tx1"/>
-          </a:fontRef>
-        </p:style>
-      </p:cxnSp>
-      <p:cxnSp>
-        <p:nvCxnSpPr>
-          <p:cNvPr id="15" name="Straight Arrow Connector 14"/>
-          <p:cNvCxnSpPr>
-            <a:stCxn id="8" idx="3"/>
-            <a:endCxn id="9" idx="1"/>
-          </p:cNvCxnSpPr>
-          <p:nvPr/>
-        </p:nvCxnSpPr>
-        <p:spPr>
-          <a:xfrm flipV="1">
-            <a:off x="9125610" y="1602931"/>
-            <a:ext cx="882396" cy="798893"/>
-          </a:xfrm>
-          <a:prstGeom prst="straightConnector1">
-            <a:avLst/>
-          </a:prstGeom>
-          <a:ln>
-            <a:tailEnd type="triangle"/>
-          </a:ln>
-        </p:spPr>
-        <p:style>
-          <a:lnRef idx="1">
-            <a:schemeClr val="accent1"/>
-          </a:lnRef>
-          <a:fillRef idx="0">
-            <a:schemeClr val="accent1"/>
-          </a:fillRef>
-          <a:effectRef idx="0">
-            <a:schemeClr val="accent1"/>
-          </a:effectRef>
-          <a:fontRef idx="minor">
-            <a:schemeClr val="tx1"/>
-          </a:fontRef>
-        </p:style>
-      </p:cxnSp>
-      <p:sp>
-        <p:nvSpPr>
-          <p:cNvPr id="21" name="Rectangle 20"/>
+      <p:sp>
+        <p:nvSpPr>
+          <p:cNvPr id="27" name="Rectangle 26"/>
           <p:cNvSpPr/>
           <p:nvPr/>
         </p:nvSpPr>
         <p:spPr>
           <a:xfrm>
-            <a:off x="10008006" y="2710532"/>
-            <a:ext cx="1510284" cy="761713"/>
+            <a:off x="9616061" y="2654808"/>
+            <a:ext cx="1645920" cy="908304"/>
           </a:xfrm>
           <a:prstGeom prst="rect">
             <a:avLst/>
@@ -6899,58 +7298,22 @@
             <a:pPr algn="ctr"/>
             <a:r>
               <a:rPr lang="fr-FR" dirty="0" err="1" smtClean="0"/>
-              <a:t>Publish</a:t>
+              <a:t>Send</a:t>
             </a:r>
             <a:endParaRPr lang="fr-FR" dirty="0"/>
           </a:p>
         </p:txBody>
       </p:sp>
-      <p:cxnSp>
-        <p:nvCxnSpPr>
-          <p:cNvPr id="23" name="Straight Arrow Connector 22"/>
-          <p:cNvCxnSpPr>
-            <a:stCxn id="8" idx="3"/>
-            <a:endCxn id="21" idx="1"/>
-          </p:cNvCxnSpPr>
-          <p:nvPr/>
-        </p:nvCxnSpPr>
-        <p:spPr>
-          <a:xfrm>
-            <a:off x="9125610" y="2401824"/>
-            <a:ext cx="882396" cy="689565"/>
-          </a:xfrm>
-          <a:prstGeom prst="straightConnector1">
-            <a:avLst/>
-          </a:prstGeom>
-          <a:ln>
-            <a:tailEnd type="triangle"/>
-          </a:ln>
-        </p:spPr>
-        <p:style>
-          <a:lnRef idx="1">
-            <a:schemeClr val="accent1"/>
-          </a:lnRef>
-          <a:fillRef idx="0">
-            <a:schemeClr val="accent1"/>
-          </a:fillRef>
-          <a:effectRef idx="0">
-            <a:schemeClr val="accent1"/>
-          </a:effectRef>
-          <a:fontRef idx="minor">
-            <a:schemeClr val="tx1"/>
-          </a:fontRef>
-        </p:style>
-      </p:cxnSp>
-      <p:sp>
-        <p:nvSpPr>
-          <p:cNvPr id="22" name="Rectangle 21"/>
+      <p:sp>
+        <p:nvSpPr>
+          <p:cNvPr id="28" name="Rectangle 27"/>
           <p:cNvSpPr/>
           <p:nvPr/>
         </p:nvSpPr>
         <p:spPr>
           <a:xfrm>
-            <a:off x="4945346" y="1992155"/>
-            <a:ext cx="1597152" cy="755904"/>
+            <a:off x="9616061" y="1261872"/>
+            <a:ext cx="1645920" cy="908304"/>
           </a:xfrm>
           <a:prstGeom prst="rect">
             <a:avLst/>
@@ -6979,26 +7342,98 @@
             <a:pPr algn="ctr"/>
             <a:r>
               <a:rPr lang="fr-FR" dirty="0" smtClean="0"/>
-              <a:t>Select to </a:t>
+              <a:t>Save </a:t>
             </a:r>
             <a:r>
               <a:rPr lang="fr-FR" dirty="0" err="1" smtClean="0"/>
-              <a:t>create</a:t>
+              <a:t>draft</a:t>
             </a:r>
             <a:endParaRPr lang="fr-FR" dirty="0"/>
           </a:p>
         </p:txBody>
       </p:sp>
-      <p:sp>
-        <p:nvSpPr>
-          <p:cNvPr id="38" name="Rectangle 37"/>
+      <p:cxnSp>
+        <p:nvCxnSpPr>
+          <p:cNvPr id="30" name="Straight Arrow Connector 29"/>
+          <p:cNvCxnSpPr>
+            <a:stCxn id="15" idx="3"/>
+            <a:endCxn id="28" idx="1"/>
+          </p:cNvCxnSpPr>
+          <p:nvPr/>
+        </p:nvCxnSpPr>
+        <p:spPr>
+          <a:xfrm flipV="1">
+            <a:off x="8946834" y="1716024"/>
+            <a:ext cx="669227" cy="487680"/>
+          </a:xfrm>
+          <a:prstGeom prst="straightConnector1">
+            <a:avLst/>
+          </a:prstGeom>
+          <a:ln>
+            <a:tailEnd type="triangle"/>
+          </a:ln>
+        </p:spPr>
+        <p:style>
+          <a:lnRef idx="1">
+            <a:schemeClr val="accent1"/>
+          </a:lnRef>
+          <a:fillRef idx="0">
+            <a:schemeClr val="accent1"/>
+          </a:fillRef>
+          <a:effectRef idx="0">
+            <a:schemeClr val="accent1"/>
+          </a:effectRef>
+          <a:fontRef idx="minor">
+            <a:schemeClr val="tx1"/>
+          </a:fontRef>
+        </p:style>
+      </p:cxnSp>
+      <p:cxnSp>
+        <p:nvCxnSpPr>
+          <p:cNvPr id="32" name="Straight Arrow Connector 31"/>
+          <p:cNvCxnSpPr>
+            <a:stCxn id="15" idx="3"/>
+            <a:endCxn id="27" idx="1"/>
+          </p:cNvCxnSpPr>
+          <p:nvPr/>
+        </p:nvCxnSpPr>
+        <p:spPr>
+          <a:xfrm>
+            <a:off x="8946834" y="2203704"/>
+            <a:ext cx="669227" cy="905256"/>
+          </a:xfrm>
+          <a:prstGeom prst="straightConnector1">
+            <a:avLst/>
+          </a:prstGeom>
+          <a:ln>
+            <a:tailEnd type="triangle"/>
+          </a:ln>
+        </p:spPr>
+        <p:style>
+          <a:lnRef idx="1">
+            <a:schemeClr val="accent1"/>
+          </a:lnRef>
+          <a:fillRef idx="0">
+            <a:schemeClr val="accent1"/>
+          </a:fillRef>
+          <a:effectRef idx="0">
+            <a:schemeClr val="accent1"/>
+          </a:effectRef>
+          <a:fontRef idx="minor">
+            <a:schemeClr val="tx1"/>
+          </a:fontRef>
+        </p:style>
+      </p:cxnSp>
+      <p:sp>
+        <p:nvSpPr>
+          <p:cNvPr id="33" name="Rectangle 32"/>
           <p:cNvSpPr/>
           <p:nvPr/>
         </p:nvSpPr>
         <p:spPr>
           <a:xfrm>
-            <a:off x="9921036" y="4033364"/>
-            <a:ext cx="1684122" cy="989740"/>
+            <a:off x="590836" y="4596384"/>
+            <a:ext cx="1311306" cy="908304"/>
           </a:xfrm>
           <a:prstGeom prst="rect">
             <a:avLst/>
@@ -7026,20 +7461,72 @@
           <a:p>
             <a:pPr algn="ctr"/>
             <a:r>
+              <a:rPr lang="fr-FR" dirty="0" smtClean="0"/>
+              <a:t>Select </a:t>
+            </a:r>
+            <a:r>
               <a:rPr lang="fr-FR" dirty="0" err="1" smtClean="0"/>
-              <a:t>Send</a:t>
-            </a:r>
-            <a:r>
-              <a:rPr lang="fr-FR" dirty="0" smtClean="0"/>
-              <a:t> an </a:t>
+              <a:t>Mailbox</a:t>
+            </a:r>
+            <a:r>
+              <a:rPr lang="fr-FR" dirty="0" smtClean="0"/>
+              <a:t> tab</a:t>
+            </a:r>
+            <a:endParaRPr lang="fr-FR" dirty="0"/>
+          </a:p>
+        </p:txBody>
+      </p:sp>
+      <p:sp>
+        <p:nvSpPr>
+          <p:cNvPr id="34" name="Rectangle 33"/>
+          <p:cNvSpPr/>
+          <p:nvPr/>
+        </p:nvSpPr>
+        <p:spPr>
+          <a:xfrm>
+            <a:off x="2236756" y="4453128"/>
+            <a:ext cx="1580769" cy="1194816"/>
+          </a:xfrm>
+          <a:prstGeom prst="rect">
+            <a:avLst/>
+          </a:prstGeom>
+        </p:spPr>
+        <p:style>
+          <a:lnRef idx="2">
+            <a:schemeClr val="accent1">
+              <a:shade val="50000"/>
+            </a:schemeClr>
+          </a:lnRef>
+          <a:fillRef idx="1">
+            <a:schemeClr val="accent1"/>
+          </a:fillRef>
+          <a:effectRef idx="0">
+            <a:schemeClr val="accent1"/>
+          </a:effectRef>
+          <a:fontRef idx="minor">
+            <a:schemeClr val="lt1"/>
+          </a:fontRef>
+        </p:style>
+        <p:txBody>
+          <a:bodyPr rtlCol="0" anchor="ctr"/>
+          <a:lstStyle/>
+          <a:p>
+            <a:pPr algn="ctr"/>
+            <a:r>
+              <a:rPr lang="fr-FR" dirty="0" smtClean="0"/>
+              <a:t>Display </a:t>
             </a:r>
             <a:r>
               <a:rPr lang="fr-FR" dirty="0" err="1" smtClean="0"/>
-              <a:t>announcement</a:t>
-            </a:r>
-            <a:r>
-              <a:rPr lang="fr-FR" dirty="0" smtClean="0"/>
-              <a:t> to the class</a:t>
+              <a:t>list</a:t>
+            </a:r>
+            <a:r>
+              <a:rPr lang="fr-FR" dirty="0" smtClean="0"/>
+              <a:t> of messages </a:t>
+            </a:r>
+            <a:r>
+              <a:rPr lang="fr-FR" dirty="0" err="1" smtClean="0"/>
+              <a:t>received</a:t>
             </a:r>
             <a:endParaRPr lang="fr-FR" dirty="0"/>
           </a:p>
@@ -7049,15 +7536,601 @@
         <p:nvCxnSpPr>
           <p:cNvPr id="35" name="Straight Arrow Connector 34"/>
           <p:cNvCxnSpPr>
-            <a:stCxn id="21" idx="2"/>
-            <a:endCxn id="38" idx="0"/>
+            <a:stCxn id="33" idx="3"/>
+            <a:endCxn id="34" idx="1"/>
           </p:cNvCxnSpPr>
           <p:nvPr/>
         </p:nvCxnSpPr>
         <p:spPr>
-          <a:xfrm flipH="1">
-            <a:off x="10763097" y="3472245"/>
-            <a:ext cx="51" cy="561119"/>
+          <a:xfrm>
+            <a:off x="1902142" y="5050536"/>
+            <a:ext cx="334614" cy="0"/>
+          </a:xfrm>
+          <a:prstGeom prst="straightConnector1">
+            <a:avLst/>
+          </a:prstGeom>
+          <a:ln>
+            <a:tailEnd type="triangle"/>
+          </a:ln>
+        </p:spPr>
+        <p:style>
+          <a:lnRef idx="1">
+            <a:schemeClr val="accent1"/>
+          </a:lnRef>
+          <a:fillRef idx="0">
+            <a:schemeClr val="accent1"/>
+          </a:fillRef>
+          <a:effectRef idx="0">
+            <a:schemeClr val="accent1"/>
+          </a:effectRef>
+          <a:fontRef idx="minor">
+            <a:schemeClr val="tx1"/>
+          </a:fontRef>
+        </p:style>
+      </p:cxnSp>
+      <p:sp>
+        <p:nvSpPr>
+          <p:cNvPr id="36" name="Rectangle 35"/>
+          <p:cNvSpPr/>
+          <p:nvPr/>
+        </p:nvSpPr>
+        <p:spPr>
+          <a:xfrm>
+            <a:off x="4269533" y="4596384"/>
+            <a:ext cx="1645920" cy="908304"/>
+          </a:xfrm>
+          <a:prstGeom prst="rect">
+            <a:avLst/>
+          </a:prstGeom>
+        </p:spPr>
+        <p:style>
+          <a:lnRef idx="2">
+            <a:schemeClr val="accent1">
+              <a:shade val="50000"/>
+            </a:schemeClr>
+          </a:lnRef>
+          <a:fillRef idx="1">
+            <a:schemeClr val="accent1"/>
+          </a:fillRef>
+          <a:effectRef idx="0">
+            <a:schemeClr val="accent1"/>
+          </a:effectRef>
+          <a:fontRef idx="minor">
+            <a:schemeClr val="lt1"/>
+          </a:fontRef>
+        </p:style>
+        <p:txBody>
+          <a:bodyPr rtlCol="0" anchor="ctr"/>
+          <a:lstStyle/>
+          <a:p>
+            <a:pPr algn="ctr"/>
+            <a:r>
+              <a:rPr lang="fr-FR" dirty="0" smtClean="0">
+                <a:solidFill>
+                  <a:schemeClr val="bg1"/>
+                </a:solidFill>
+              </a:rPr>
+              <a:t>Select a message sent </a:t>
+            </a:r>
+            <a:r>
+              <a:rPr lang="fr-FR" dirty="0" err="1" smtClean="0">
+                <a:solidFill>
+                  <a:schemeClr val="bg1"/>
+                </a:solidFill>
+              </a:rPr>
+              <a:t>from</a:t>
+            </a:r>
+            <a:r>
+              <a:rPr lang="fr-FR" dirty="0" smtClean="0">
+                <a:solidFill>
+                  <a:schemeClr val="bg1"/>
+                </a:solidFill>
+              </a:rPr>
+              <a:t> </a:t>
+            </a:r>
+            <a:r>
+              <a:rPr lang="fr-FR" dirty="0" err="1" smtClean="0">
+                <a:solidFill>
+                  <a:schemeClr val="bg1"/>
+                </a:solidFill>
+              </a:rPr>
+              <a:t>students</a:t>
+            </a:r>
+            <a:endParaRPr lang="fr-FR" dirty="0">
+              <a:solidFill>
+                <a:schemeClr val="bg1"/>
+              </a:solidFill>
+            </a:endParaRPr>
+          </a:p>
+        </p:txBody>
+      </p:sp>
+      <p:cxnSp>
+        <p:nvCxnSpPr>
+          <p:cNvPr id="37" name="Straight Arrow Connector 36"/>
+          <p:cNvCxnSpPr>
+            <a:stCxn id="34" idx="3"/>
+            <a:endCxn id="36" idx="1"/>
+          </p:cNvCxnSpPr>
+          <p:nvPr/>
+        </p:nvCxnSpPr>
+        <p:spPr>
+          <a:xfrm>
+            <a:off x="3817525" y="5050536"/>
+            <a:ext cx="452008" cy="0"/>
+          </a:xfrm>
+          <a:prstGeom prst="straightConnector1">
+            <a:avLst/>
+          </a:prstGeom>
+          <a:ln>
+            <a:tailEnd type="triangle"/>
+          </a:ln>
+        </p:spPr>
+        <p:style>
+          <a:lnRef idx="1">
+            <a:schemeClr val="accent1"/>
+          </a:lnRef>
+          <a:fillRef idx="0">
+            <a:schemeClr val="accent1"/>
+          </a:fillRef>
+          <a:effectRef idx="0">
+            <a:schemeClr val="accent1"/>
+          </a:effectRef>
+          <a:fontRef idx="minor">
+            <a:schemeClr val="tx1"/>
+          </a:fontRef>
+        </p:style>
+      </p:cxnSp>
+      <p:sp>
+        <p:nvSpPr>
+          <p:cNvPr id="38" name="Rectangle 37"/>
+          <p:cNvSpPr/>
+          <p:nvPr/>
+        </p:nvSpPr>
+        <p:spPr>
+          <a:xfrm>
+            <a:off x="6366126" y="4608576"/>
+            <a:ext cx="1413226" cy="896112"/>
+          </a:xfrm>
+          <a:prstGeom prst="rect">
+            <a:avLst/>
+          </a:prstGeom>
+        </p:spPr>
+        <p:style>
+          <a:lnRef idx="2">
+            <a:schemeClr val="accent1">
+              <a:shade val="50000"/>
+            </a:schemeClr>
+          </a:lnRef>
+          <a:fillRef idx="1">
+            <a:schemeClr val="accent1"/>
+          </a:fillRef>
+          <a:effectRef idx="0">
+            <a:schemeClr val="accent1"/>
+          </a:effectRef>
+          <a:fontRef idx="minor">
+            <a:schemeClr val="lt1"/>
+          </a:fontRef>
+        </p:style>
+        <p:txBody>
+          <a:bodyPr rtlCol="0" anchor="ctr"/>
+          <a:lstStyle/>
+          <a:p>
+            <a:pPr algn="ctr"/>
+            <a:r>
+              <a:rPr lang="fr-FR" dirty="0" smtClean="0">
+                <a:solidFill>
+                  <a:srgbClr val="FF0000"/>
+                </a:solidFill>
+              </a:rPr>
+              <a:t>Select </a:t>
+            </a:r>
+            <a:r>
+              <a:rPr lang="fr-FR" dirty="0" err="1" smtClean="0">
+                <a:solidFill>
+                  <a:srgbClr val="FF0000"/>
+                </a:solidFill>
+              </a:rPr>
+              <a:t>reply</a:t>
+            </a:r>
+            <a:r>
+              <a:rPr lang="fr-FR" dirty="0" smtClean="0">
+                <a:solidFill>
+                  <a:srgbClr val="FF0000"/>
+                </a:solidFill>
+              </a:rPr>
+              <a:t> back</a:t>
+            </a:r>
+            <a:endParaRPr lang="fr-FR" dirty="0">
+              <a:solidFill>
+                <a:srgbClr val="FF0000"/>
+              </a:solidFill>
+            </a:endParaRPr>
+          </a:p>
+        </p:txBody>
+      </p:sp>
+      <p:cxnSp>
+        <p:nvCxnSpPr>
+          <p:cNvPr id="39" name="Straight Arrow Connector 38"/>
+          <p:cNvCxnSpPr>
+            <a:stCxn id="36" idx="3"/>
+            <a:endCxn id="38" idx="1"/>
+          </p:cNvCxnSpPr>
+          <p:nvPr/>
+        </p:nvCxnSpPr>
+        <p:spPr>
+          <a:xfrm>
+            <a:off x="5915453" y="5050536"/>
+            <a:ext cx="450673" cy="6096"/>
+          </a:xfrm>
+          <a:prstGeom prst="straightConnector1">
+            <a:avLst/>
+          </a:prstGeom>
+          <a:ln>
+            <a:tailEnd type="triangle"/>
+          </a:ln>
+        </p:spPr>
+        <p:style>
+          <a:lnRef idx="1">
+            <a:schemeClr val="accent1"/>
+          </a:lnRef>
+          <a:fillRef idx="0">
+            <a:schemeClr val="accent1"/>
+          </a:fillRef>
+          <a:effectRef idx="0">
+            <a:schemeClr val="accent1"/>
+          </a:effectRef>
+          <a:fontRef idx="minor">
+            <a:schemeClr val="tx1"/>
+          </a:fontRef>
+        </p:style>
+      </p:cxnSp>
+      <p:sp>
+        <p:nvSpPr>
+          <p:cNvPr id="40" name="Rectangle 39"/>
+          <p:cNvSpPr/>
+          <p:nvPr/>
+        </p:nvSpPr>
+        <p:spPr>
+          <a:xfrm>
+            <a:off x="10439021" y="5398008"/>
+            <a:ext cx="1069469" cy="810768"/>
+          </a:xfrm>
+          <a:prstGeom prst="rect">
+            <a:avLst/>
+          </a:prstGeom>
+        </p:spPr>
+        <p:style>
+          <a:lnRef idx="2">
+            <a:schemeClr val="accent1">
+              <a:shade val="50000"/>
+            </a:schemeClr>
+          </a:lnRef>
+          <a:fillRef idx="1">
+            <a:schemeClr val="accent1"/>
+          </a:fillRef>
+          <a:effectRef idx="0">
+            <a:schemeClr val="accent1"/>
+          </a:effectRef>
+          <a:fontRef idx="minor">
+            <a:schemeClr val="lt1"/>
+          </a:fontRef>
+        </p:style>
+        <p:txBody>
+          <a:bodyPr rtlCol="0" anchor="ctr"/>
+          <a:lstStyle/>
+          <a:p>
+            <a:pPr algn="ctr"/>
+            <a:r>
+              <a:rPr lang="fr-FR" dirty="0" err="1" smtClean="0"/>
+              <a:t>Send</a:t>
+            </a:r>
+            <a:endParaRPr lang="fr-FR" dirty="0"/>
+          </a:p>
+        </p:txBody>
+      </p:sp>
+      <p:sp>
+        <p:nvSpPr>
+          <p:cNvPr id="41" name="Rectangle 40"/>
+          <p:cNvSpPr/>
+          <p:nvPr/>
+        </p:nvSpPr>
+        <p:spPr>
+          <a:xfrm>
+            <a:off x="10439021" y="4187952"/>
+            <a:ext cx="1334738" cy="762000"/>
+          </a:xfrm>
+          <a:prstGeom prst="rect">
+            <a:avLst/>
+          </a:prstGeom>
+        </p:spPr>
+        <p:style>
+          <a:lnRef idx="2">
+            <a:schemeClr val="accent1">
+              <a:shade val="50000"/>
+            </a:schemeClr>
+          </a:lnRef>
+          <a:fillRef idx="1">
+            <a:schemeClr val="accent1"/>
+          </a:fillRef>
+          <a:effectRef idx="0">
+            <a:schemeClr val="accent1"/>
+          </a:effectRef>
+          <a:fontRef idx="minor">
+            <a:schemeClr val="lt1"/>
+          </a:fontRef>
+        </p:style>
+        <p:txBody>
+          <a:bodyPr rtlCol="0" anchor="ctr"/>
+          <a:lstStyle/>
+          <a:p>
+            <a:pPr algn="ctr"/>
+            <a:r>
+              <a:rPr lang="fr-FR" dirty="0" smtClean="0"/>
+              <a:t>Save </a:t>
+            </a:r>
+            <a:r>
+              <a:rPr lang="fr-FR" dirty="0" err="1" smtClean="0"/>
+              <a:t>draft</a:t>
+            </a:r>
+            <a:endParaRPr lang="fr-FR" dirty="0"/>
+          </a:p>
+        </p:txBody>
+      </p:sp>
+      <p:cxnSp>
+        <p:nvCxnSpPr>
+          <p:cNvPr id="42" name="Straight Arrow Connector 41"/>
+          <p:cNvCxnSpPr>
+            <a:stCxn id="65" idx="3"/>
+            <a:endCxn id="41" idx="1"/>
+          </p:cNvCxnSpPr>
+          <p:nvPr/>
+        </p:nvCxnSpPr>
+        <p:spPr>
+          <a:xfrm flipV="1">
+            <a:off x="9732408" y="4568952"/>
+            <a:ext cx="706613" cy="487680"/>
+          </a:xfrm>
+          <a:prstGeom prst="straightConnector1">
+            <a:avLst/>
+          </a:prstGeom>
+          <a:ln>
+            <a:tailEnd type="triangle"/>
+          </a:ln>
+        </p:spPr>
+        <p:style>
+          <a:lnRef idx="1">
+            <a:schemeClr val="accent1"/>
+          </a:lnRef>
+          <a:fillRef idx="0">
+            <a:schemeClr val="accent1"/>
+          </a:fillRef>
+          <a:effectRef idx="0">
+            <a:schemeClr val="accent1"/>
+          </a:effectRef>
+          <a:fontRef idx="minor">
+            <a:schemeClr val="tx1"/>
+          </a:fontRef>
+        </p:style>
+      </p:cxnSp>
+      <p:cxnSp>
+        <p:nvCxnSpPr>
+          <p:cNvPr id="43" name="Straight Arrow Connector 42"/>
+          <p:cNvCxnSpPr>
+            <a:stCxn id="65" idx="3"/>
+            <a:endCxn id="40" idx="1"/>
+          </p:cNvCxnSpPr>
+          <p:nvPr/>
+        </p:nvCxnSpPr>
+        <p:spPr>
+          <a:xfrm>
+            <a:off x="9732408" y="5056632"/>
+            <a:ext cx="706613" cy="746760"/>
+          </a:xfrm>
+          <a:prstGeom prst="straightConnector1">
+            <a:avLst/>
+          </a:prstGeom>
+          <a:ln>
+            <a:tailEnd type="triangle"/>
+          </a:ln>
+        </p:spPr>
+        <p:style>
+          <a:lnRef idx="1">
+            <a:schemeClr val="accent1"/>
+          </a:lnRef>
+          <a:fillRef idx="0">
+            <a:schemeClr val="accent1"/>
+          </a:fillRef>
+          <a:effectRef idx="0">
+            <a:schemeClr val="accent1"/>
+          </a:effectRef>
+          <a:fontRef idx="minor">
+            <a:schemeClr val="tx1"/>
+          </a:fontRef>
+        </p:style>
+      </p:cxnSp>
+      <p:sp>
+        <p:nvSpPr>
+          <p:cNvPr id="45" name="TextBox 44"/>
+          <p:cNvSpPr txBox="1"/>
+          <p:nvPr/>
+        </p:nvSpPr>
+        <p:spPr>
+          <a:xfrm>
+            <a:off x="2182368" y="6352032"/>
+            <a:ext cx="5049011" cy="369332"/>
+          </a:xfrm>
+          <a:prstGeom prst="rect">
+            <a:avLst/>
+          </a:prstGeom>
+          <a:noFill/>
+        </p:spPr>
+        <p:txBody>
+          <a:bodyPr wrap="none" rtlCol="0">
+            <a:spAutoFit/>
+          </a:bodyPr>
+          <a:lstStyle/>
+          <a:p>
+            <a:r>
+              <a:rPr lang="fr-FR" dirty="0" smtClean="0">
+                <a:solidFill>
+                  <a:srgbClr val="FF0000"/>
+                </a:solidFill>
+              </a:rPr>
+              <a:t>* How </a:t>
+            </a:r>
+            <a:r>
+              <a:rPr lang="fr-FR" dirty="0" err="1" smtClean="0">
+                <a:solidFill>
+                  <a:srgbClr val="FF0000"/>
+                </a:solidFill>
+              </a:rPr>
+              <a:t>can</a:t>
+            </a:r>
+            <a:r>
+              <a:rPr lang="fr-FR" dirty="0" smtClean="0">
+                <a:solidFill>
+                  <a:srgbClr val="FF0000"/>
+                </a:solidFill>
+              </a:rPr>
+              <a:t> </a:t>
+            </a:r>
+            <a:r>
+              <a:rPr lang="fr-FR" dirty="0" err="1" smtClean="0">
+                <a:solidFill>
+                  <a:srgbClr val="FF0000"/>
+                </a:solidFill>
+              </a:rPr>
+              <a:t>we</a:t>
+            </a:r>
+            <a:r>
+              <a:rPr lang="fr-FR" dirty="0" smtClean="0">
+                <a:solidFill>
+                  <a:srgbClr val="FF0000"/>
+                </a:solidFill>
+              </a:rPr>
+              <a:t> block </a:t>
+            </a:r>
+            <a:r>
+              <a:rPr lang="fr-FR" dirty="0" err="1" smtClean="0">
+                <a:solidFill>
+                  <a:srgbClr val="FF0000"/>
+                </a:solidFill>
+              </a:rPr>
+              <a:t>teachers</a:t>
+            </a:r>
+            <a:r>
+              <a:rPr lang="fr-FR" dirty="0" smtClean="0">
+                <a:solidFill>
+                  <a:srgbClr val="FF0000"/>
+                </a:solidFill>
+              </a:rPr>
+              <a:t> to </a:t>
+            </a:r>
+            <a:r>
+              <a:rPr lang="fr-FR" dirty="0" err="1" smtClean="0">
+                <a:solidFill>
+                  <a:srgbClr val="FF0000"/>
+                </a:solidFill>
+              </a:rPr>
+              <a:t>add</a:t>
+            </a:r>
+            <a:r>
+              <a:rPr lang="fr-FR" dirty="0" smtClean="0">
+                <a:solidFill>
+                  <a:srgbClr val="FF0000"/>
+                </a:solidFill>
+              </a:rPr>
+              <a:t> the class alias? </a:t>
+            </a:r>
+            <a:endParaRPr lang="fr-FR" dirty="0">
+              <a:solidFill>
+                <a:srgbClr val="FF0000"/>
+              </a:solidFill>
+            </a:endParaRPr>
+          </a:p>
+        </p:txBody>
+      </p:sp>
+      <p:sp>
+        <p:nvSpPr>
+          <p:cNvPr id="65" name="Rectangle 64"/>
+          <p:cNvSpPr/>
+          <p:nvPr/>
+        </p:nvSpPr>
+        <p:spPr>
+          <a:xfrm>
+            <a:off x="8319182" y="4608576"/>
+            <a:ext cx="1413226" cy="896112"/>
+          </a:xfrm>
+          <a:prstGeom prst="rect">
+            <a:avLst/>
+          </a:prstGeom>
+        </p:spPr>
+        <p:style>
+          <a:lnRef idx="2">
+            <a:schemeClr val="accent1">
+              <a:shade val="50000"/>
+            </a:schemeClr>
+          </a:lnRef>
+          <a:fillRef idx="1">
+            <a:schemeClr val="accent1"/>
+          </a:fillRef>
+          <a:effectRef idx="0">
+            <a:schemeClr val="accent1"/>
+          </a:effectRef>
+          <a:fontRef idx="minor">
+            <a:schemeClr val="lt1"/>
+          </a:fontRef>
+        </p:style>
+        <p:txBody>
+          <a:bodyPr rtlCol="0" anchor="ctr"/>
+          <a:lstStyle/>
+          <a:p>
+            <a:pPr algn="ctr"/>
+            <a:r>
+              <a:rPr lang="fr-FR" dirty="0" smtClean="0">
+                <a:solidFill>
+                  <a:schemeClr val="tx1"/>
+                </a:solidFill>
+              </a:rPr>
+              <a:t>Compose </a:t>
+            </a:r>
+            <a:r>
+              <a:rPr lang="fr-FR" dirty="0" err="1" smtClean="0">
+                <a:solidFill>
+                  <a:schemeClr val="tx1"/>
+                </a:solidFill>
+              </a:rPr>
+              <a:t>reply</a:t>
+            </a:r>
+            <a:r>
+              <a:rPr lang="fr-FR" dirty="0" smtClean="0">
+                <a:solidFill>
+                  <a:schemeClr val="tx1"/>
+                </a:solidFill>
+              </a:rPr>
+              <a:t> message</a:t>
+            </a:r>
+            <a:endParaRPr lang="fr-FR" dirty="0">
+              <a:solidFill>
+                <a:schemeClr val="tx1"/>
+              </a:solidFill>
+            </a:endParaRPr>
+          </a:p>
+        </p:txBody>
+      </p:sp>
+      <p:cxnSp>
+        <p:nvCxnSpPr>
+          <p:cNvPr id="67" name="Straight Arrow Connector 66"/>
+          <p:cNvCxnSpPr>
+            <a:stCxn id="38" idx="3"/>
+            <a:endCxn id="65" idx="1"/>
+          </p:cNvCxnSpPr>
+          <p:nvPr/>
+        </p:nvCxnSpPr>
+        <p:spPr>
+          <a:xfrm>
+            <a:off x="7779352" y="5056632"/>
+            <a:ext cx="539830" cy="0"/>
           </a:xfrm>
           <a:prstGeom prst="straightConnector1">
             <a:avLst/>
@@ -7084,7 +8157,7 @@
     </p:spTree>
     <p:extLst>
       <p:ext uri="{BB962C8B-B14F-4D97-AF65-F5344CB8AC3E}">
-        <p14:creationId xmlns:p14="http://schemas.microsoft.com/office/powerpoint/2010/main" val="2136243009"/>
+        <p14:creationId xmlns:p14="http://schemas.microsoft.com/office/powerpoint/2010/main" val="1849182865"/>
       </p:ext>
     </p:extLst>
   </p:cSld>
@@ -7128,23 +8201,18 @@
             <p:ph type="title"/>
           </p:nvPr>
         </p:nvSpPr>
-        <p:spPr>
-          <a:xfrm>
-            <a:off x="765598" y="377455"/>
-            <a:ext cx="10515600" cy="1325563"/>
-          </a:xfrm>
-        </p:spPr>
+        <p:spPr/>
         <p:txBody>
           <a:bodyPr/>
           <a:lstStyle/>
           <a:p>
             <a:r>
-              <a:rPr lang="fr-FR" dirty="0" err="1" smtClean="0"/>
-              <a:t>Exercises</a:t>
-            </a:r>
-            <a:r>
-              <a:rPr lang="fr-FR" dirty="0" smtClean="0"/>
-              <a:t> flow</a:t>
+              <a:rPr lang="fr-FR" dirty="0" smtClean="0"/>
+              <a:t>Q&amp;A </a:t>
+            </a:r>
+            <a:r>
+              <a:rPr lang="fr-FR" dirty="0" smtClean="0"/>
+              <a:t>flow</a:t>
             </a:r>
             <a:endParaRPr lang="fr-FR" dirty="0"/>
           </a:p>
@@ -7158,7 +8226,7 @@
         </p:nvSpPr>
         <p:spPr>
           <a:xfrm>
-            <a:off x="206721" y="1930324"/>
+            <a:off x="509016" y="2005267"/>
             <a:ext cx="1597152" cy="755904"/>
           </a:xfrm>
           <a:prstGeom prst="rect">
@@ -7188,15 +8256,7 @@
             <a:pPr algn="ctr"/>
             <a:r>
               <a:rPr lang="fr-FR" dirty="0" smtClean="0"/>
-              <a:t>Select </a:t>
-            </a:r>
-            <a:r>
-              <a:rPr lang="fr-FR" dirty="0" err="1" smtClean="0"/>
-              <a:t>Exercise</a:t>
-            </a:r>
-            <a:r>
-              <a:rPr lang="fr-FR" dirty="0" smtClean="0"/>
-              <a:t> tab</a:t>
+              <a:t>Select FAQ tab</a:t>
             </a:r>
             <a:endParaRPr lang="fr-FR" dirty="0"/>
           </a:p>
@@ -7210,7 +8270,7 @@
         </p:nvSpPr>
         <p:spPr>
           <a:xfrm>
-            <a:off x="2092603" y="1939110"/>
+            <a:off x="2712686" y="2011618"/>
             <a:ext cx="1597152" cy="755904"/>
           </a:xfrm>
           <a:prstGeom prst="rect">
@@ -7240,19 +8300,678 @@
             <a:pPr algn="ctr"/>
             <a:r>
               <a:rPr lang="fr-FR" dirty="0" smtClean="0"/>
+              <a:t>Display </a:t>
+            </a:r>
+            <a:r>
+              <a:rPr lang="fr-FR" dirty="0" err="1" smtClean="0"/>
+              <a:t>list</a:t>
+            </a:r>
+            <a:r>
+              <a:rPr lang="fr-FR" dirty="0" smtClean="0"/>
+              <a:t> of Question </a:t>
+            </a:r>
+            <a:r>
+              <a:rPr lang="fr-FR" dirty="0" err="1" smtClean="0"/>
+              <a:t>title</a:t>
+            </a:r>
+            <a:endParaRPr lang="fr-FR" dirty="0"/>
+          </a:p>
+        </p:txBody>
+      </p:sp>
+      <p:sp>
+        <p:nvSpPr>
+          <p:cNvPr id="8" name="Rectangle 7"/>
+          <p:cNvSpPr/>
+          <p:nvPr/>
+        </p:nvSpPr>
+        <p:spPr>
+          <a:xfrm>
+            <a:off x="7528458" y="2023872"/>
+            <a:ext cx="1597152" cy="755904"/>
+          </a:xfrm>
+          <a:prstGeom prst="rect">
+            <a:avLst/>
+          </a:prstGeom>
+        </p:spPr>
+        <p:style>
+          <a:lnRef idx="2">
+            <a:schemeClr val="accent1">
+              <a:shade val="50000"/>
+            </a:schemeClr>
+          </a:lnRef>
+          <a:fillRef idx="1">
+            <a:schemeClr val="accent1"/>
+          </a:fillRef>
+          <a:effectRef idx="0">
+            <a:schemeClr val="accent1"/>
+          </a:effectRef>
+          <a:fontRef idx="minor">
+            <a:schemeClr val="lt1"/>
+          </a:fontRef>
+        </p:style>
+        <p:txBody>
+          <a:bodyPr rtlCol="0" anchor="ctr"/>
+          <a:lstStyle/>
+          <a:p>
+            <a:pPr algn="ctr"/>
+            <a:r>
+              <a:rPr lang="fr-FR" dirty="0" smtClean="0"/>
+              <a:t>Input question and </a:t>
+            </a:r>
+            <a:r>
+              <a:rPr lang="fr-FR" dirty="0" err="1" smtClean="0"/>
+              <a:t>answer</a:t>
+            </a:r>
+            <a:endParaRPr lang="fr-FR" dirty="0"/>
+          </a:p>
+        </p:txBody>
+      </p:sp>
+      <p:sp>
+        <p:nvSpPr>
+          <p:cNvPr id="9" name="Rectangle 8"/>
+          <p:cNvSpPr/>
+          <p:nvPr/>
+        </p:nvSpPr>
+        <p:spPr>
+          <a:xfrm>
+            <a:off x="10008006" y="1224979"/>
+            <a:ext cx="1597152" cy="755904"/>
+          </a:xfrm>
+          <a:prstGeom prst="rect">
+            <a:avLst/>
+          </a:prstGeom>
+        </p:spPr>
+        <p:style>
+          <a:lnRef idx="2">
+            <a:schemeClr val="accent1">
+              <a:shade val="50000"/>
+            </a:schemeClr>
+          </a:lnRef>
+          <a:fillRef idx="1">
+            <a:schemeClr val="accent1"/>
+          </a:fillRef>
+          <a:effectRef idx="0">
+            <a:schemeClr val="accent1"/>
+          </a:effectRef>
+          <a:fontRef idx="minor">
+            <a:schemeClr val="lt1"/>
+          </a:fontRef>
+        </p:style>
+        <p:txBody>
+          <a:bodyPr rtlCol="0" anchor="ctr"/>
+          <a:lstStyle/>
+          <a:p>
+            <a:pPr algn="ctr"/>
+            <a:r>
+              <a:rPr lang="fr-FR" dirty="0" smtClean="0"/>
+              <a:t>Save </a:t>
+            </a:r>
+            <a:r>
+              <a:rPr lang="fr-FR" dirty="0" err="1" smtClean="0"/>
+              <a:t>draft</a:t>
+            </a:r>
+            <a:endParaRPr lang="fr-FR" dirty="0"/>
+          </a:p>
+        </p:txBody>
+      </p:sp>
+      <p:cxnSp>
+        <p:nvCxnSpPr>
+          <p:cNvPr id="10" name="Straight Arrow Connector 9"/>
+          <p:cNvCxnSpPr>
+            <a:stCxn id="3" idx="3"/>
+            <a:endCxn id="4" idx="1"/>
+          </p:cNvCxnSpPr>
+          <p:nvPr/>
+        </p:nvCxnSpPr>
+        <p:spPr>
+          <a:xfrm>
+            <a:off x="2106168" y="2383219"/>
+            <a:ext cx="606518" cy="6351"/>
+          </a:xfrm>
+          <a:prstGeom prst="straightConnector1">
+            <a:avLst/>
+          </a:prstGeom>
+          <a:ln>
+            <a:tailEnd type="triangle"/>
+          </a:ln>
+        </p:spPr>
+        <p:style>
+          <a:lnRef idx="1">
+            <a:schemeClr val="accent1"/>
+          </a:lnRef>
+          <a:fillRef idx="0">
+            <a:schemeClr val="accent1"/>
+          </a:fillRef>
+          <a:effectRef idx="0">
+            <a:schemeClr val="accent1"/>
+          </a:effectRef>
+          <a:fontRef idx="minor">
+            <a:schemeClr val="tx1"/>
+          </a:fontRef>
+        </p:style>
+      </p:cxnSp>
+      <p:cxnSp>
+        <p:nvCxnSpPr>
+          <p:cNvPr id="11" name="Straight Arrow Connector 10"/>
+          <p:cNvCxnSpPr>
+            <a:stCxn id="4" idx="3"/>
+          </p:cNvCxnSpPr>
+          <p:nvPr/>
+        </p:nvCxnSpPr>
+        <p:spPr>
+          <a:xfrm>
+            <a:off x="4309838" y="2389570"/>
+            <a:ext cx="635508" cy="0"/>
+          </a:xfrm>
+          <a:prstGeom prst="straightConnector1">
+            <a:avLst/>
+          </a:prstGeom>
+          <a:ln>
+            <a:tailEnd type="triangle"/>
+          </a:ln>
+        </p:spPr>
+        <p:style>
+          <a:lnRef idx="1">
+            <a:schemeClr val="accent1"/>
+          </a:lnRef>
+          <a:fillRef idx="0">
+            <a:schemeClr val="accent1"/>
+          </a:fillRef>
+          <a:effectRef idx="0">
+            <a:schemeClr val="accent1"/>
+          </a:effectRef>
+          <a:fontRef idx="minor">
+            <a:schemeClr val="tx1"/>
+          </a:fontRef>
+        </p:style>
+      </p:cxnSp>
+      <p:cxnSp>
+        <p:nvCxnSpPr>
+          <p:cNvPr id="14" name="Straight Arrow Connector 13"/>
+          <p:cNvCxnSpPr>
+            <a:endCxn id="8" idx="1"/>
+          </p:cNvCxnSpPr>
+          <p:nvPr/>
+        </p:nvCxnSpPr>
+        <p:spPr>
+          <a:xfrm>
+            <a:off x="6542498" y="2389570"/>
+            <a:ext cx="985960" cy="12254"/>
+          </a:xfrm>
+          <a:prstGeom prst="straightConnector1">
+            <a:avLst/>
+          </a:prstGeom>
+          <a:ln>
+            <a:tailEnd type="triangle"/>
+          </a:ln>
+        </p:spPr>
+        <p:style>
+          <a:lnRef idx="1">
+            <a:schemeClr val="accent1"/>
+          </a:lnRef>
+          <a:fillRef idx="0">
+            <a:schemeClr val="accent1"/>
+          </a:fillRef>
+          <a:effectRef idx="0">
+            <a:schemeClr val="accent1"/>
+          </a:effectRef>
+          <a:fontRef idx="minor">
+            <a:schemeClr val="tx1"/>
+          </a:fontRef>
+        </p:style>
+      </p:cxnSp>
+      <p:cxnSp>
+        <p:nvCxnSpPr>
+          <p:cNvPr id="15" name="Straight Arrow Connector 14"/>
+          <p:cNvCxnSpPr>
+            <a:stCxn id="8" idx="3"/>
+            <a:endCxn id="9" idx="1"/>
+          </p:cNvCxnSpPr>
+          <p:nvPr/>
+        </p:nvCxnSpPr>
+        <p:spPr>
+          <a:xfrm flipV="1">
+            <a:off x="9125610" y="1602931"/>
+            <a:ext cx="882396" cy="798893"/>
+          </a:xfrm>
+          <a:prstGeom prst="straightConnector1">
+            <a:avLst/>
+          </a:prstGeom>
+          <a:ln>
+            <a:tailEnd type="triangle"/>
+          </a:ln>
+        </p:spPr>
+        <p:style>
+          <a:lnRef idx="1">
+            <a:schemeClr val="accent1"/>
+          </a:lnRef>
+          <a:fillRef idx="0">
+            <a:schemeClr val="accent1"/>
+          </a:fillRef>
+          <a:effectRef idx="0">
+            <a:schemeClr val="accent1"/>
+          </a:effectRef>
+          <a:fontRef idx="minor">
+            <a:schemeClr val="tx1"/>
+          </a:fontRef>
+        </p:style>
+      </p:cxnSp>
+      <p:sp>
+        <p:nvSpPr>
+          <p:cNvPr id="21" name="Rectangle 20"/>
+          <p:cNvSpPr/>
+          <p:nvPr/>
+        </p:nvSpPr>
+        <p:spPr>
+          <a:xfrm>
+            <a:off x="10008006" y="2710532"/>
+            <a:ext cx="1510284" cy="761713"/>
+          </a:xfrm>
+          <a:prstGeom prst="rect">
+            <a:avLst/>
+          </a:prstGeom>
+        </p:spPr>
+        <p:style>
+          <a:lnRef idx="2">
+            <a:schemeClr val="accent1">
+              <a:shade val="50000"/>
+            </a:schemeClr>
+          </a:lnRef>
+          <a:fillRef idx="1">
+            <a:schemeClr val="accent1"/>
+          </a:fillRef>
+          <a:effectRef idx="0">
+            <a:schemeClr val="accent1"/>
+          </a:effectRef>
+          <a:fontRef idx="minor">
+            <a:schemeClr val="lt1"/>
+          </a:fontRef>
+        </p:style>
+        <p:txBody>
+          <a:bodyPr rtlCol="0" anchor="ctr"/>
+          <a:lstStyle/>
+          <a:p>
+            <a:pPr algn="ctr"/>
+            <a:r>
+              <a:rPr lang="fr-FR" dirty="0" err="1" smtClean="0"/>
+              <a:t>Publish</a:t>
+            </a:r>
+            <a:endParaRPr lang="fr-FR" dirty="0"/>
+          </a:p>
+        </p:txBody>
+      </p:sp>
+      <p:cxnSp>
+        <p:nvCxnSpPr>
+          <p:cNvPr id="23" name="Straight Arrow Connector 22"/>
+          <p:cNvCxnSpPr>
+            <a:stCxn id="8" idx="3"/>
+            <a:endCxn id="21" idx="1"/>
+          </p:cNvCxnSpPr>
+          <p:nvPr/>
+        </p:nvCxnSpPr>
+        <p:spPr>
+          <a:xfrm>
+            <a:off x="9125610" y="2401824"/>
+            <a:ext cx="882396" cy="689565"/>
+          </a:xfrm>
+          <a:prstGeom prst="straightConnector1">
+            <a:avLst/>
+          </a:prstGeom>
+          <a:ln>
+            <a:tailEnd type="triangle"/>
+          </a:ln>
+        </p:spPr>
+        <p:style>
+          <a:lnRef idx="1">
+            <a:schemeClr val="accent1"/>
+          </a:lnRef>
+          <a:fillRef idx="0">
+            <a:schemeClr val="accent1"/>
+          </a:fillRef>
+          <a:effectRef idx="0">
+            <a:schemeClr val="accent1"/>
+          </a:effectRef>
+          <a:fontRef idx="minor">
+            <a:schemeClr val="tx1"/>
+          </a:fontRef>
+        </p:style>
+      </p:cxnSp>
+      <p:sp>
+        <p:nvSpPr>
+          <p:cNvPr id="22" name="Rectangle 21"/>
+          <p:cNvSpPr/>
+          <p:nvPr/>
+        </p:nvSpPr>
+        <p:spPr>
+          <a:xfrm>
+            <a:off x="4945346" y="1992155"/>
+            <a:ext cx="1597152" cy="755904"/>
+          </a:xfrm>
+          <a:prstGeom prst="rect">
+            <a:avLst/>
+          </a:prstGeom>
+        </p:spPr>
+        <p:style>
+          <a:lnRef idx="2">
+            <a:schemeClr val="accent1">
+              <a:shade val="50000"/>
+            </a:schemeClr>
+          </a:lnRef>
+          <a:fillRef idx="1">
+            <a:schemeClr val="accent1"/>
+          </a:fillRef>
+          <a:effectRef idx="0">
+            <a:schemeClr val="accent1"/>
+          </a:effectRef>
+          <a:fontRef idx="minor">
+            <a:schemeClr val="lt1"/>
+          </a:fontRef>
+        </p:style>
+        <p:txBody>
+          <a:bodyPr rtlCol="0" anchor="ctr"/>
+          <a:lstStyle/>
+          <a:p>
+            <a:pPr algn="ctr"/>
+            <a:r>
+              <a:rPr lang="fr-FR" dirty="0" smtClean="0"/>
               <a:t>Select to </a:t>
             </a:r>
             <a:r>
               <a:rPr lang="fr-FR" dirty="0" err="1" smtClean="0"/>
               <a:t>create</a:t>
             </a:r>
-            <a:r>
-              <a:rPr lang="fr-FR" dirty="0" smtClean="0"/>
-              <a:t> a </a:t>
-            </a:r>
+            <a:endParaRPr lang="fr-FR" dirty="0"/>
+          </a:p>
+        </p:txBody>
+      </p:sp>
+      <p:sp>
+        <p:nvSpPr>
+          <p:cNvPr id="38" name="Rectangle 37"/>
+          <p:cNvSpPr/>
+          <p:nvPr/>
+        </p:nvSpPr>
+        <p:spPr>
+          <a:xfrm>
+            <a:off x="9921036" y="4033364"/>
+            <a:ext cx="1684122" cy="989740"/>
+          </a:xfrm>
+          <a:prstGeom prst="rect">
+            <a:avLst/>
+          </a:prstGeom>
+        </p:spPr>
+        <p:style>
+          <a:lnRef idx="2">
+            <a:schemeClr val="accent1">
+              <a:shade val="50000"/>
+            </a:schemeClr>
+          </a:lnRef>
+          <a:fillRef idx="1">
+            <a:schemeClr val="accent1"/>
+          </a:fillRef>
+          <a:effectRef idx="0">
+            <a:schemeClr val="accent1"/>
+          </a:effectRef>
+          <a:fontRef idx="minor">
+            <a:schemeClr val="lt1"/>
+          </a:fontRef>
+        </p:style>
+        <p:txBody>
+          <a:bodyPr rtlCol="0" anchor="ctr"/>
+          <a:lstStyle/>
+          <a:p>
+            <a:pPr algn="ctr"/>
             <a:r>
               <a:rPr lang="fr-FR" dirty="0" err="1" smtClean="0"/>
-              <a:t>sequence</a:t>
+              <a:t>Send</a:t>
+            </a:r>
+            <a:r>
+              <a:rPr lang="fr-FR" dirty="0" smtClean="0"/>
+              <a:t> an </a:t>
+            </a:r>
+            <a:r>
+              <a:rPr lang="fr-FR" dirty="0" err="1" smtClean="0"/>
+              <a:t>announcement</a:t>
+            </a:r>
+            <a:r>
+              <a:rPr lang="fr-FR" dirty="0" smtClean="0"/>
+              <a:t> to the class</a:t>
+            </a:r>
+            <a:endParaRPr lang="fr-FR" dirty="0"/>
+          </a:p>
+        </p:txBody>
+      </p:sp>
+      <p:cxnSp>
+        <p:nvCxnSpPr>
+          <p:cNvPr id="35" name="Straight Arrow Connector 34"/>
+          <p:cNvCxnSpPr>
+            <a:stCxn id="21" idx="2"/>
+            <a:endCxn id="38" idx="0"/>
+          </p:cNvCxnSpPr>
+          <p:nvPr/>
+        </p:nvCxnSpPr>
+        <p:spPr>
+          <a:xfrm flipH="1">
+            <a:off x="10763097" y="3472245"/>
+            <a:ext cx="51" cy="561119"/>
+          </a:xfrm>
+          <a:prstGeom prst="straightConnector1">
+            <a:avLst/>
+          </a:prstGeom>
+          <a:ln>
+            <a:tailEnd type="triangle"/>
+          </a:ln>
+        </p:spPr>
+        <p:style>
+          <a:lnRef idx="1">
+            <a:schemeClr val="accent1"/>
+          </a:lnRef>
+          <a:fillRef idx="0">
+            <a:schemeClr val="accent1"/>
+          </a:fillRef>
+          <a:effectRef idx="0">
+            <a:schemeClr val="accent1"/>
+          </a:effectRef>
+          <a:fontRef idx="minor">
+            <a:schemeClr val="tx1"/>
+          </a:fontRef>
+        </p:style>
+      </p:cxnSp>
+    </p:spTree>
+    <p:extLst>
+      <p:ext uri="{BB962C8B-B14F-4D97-AF65-F5344CB8AC3E}">
+        <p14:creationId xmlns:p14="http://schemas.microsoft.com/office/powerpoint/2010/main" val="2136243009"/>
+      </p:ext>
+    </p:extLst>
+  </p:cSld>
+  <p:clrMapOvr>
+    <a:masterClrMapping/>
+  </p:clrMapOvr>
+  <p:timing>
+    <p:tnLst>
+      <p:par>
+        <p:cTn id="1" dur="indefinite" restart="never" nodeType="tmRoot"/>
+      </p:par>
+    </p:tnLst>
+  </p:timing>
+</p:sld>
+</file>
+
+<file path=ppt/slides/slide7.xml><?xml version="1.0" encoding="utf-8"?>
+<p:sld xmlns:a="http://schemas.openxmlformats.org/drawingml/2006/main" xmlns:r="http://schemas.openxmlformats.org/officeDocument/2006/relationships" xmlns:p="http://schemas.openxmlformats.org/presentationml/2006/main">
+  <p:cSld>
+    <p:spTree>
+      <p:nvGrpSpPr>
+        <p:cNvPr id="1" name=""/>
+        <p:cNvGrpSpPr/>
+        <p:nvPr/>
+      </p:nvGrpSpPr>
+      <p:grpSpPr>
+        <a:xfrm>
+          <a:off x="0" y="0"/>
+          <a:ext cx="0" cy="0"/>
+          <a:chOff x="0" y="0"/>
+          <a:chExt cx="0" cy="0"/>
+        </a:xfrm>
+      </p:grpSpPr>
+      <p:sp>
+        <p:nvSpPr>
+          <p:cNvPr id="2" name="Title 1"/>
+          <p:cNvSpPr>
+            <a:spLocks noGrp="1"/>
+          </p:cNvSpPr>
+          <p:nvPr>
+            <p:ph type="title"/>
+          </p:nvPr>
+        </p:nvSpPr>
+        <p:spPr>
+          <a:xfrm>
+            <a:off x="765598" y="377455"/>
+            <a:ext cx="10515600" cy="1325563"/>
+          </a:xfrm>
+        </p:spPr>
+        <p:txBody>
+          <a:bodyPr/>
+          <a:lstStyle/>
+          <a:p>
+            <a:r>
+              <a:rPr lang="fr-FR" dirty="0" smtClean="0">
+                <a:solidFill>
+                  <a:srgbClr val="FF0000"/>
+                </a:solidFill>
+              </a:rPr>
+              <a:t>Courses flow – Not </a:t>
+            </a:r>
+            <a:r>
+              <a:rPr lang="fr-FR" dirty="0" err="1" smtClean="0">
+                <a:solidFill>
+                  <a:srgbClr val="FF0000"/>
+                </a:solidFill>
+              </a:rPr>
+              <a:t>yet</a:t>
+            </a:r>
+            <a:r>
+              <a:rPr lang="fr-FR" dirty="0" smtClean="0">
+                <a:solidFill>
+                  <a:srgbClr val="FF0000"/>
+                </a:solidFill>
+              </a:rPr>
+              <a:t> </a:t>
+            </a:r>
+            <a:r>
+              <a:rPr lang="fr-FR" dirty="0" err="1" smtClean="0">
+                <a:solidFill>
+                  <a:srgbClr val="FF0000"/>
+                </a:solidFill>
+              </a:rPr>
+              <a:t>finished</a:t>
+            </a:r>
+            <a:endParaRPr lang="fr-FR" dirty="0">
+              <a:solidFill>
+                <a:srgbClr val="FF0000"/>
+              </a:solidFill>
+            </a:endParaRPr>
+          </a:p>
+        </p:txBody>
+      </p:sp>
+      <p:sp>
+        <p:nvSpPr>
+          <p:cNvPr id="3" name="Rectangle 2"/>
+          <p:cNvSpPr/>
+          <p:nvPr/>
+        </p:nvSpPr>
+        <p:spPr>
+          <a:xfrm>
+            <a:off x="206721" y="1930324"/>
+            <a:ext cx="1597152" cy="755904"/>
+          </a:xfrm>
+          <a:prstGeom prst="rect">
+            <a:avLst/>
+          </a:prstGeom>
+        </p:spPr>
+        <p:style>
+          <a:lnRef idx="2">
+            <a:schemeClr val="accent1">
+              <a:shade val="50000"/>
+            </a:schemeClr>
+          </a:lnRef>
+          <a:fillRef idx="1">
+            <a:schemeClr val="accent1"/>
+          </a:fillRef>
+          <a:effectRef idx="0">
+            <a:schemeClr val="accent1"/>
+          </a:effectRef>
+          <a:fontRef idx="minor">
+            <a:schemeClr val="lt1"/>
+          </a:fontRef>
+        </p:style>
+        <p:txBody>
+          <a:bodyPr rtlCol="0" anchor="ctr"/>
+          <a:lstStyle/>
+          <a:p>
+            <a:pPr algn="ctr"/>
+            <a:r>
+              <a:rPr lang="fr-FR" dirty="0" smtClean="0"/>
+              <a:t>Select </a:t>
+            </a:r>
+            <a:r>
+              <a:rPr lang="fr-FR" dirty="0" smtClean="0"/>
+              <a:t>Course tab</a:t>
+            </a:r>
+            <a:endParaRPr lang="fr-FR" dirty="0"/>
+          </a:p>
+        </p:txBody>
+      </p:sp>
+      <p:sp>
+        <p:nvSpPr>
+          <p:cNvPr id="4" name="Rectangle 3"/>
+          <p:cNvSpPr/>
+          <p:nvPr/>
+        </p:nvSpPr>
+        <p:spPr>
+          <a:xfrm>
+            <a:off x="2092603" y="1939110"/>
+            <a:ext cx="1597152" cy="755904"/>
+          </a:xfrm>
+          <a:prstGeom prst="rect">
+            <a:avLst/>
+          </a:prstGeom>
+        </p:spPr>
+        <p:style>
+          <a:lnRef idx="2">
+            <a:schemeClr val="accent1">
+              <a:shade val="50000"/>
+            </a:schemeClr>
+          </a:lnRef>
+          <a:fillRef idx="1">
+            <a:schemeClr val="accent1"/>
+          </a:fillRef>
+          <a:effectRef idx="0">
+            <a:schemeClr val="accent1"/>
+          </a:effectRef>
+          <a:fontRef idx="minor">
+            <a:schemeClr val="lt1"/>
+          </a:fontRef>
+        </p:style>
+        <p:txBody>
+          <a:bodyPr rtlCol="0" anchor="ctr"/>
+          <a:lstStyle/>
+          <a:p>
+            <a:pPr algn="ctr"/>
+            <a:r>
+              <a:rPr lang="fr-FR" dirty="0" smtClean="0"/>
+              <a:t>Select to </a:t>
+            </a:r>
+            <a:r>
+              <a:rPr lang="fr-FR" dirty="0" err="1" smtClean="0"/>
+              <a:t>create</a:t>
+            </a:r>
+            <a:r>
+              <a:rPr lang="fr-FR" dirty="0" smtClean="0"/>
+              <a:t> </a:t>
+            </a:r>
+            <a:r>
+              <a:rPr lang="fr-FR" dirty="0" smtClean="0"/>
+              <a:t>a new course </a:t>
             </a:r>
             <a:endParaRPr lang="fr-FR" dirty="0"/>
           </a:p>
@@ -7591,36 +9310,20 @@
           <a:p>
             <a:pPr algn="ctr"/>
             <a:r>
-              <a:rPr lang="fr-FR" dirty="0" smtClean="0"/>
-              <a:t>Select to </a:t>
-            </a:r>
-            <a:r>
               <a:rPr lang="fr-FR" dirty="0" err="1" smtClean="0"/>
-              <a:t>add</a:t>
-            </a:r>
-            <a:r>
-              <a:rPr lang="fr-FR" dirty="0" smtClean="0"/>
+              <a:t>Create</a:t>
+            </a:r>
+            <a:r>
+              <a:rPr lang="fr-FR" dirty="0"/>
               <a:t> </a:t>
             </a:r>
             <a:r>
+              <a:rPr lang="fr-FR" dirty="0" smtClean="0"/>
+              <a:t>new </a:t>
+            </a:r>
+            <a:r>
               <a:rPr lang="fr-FR" dirty="0" err="1" smtClean="0"/>
-              <a:t>exercise</a:t>
-            </a:r>
-            <a:r>
-              <a:rPr lang="fr-FR" dirty="0" smtClean="0"/>
-              <a:t> to </a:t>
-            </a:r>
-            <a:r>
-              <a:rPr lang="fr-FR" dirty="0" err="1" smtClean="0"/>
-              <a:t>created</a:t>
-            </a:r>
-            <a:r>
-              <a:rPr lang="fr-FR" dirty="0" smtClean="0"/>
-              <a:t> </a:t>
-            </a:r>
-            <a:r>
-              <a:rPr lang="fr-FR" dirty="0" err="1" smtClean="0"/>
-              <a:t>sequence</a:t>
+              <a:t>sequeces</a:t>
             </a:r>
             <a:endParaRPr lang="fr-FR" dirty="0"/>
           </a:p>
@@ -7703,12 +9406,8 @@
               <a:t>Select </a:t>
             </a:r>
             <a:r>
-              <a:rPr lang="fr-FR" dirty="0" err="1" smtClean="0"/>
-              <a:t>Exercise</a:t>
-            </a:r>
-            <a:r>
-              <a:rPr lang="fr-FR" dirty="0" smtClean="0"/>
-              <a:t> tab</a:t>
+              <a:rPr lang="fr-FR" dirty="0" smtClean="0"/>
+              <a:t>Course tab</a:t>
             </a:r>
             <a:endParaRPr lang="fr-FR" dirty="0"/>
           </a:p>
@@ -7944,6 +9643,13 @@
   <p:clrMapOvr>
     <a:masterClrMapping/>
   </p:clrMapOvr>
+  <p:timing>
+    <p:tnLst>
+      <p:par>
+        <p:cTn id="1" dur="indefinite" restart="never" nodeType="tmRoot"/>
+      </p:par>
+    </p:tnLst>
+  </p:timing>
 </p:sld>
 </file>
 

</xml_diff>